<commit_message>
small changes to minutes
</commit_message>
<xml_diff>
--- a/Crazy Putting phase 2.pptx
+++ b/Crazy Putting phase 2.pptx
@@ -10,18 +10,18 @@
   <p:sldIdLst>
     <p:sldId id="265" r:id="rId5"/>
     <p:sldId id="288" r:id="rId6"/>
-    <p:sldId id="290" r:id="rId7"/>
-    <p:sldId id="297" r:id="rId8"/>
-    <p:sldId id="291" r:id="rId9"/>
-    <p:sldId id="301" r:id="rId10"/>
-    <p:sldId id="298" r:id="rId11"/>
-    <p:sldId id="294" r:id="rId12"/>
-    <p:sldId id="299" r:id="rId13"/>
-    <p:sldId id="303" r:id="rId14"/>
-    <p:sldId id="292" r:id="rId15"/>
-    <p:sldId id="300" r:id="rId16"/>
-    <p:sldId id="302" r:id="rId17"/>
-    <p:sldId id="289" r:id="rId18"/>
+    <p:sldId id="289" r:id="rId7"/>
+    <p:sldId id="290" r:id="rId8"/>
+    <p:sldId id="297" r:id="rId9"/>
+    <p:sldId id="291" r:id="rId10"/>
+    <p:sldId id="301" r:id="rId11"/>
+    <p:sldId id="298" r:id="rId12"/>
+    <p:sldId id="294" r:id="rId13"/>
+    <p:sldId id="299" r:id="rId14"/>
+    <p:sldId id="303" r:id="rId15"/>
+    <p:sldId id="292" r:id="rId16"/>
+    <p:sldId id="300" r:id="rId17"/>
+    <p:sldId id="302" r:id="rId18"/>
     <p:sldId id="295" r:id="rId19"/>
     <p:sldId id="287" r:id="rId20"/>
   </p:sldIdLst>
@@ -639,7 +639,7 @@
           <a:p>
             <a:fld id="{F917F88C-BACD-4A94-B7B7-C91B49D4CB7C}" type="slidenum">
               <a:rPr lang="nl-NL" smtClean="0"/>
-              <a:t>4</a:t>
+              <a:t>5</a:t>
             </a:fld>
             <a:endParaRPr lang="nl-NL"/>
           </a:p>
@@ -723,7 +723,7 @@
           <a:p>
             <a:fld id="{F917F88C-BACD-4A94-B7B7-C91B49D4CB7C}" type="slidenum">
               <a:rPr lang="nl-NL" smtClean="0"/>
-              <a:t>5</a:t>
+              <a:t>6</a:t>
             </a:fld>
             <a:endParaRPr lang="nl-NL"/>
           </a:p>
@@ -811,7 +811,7 @@
           <a:p>
             <a:fld id="{F917F88C-BACD-4A94-B7B7-C91B49D4CB7C}" type="slidenum">
               <a:rPr lang="nl-NL" smtClean="0"/>
-              <a:t>6</a:t>
+              <a:t>7</a:t>
             </a:fld>
             <a:endParaRPr lang="nl-NL"/>
           </a:p>
@@ -895,7 +895,7 @@
           <a:p>
             <a:fld id="{F917F88C-BACD-4A94-B7B7-C91B49D4CB7C}" type="slidenum">
               <a:rPr lang="nl-NL" smtClean="0"/>
-              <a:t>12</a:t>
+              <a:t>13</a:t>
             </a:fld>
             <a:endParaRPr lang="nl-NL"/>
           </a:p>
@@ -4807,7 +4807,7 @@
           <p:cNvPr id="2" name="Title 1">
             <a:extLst>
               <a:ext uri="{FF2B5EF4-FFF2-40B4-BE49-F238E27FC236}">
-                <a16:creationId xmlns:a16="http://schemas.microsoft.com/office/drawing/2014/main" id="{8E9BBA27-5DE1-4A08-BB6E-19568827EB6F}"/>
+                <a16:creationId xmlns:a16="http://schemas.microsoft.com/office/drawing/2014/main" id="{6CE041DE-96AA-4C82-8200-E846B27DFF87}"/>
               </a:ext>
             </a:extLst>
           </p:cNvPr>
@@ -4825,7 +4825,7 @@
           <a:p>
             <a:r>
               <a:rPr lang="en-US" dirty="0"/>
-              <a:t>Bot comparison</a:t>
+              <a:t>Advanced bot</a:t>
             </a:r>
             <a:endParaRPr lang="nl-NL" dirty="0"/>
           </a:p>
@@ -4836,7 +4836,7 @@
           <p:cNvPr id="3" name="Content Placeholder 2">
             <a:extLst>
               <a:ext uri="{FF2B5EF4-FFF2-40B4-BE49-F238E27FC236}">
-                <a16:creationId xmlns:a16="http://schemas.microsoft.com/office/drawing/2014/main" id="{BD4E8E8E-4C2D-4DE9-8207-CB24F366E520}"/>
+                <a16:creationId xmlns:a16="http://schemas.microsoft.com/office/drawing/2014/main" id="{BB3F33E9-7E59-412F-8665-5ECD6D6A4BBF}"/>
               </a:ext>
             </a:extLst>
           </p:cNvPr>
@@ -4851,46 +4851,6 @@
         <p:txBody>
           <a:bodyPr/>
           <a:lstStyle/>
-          <a:p>
-            <a:pPr>
-              <a:buFont typeface="Wingdings" panose="05000000000000000000" pitchFamily="2" charset="2"/>
-              <a:buChar char="v"/>
-            </a:pPr>
-            <a:r>
-              <a:rPr lang="en-US" dirty="0"/>
-              <a:t> Calculation speed</a:t>
-            </a:r>
-          </a:p>
-          <a:p>
-            <a:pPr>
-              <a:buFont typeface="Wingdings" panose="05000000000000000000" pitchFamily="2" charset="2"/>
-              <a:buChar char="v"/>
-            </a:pPr>
-            <a:r>
-              <a:rPr lang="en-US" dirty="0"/>
-              <a:t> Accuracy</a:t>
-            </a:r>
-          </a:p>
-          <a:p>
-            <a:pPr>
-              <a:buFont typeface="Wingdings" panose="05000000000000000000" pitchFamily="2" charset="2"/>
-              <a:buChar char="v"/>
-            </a:pPr>
-            <a:r>
-              <a:rPr lang="en-US" dirty="0"/>
-              <a:t> Versatility </a:t>
-            </a:r>
-          </a:p>
-          <a:p>
-            <a:pPr>
-              <a:buFont typeface="Wingdings" panose="05000000000000000000" pitchFamily="2" charset="2"/>
-              <a:buChar char="v"/>
-            </a:pPr>
-            <a:r>
-              <a:rPr lang="en-US" dirty="0"/>
-              <a:t> Limitations</a:t>
-            </a:r>
-          </a:p>
           <a:p>
             <a:endParaRPr lang="nl-NL" dirty="0"/>
           </a:p>
@@ -4899,7 +4859,7 @@
     </p:spTree>
     <p:extLst>
       <p:ext uri="{BB962C8B-B14F-4D97-AF65-F5344CB8AC3E}">
-        <p14:creationId xmlns:p14="http://schemas.microsoft.com/office/powerpoint/2010/main" val="4156753096"/>
+        <p14:creationId xmlns:p14="http://schemas.microsoft.com/office/powerpoint/2010/main" val="4033623988"/>
       </p:ext>
     </p:extLst>
   </p:cSld>
@@ -4931,7 +4891,7 @@
           <p:cNvPr id="2" name="Title 1">
             <a:extLst>
               <a:ext uri="{FF2B5EF4-FFF2-40B4-BE49-F238E27FC236}">
-                <a16:creationId xmlns:a16="http://schemas.microsoft.com/office/drawing/2014/main" id="{A7FB3999-0705-4616-AD41-58E9EC154488}"/>
+                <a16:creationId xmlns:a16="http://schemas.microsoft.com/office/drawing/2014/main" id="{8E9BBA27-5DE1-4A08-BB6E-19568827EB6F}"/>
               </a:ext>
             </a:extLst>
           </p:cNvPr>
@@ -4949,7 +4909,7 @@
           <a:p>
             <a:r>
               <a:rPr lang="en-US" dirty="0"/>
-              <a:t>Demonstration of the game</a:t>
+              <a:t>Bot comparison</a:t>
             </a:r>
             <a:endParaRPr lang="nl-NL" dirty="0"/>
           </a:p>
@@ -4960,7 +4920,7 @@
           <p:cNvPr id="3" name="Content Placeholder 2">
             <a:extLst>
               <a:ext uri="{FF2B5EF4-FFF2-40B4-BE49-F238E27FC236}">
-                <a16:creationId xmlns:a16="http://schemas.microsoft.com/office/drawing/2014/main" id="{BFF78EEC-1C25-4DDF-A5A7-469A17F48E97}"/>
+                <a16:creationId xmlns:a16="http://schemas.microsoft.com/office/drawing/2014/main" id="{BD4E8E8E-4C2D-4DE9-8207-CB24F366E520}"/>
               </a:ext>
             </a:extLst>
           </p:cNvPr>
@@ -4976,19 +4936,46 @@
           <a:bodyPr/>
           <a:lstStyle/>
           <a:p>
+            <a:pPr>
+              <a:buFont typeface="Wingdings" panose="05000000000000000000" pitchFamily="2" charset="2"/>
+              <a:buChar char="v"/>
+            </a:pPr>
             <a:r>
               <a:rPr lang="en-US" dirty="0"/>
-              <a:t>## INSERT VIDEO OF HUMAN PLAYING##</a:t>
-            </a:r>
-          </a:p>
-          <a:p>
-            <a:endParaRPr lang="en-US" dirty="0"/>
-          </a:p>
-          <a:p>
+              <a:t> Calculation speed</a:t>
+            </a:r>
+          </a:p>
+          <a:p>
+            <a:pPr>
+              <a:buFont typeface="Wingdings" panose="05000000000000000000" pitchFamily="2" charset="2"/>
+              <a:buChar char="v"/>
+            </a:pPr>
             <a:r>
               <a:rPr lang="en-US" dirty="0"/>
-              <a:t>## INSERT VIDEO OF BOT PLAYING##</a:t>
-            </a:r>
+              <a:t> Accuracy</a:t>
+            </a:r>
+          </a:p>
+          <a:p>
+            <a:pPr>
+              <a:buFont typeface="Wingdings" panose="05000000000000000000" pitchFamily="2" charset="2"/>
+              <a:buChar char="v"/>
+            </a:pPr>
+            <a:r>
+              <a:rPr lang="en-US" dirty="0"/>
+              <a:t> Versatility </a:t>
+            </a:r>
+          </a:p>
+          <a:p>
+            <a:pPr>
+              <a:buFont typeface="Wingdings" panose="05000000000000000000" pitchFamily="2" charset="2"/>
+              <a:buChar char="v"/>
+            </a:pPr>
+            <a:r>
+              <a:rPr lang="en-US" dirty="0"/>
+              <a:t> Limitations</a:t>
+            </a:r>
+          </a:p>
+          <a:p>
             <a:endParaRPr lang="nl-NL" dirty="0"/>
           </a:p>
         </p:txBody>
@@ -4996,7 +4983,7 @@
     </p:spTree>
     <p:extLst>
       <p:ext uri="{BB962C8B-B14F-4D97-AF65-F5344CB8AC3E}">
-        <p14:creationId xmlns:p14="http://schemas.microsoft.com/office/powerpoint/2010/main" val="149691880"/>
+        <p14:creationId xmlns:p14="http://schemas.microsoft.com/office/powerpoint/2010/main" val="4156753096"/>
       </p:ext>
     </p:extLst>
   </p:cSld>
@@ -5023,160 +5010,68 @@
           <a:chExt cx="0" cy="0"/>
         </a:xfrm>
       </p:grpSpPr>
-      <p:pic>
-        <p:nvPicPr>
-          <p:cNvPr id="4" name="Content Placeholder 3" descr="A picture containing computer, laptop&#10;&#10;Description automatically generated">
+      <p:sp>
+        <p:nvSpPr>
+          <p:cNvPr id="2" name="Title 1">
             <a:extLst>
               <a:ext uri="{FF2B5EF4-FFF2-40B4-BE49-F238E27FC236}">
-                <a16:creationId xmlns:a16="http://schemas.microsoft.com/office/drawing/2014/main" id="{A5DEBA55-50AC-4782-8EDC-AE3B9F1ABD0D}"/>
+                <a16:creationId xmlns:a16="http://schemas.microsoft.com/office/drawing/2014/main" id="{A7FB3999-0705-4616-AD41-58E9EC154488}"/>
               </a:ext>
             </a:extLst>
           </p:cNvPr>
-          <p:cNvPicPr>
-            <a:picLocks noGrp="1" noChangeAspect="1"/>
-          </p:cNvPicPr>
-          <p:nvPr>
-            <p:ph idx="1"/>
-          </p:nvPr>
-        </p:nvPicPr>
-        <p:blipFill rotWithShape="1">
-          <a:blip r:embed="rId3">
-            <a:extLst>
-              <a:ext uri="{28A0092B-C50C-407E-A947-70E740481C1C}">
-                <a14:useLocalDpi xmlns:a14="http://schemas.microsoft.com/office/drawing/2010/main" val="0"/>
-              </a:ext>
-            </a:extLst>
-          </a:blip>
-          <a:srcRect t="1508" r="-2" b="-2"/>
-          <a:stretch/>
-        </p:blipFill>
-        <p:spPr>
-          <a:xfrm>
-            <a:off x="0" y="2413000"/>
-            <a:ext cx="5447538" cy="4028441"/>
-          </a:xfrm>
-          <a:prstGeom prst="rect">
-            <a:avLst/>
-          </a:prstGeom>
-        </p:spPr>
-      </p:pic>
-      <p:pic>
-        <p:nvPicPr>
-          <p:cNvPr id="5" name="Picture 4" descr="A picture containing rope, laying, game&#10;&#10;Description automatically generated">
+          <p:cNvSpPr>
+            <a:spLocks noGrp="1"/>
+          </p:cNvSpPr>
+          <p:nvPr>
+            <p:ph type="title"/>
+          </p:nvPr>
+        </p:nvSpPr>
+        <p:spPr/>
+        <p:txBody>
+          <a:bodyPr/>
+          <a:lstStyle/>
+          <a:p>
+            <a:r>
+              <a:rPr lang="en-US" dirty="0"/>
+              <a:t>Demonstration of the game</a:t>
+            </a:r>
+            <a:endParaRPr lang="nl-NL" dirty="0"/>
+          </a:p>
+        </p:txBody>
+      </p:sp>
+      <p:sp>
+        <p:nvSpPr>
+          <p:cNvPr id="3" name="Content Placeholder 2">
             <a:extLst>
               <a:ext uri="{FF2B5EF4-FFF2-40B4-BE49-F238E27FC236}">
-                <a16:creationId xmlns:a16="http://schemas.microsoft.com/office/drawing/2014/main" id="{486C03D5-2C7D-43E1-ABBB-EA28D03B520C}"/>
+                <a16:creationId xmlns:a16="http://schemas.microsoft.com/office/drawing/2014/main" id="{BFF78EEC-1C25-4DDF-A5A7-469A17F48E97}"/>
               </a:ext>
             </a:extLst>
           </p:cNvPr>
-          <p:cNvPicPr>
-            <a:picLocks noChangeAspect="1"/>
-          </p:cNvPicPr>
-          <p:nvPr/>
-        </p:nvPicPr>
-        <p:blipFill>
-          <a:blip r:embed="rId4"/>
-          <a:stretch>
-            <a:fillRect/>
-          </a:stretch>
-        </p:blipFill>
-        <p:spPr>
-          <a:xfrm>
-            <a:off x="5074712" y="2413000"/>
-            <a:ext cx="7117288" cy="4028441"/>
-          </a:xfrm>
-          <a:prstGeom prst="rect">
-            <a:avLst/>
-          </a:prstGeom>
-        </p:spPr>
-      </p:pic>
-      <p:sp>
-        <p:nvSpPr>
-          <p:cNvPr id="17" name="Title 1">
-            <a:extLst>
-              <a:ext uri="{FF2B5EF4-FFF2-40B4-BE49-F238E27FC236}">
-                <a16:creationId xmlns:a16="http://schemas.microsoft.com/office/drawing/2014/main" id="{DE5CD764-6B13-4ABC-BA4D-884466E1BEC5}"/>
-              </a:ext>
-            </a:extLst>
-          </p:cNvPr>
-          <p:cNvSpPr>
-            <a:spLocks noGrp="1"/>
-          </p:cNvSpPr>
-          <p:nvPr>
-            <p:ph type="title"/>
-          </p:nvPr>
-        </p:nvSpPr>
-        <p:spPr>
-          <a:xfrm>
-            <a:off x="1176907" y="416559"/>
-            <a:ext cx="3093720" cy="1450757"/>
-          </a:xfrm>
-        </p:spPr>
+          <p:cNvSpPr>
+            <a:spLocks noGrp="1"/>
+          </p:cNvSpPr>
+          <p:nvPr>
+            <p:ph idx="1"/>
+          </p:nvPr>
+        </p:nvSpPr>
+        <p:spPr/>
         <p:txBody>
           <a:bodyPr/>
           <a:lstStyle/>
           <a:p>
             <a:r>
               <a:rPr lang="en-US" dirty="0"/>
-              <a:t>Before</a:t>
-            </a:r>
-            <a:endParaRPr lang="nl-NL" dirty="0"/>
-          </a:p>
-        </p:txBody>
-      </p:sp>
-      <p:sp>
-        <p:nvSpPr>
-          <p:cNvPr id="19" name="Title 1">
-            <a:extLst>
-              <a:ext uri="{FF2B5EF4-FFF2-40B4-BE49-F238E27FC236}">
-                <a16:creationId xmlns:a16="http://schemas.microsoft.com/office/drawing/2014/main" id="{6AB58CEF-205E-44E1-B12E-25CC8A34F685}"/>
-              </a:ext>
-            </a:extLst>
-          </p:cNvPr>
-          <p:cNvSpPr txBox="1">
-            <a:spLocks/>
-          </p:cNvSpPr>
-          <p:nvPr/>
-        </p:nvSpPr>
-        <p:spPr>
-          <a:xfrm>
-            <a:off x="7921373" y="416559"/>
-            <a:ext cx="3093720" cy="1450757"/>
-          </a:xfrm>
-          <a:prstGeom prst="rect">
-            <a:avLst/>
-          </a:prstGeom>
-        </p:spPr>
-        <p:txBody>
-          <a:bodyPr vert="horz" lIns="91440" tIns="45720" rIns="91440" bIns="45720" rtlCol="0" anchor="b">
-            <a:normAutofit/>
-          </a:bodyPr>
-          <a:lstStyle>
-            <a:lvl1pPr algn="l" defTabSz="914400" rtl="0" eaLnBrk="1" latinLnBrk="0" hangingPunct="1">
-              <a:lnSpc>
-                <a:spcPct val="90000"/>
-              </a:lnSpc>
-              <a:spcBef>
-                <a:spcPct val="0"/>
-              </a:spcBef>
-              <a:buNone/>
-              <a:defRPr sz="4700" i="0" kern="1200" spc="-50" baseline="0">
-                <a:solidFill>
-                  <a:schemeClr val="tx1">
-                    <a:lumMod val="75000"/>
-                    <a:lumOff val="25000"/>
-                  </a:schemeClr>
-                </a:solidFill>
-                <a:latin typeface="+mj-lt"/>
-                <a:ea typeface="+mj-ea"/>
-                <a:cs typeface="+mj-cs"/>
-              </a:defRPr>
-            </a:lvl1pPr>
-          </a:lstStyle>
+              <a:t>## INSERT VIDEO OF HUMAN PLAYING##</a:t>
+            </a:r>
+          </a:p>
+          <a:p>
+            <a:endParaRPr lang="en-US" dirty="0"/>
+          </a:p>
           <a:p>
             <a:r>
               <a:rPr lang="en-US" dirty="0"/>
-              <a:t>After</a:t>
+              <a:t>## INSERT VIDEO OF BOT PLAYING##</a:t>
             </a:r>
             <a:endParaRPr lang="nl-NL" dirty="0"/>
           </a:p>
@@ -5185,7 +5080,7 @@
     </p:spTree>
     <p:extLst>
       <p:ext uri="{BB962C8B-B14F-4D97-AF65-F5344CB8AC3E}">
-        <p14:creationId xmlns:p14="http://schemas.microsoft.com/office/powerpoint/2010/main" val="3449526681"/>
+        <p14:creationId xmlns:p14="http://schemas.microsoft.com/office/powerpoint/2010/main" val="149691880"/>
       </p:ext>
     </p:extLst>
   </p:cSld>
@@ -5212,15 +5107,82 @@
           <a:chExt cx="0" cy="0"/>
         </a:xfrm>
       </p:grpSpPr>
-      <p:sp>
-        <p:nvSpPr>
-          <p:cNvPr id="2" name="Title 1">
+      <p:pic>
+        <p:nvPicPr>
+          <p:cNvPr id="4" name="Content Placeholder 3" descr="A picture containing computer, laptop&#10;&#10;Description automatically generated">
             <a:extLst>
               <a:ext uri="{FF2B5EF4-FFF2-40B4-BE49-F238E27FC236}">
-                <a16:creationId xmlns:a16="http://schemas.microsoft.com/office/drawing/2014/main" id="{EB7BE5E0-0047-4EE2-82BC-33D53C4C8708}"/>
+                <a16:creationId xmlns:a16="http://schemas.microsoft.com/office/drawing/2014/main" id="{A5DEBA55-50AC-4782-8EDC-AE3B9F1ABD0D}"/>
               </a:ext>
             </a:extLst>
           </p:cNvPr>
+          <p:cNvPicPr>
+            <a:picLocks noGrp="1" noChangeAspect="1"/>
+          </p:cNvPicPr>
+          <p:nvPr>
+            <p:ph idx="1"/>
+          </p:nvPr>
+        </p:nvPicPr>
+        <p:blipFill rotWithShape="1">
+          <a:blip r:embed="rId3">
+            <a:extLst>
+              <a:ext uri="{28A0092B-C50C-407E-A947-70E740481C1C}">
+                <a14:useLocalDpi xmlns:a14="http://schemas.microsoft.com/office/drawing/2010/main" val="0"/>
+              </a:ext>
+            </a:extLst>
+          </a:blip>
+          <a:srcRect t="1508" r="-2" b="-2"/>
+          <a:stretch/>
+        </p:blipFill>
+        <p:spPr>
+          <a:xfrm>
+            <a:off x="0" y="2413000"/>
+            <a:ext cx="5447538" cy="4028441"/>
+          </a:xfrm>
+          <a:prstGeom prst="rect">
+            <a:avLst/>
+          </a:prstGeom>
+        </p:spPr>
+      </p:pic>
+      <p:pic>
+        <p:nvPicPr>
+          <p:cNvPr id="5" name="Picture 4" descr="A picture containing rope, laying, game&#10;&#10;Description automatically generated">
+            <a:extLst>
+              <a:ext uri="{FF2B5EF4-FFF2-40B4-BE49-F238E27FC236}">
+                <a16:creationId xmlns:a16="http://schemas.microsoft.com/office/drawing/2014/main" id="{486C03D5-2C7D-43E1-ABBB-EA28D03B520C}"/>
+              </a:ext>
+            </a:extLst>
+          </p:cNvPr>
+          <p:cNvPicPr>
+            <a:picLocks noChangeAspect="1"/>
+          </p:cNvPicPr>
+          <p:nvPr/>
+        </p:nvPicPr>
+        <p:blipFill>
+          <a:blip r:embed="rId4"/>
+          <a:stretch>
+            <a:fillRect/>
+          </a:stretch>
+        </p:blipFill>
+        <p:spPr>
+          <a:xfrm>
+            <a:off x="5074712" y="2413000"/>
+            <a:ext cx="7117288" cy="4028441"/>
+          </a:xfrm>
+          <a:prstGeom prst="rect">
+            <a:avLst/>
+          </a:prstGeom>
+        </p:spPr>
+      </p:pic>
+      <p:sp>
+        <p:nvSpPr>
+          <p:cNvPr id="17" name="Title 1">
+            <a:extLst>
+              <a:ext uri="{FF2B5EF4-FFF2-40B4-BE49-F238E27FC236}">
+                <a16:creationId xmlns:a16="http://schemas.microsoft.com/office/drawing/2014/main" id="{DE5CD764-6B13-4ABC-BA4D-884466E1BEC5}"/>
+              </a:ext>
+            </a:extLst>
+          </p:cNvPr>
           <p:cNvSpPr>
             <a:spLocks noGrp="1"/>
           </p:cNvSpPr>
@@ -5228,14 +5190,19 @@
             <p:ph type="title"/>
           </p:nvPr>
         </p:nvSpPr>
-        <p:spPr/>
+        <p:spPr>
+          <a:xfrm>
+            <a:off x="1176907" y="416559"/>
+            <a:ext cx="3093720" cy="1450757"/>
+          </a:xfrm>
+        </p:spPr>
         <p:txBody>
           <a:bodyPr/>
           <a:lstStyle/>
           <a:p>
             <a:r>
               <a:rPr lang="en-US" dirty="0"/>
-              <a:t>Phase 3 planning</a:t>
+              <a:t>Before</a:t>
             </a:r>
             <a:endParaRPr lang="nl-NL" dirty="0"/>
           </a:p>
@@ -5243,28 +5210,57 @@
       </p:sp>
       <p:sp>
         <p:nvSpPr>
-          <p:cNvPr id="3" name="Content Placeholder 2">
+          <p:cNvPr id="19" name="Title 1">
             <a:extLst>
               <a:ext uri="{FF2B5EF4-FFF2-40B4-BE49-F238E27FC236}">
-                <a16:creationId xmlns:a16="http://schemas.microsoft.com/office/drawing/2014/main" id="{E8FBA5F1-78D1-47E4-B412-C1E4ACAE1E40}"/>
+                <a16:creationId xmlns:a16="http://schemas.microsoft.com/office/drawing/2014/main" id="{6AB58CEF-205E-44E1-B12E-25CC8A34F685}"/>
               </a:ext>
             </a:extLst>
           </p:cNvPr>
-          <p:cNvSpPr>
-            <a:spLocks noGrp="1"/>
-          </p:cNvSpPr>
-          <p:nvPr>
-            <p:ph idx="1"/>
-          </p:nvPr>
-        </p:nvSpPr>
-        <p:spPr/>
-        <p:txBody>
-          <a:bodyPr/>
-          <a:lstStyle/>
+          <p:cNvSpPr txBox="1">
+            <a:spLocks/>
+          </p:cNvSpPr>
+          <p:nvPr/>
+        </p:nvSpPr>
+        <p:spPr>
+          <a:xfrm>
+            <a:off x="7921373" y="416559"/>
+            <a:ext cx="3093720" cy="1450757"/>
+          </a:xfrm>
+          <a:prstGeom prst="rect">
+            <a:avLst/>
+          </a:prstGeom>
+        </p:spPr>
+        <p:txBody>
+          <a:bodyPr vert="horz" lIns="91440" tIns="45720" rIns="91440" bIns="45720" rtlCol="0" anchor="b">
+            <a:normAutofit/>
+          </a:bodyPr>
+          <a:lstStyle>
+            <a:lvl1pPr algn="l" defTabSz="914400" rtl="0" eaLnBrk="1" latinLnBrk="0" hangingPunct="1">
+              <a:lnSpc>
+                <a:spcPct val="90000"/>
+              </a:lnSpc>
+              <a:spcBef>
+                <a:spcPct val="0"/>
+              </a:spcBef>
+              <a:buNone/>
+              <a:defRPr sz="4700" i="0" kern="1200" spc="-50" baseline="0">
+                <a:solidFill>
+                  <a:schemeClr val="tx1">
+                    <a:lumMod val="75000"/>
+                    <a:lumOff val="25000"/>
+                  </a:schemeClr>
+                </a:solidFill>
+                <a:latin typeface="+mj-lt"/>
+                <a:ea typeface="+mj-ea"/>
+                <a:cs typeface="+mj-cs"/>
+              </a:defRPr>
+            </a:lvl1pPr>
+          </a:lstStyle>
           <a:p>
             <a:r>
               <a:rPr lang="en-US" dirty="0"/>
-              <a:t>##MAKE A DECISION ABOUT WHAT CHALLENGE TO PICK##</a:t>
+              <a:t>After</a:t>
             </a:r>
             <a:endParaRPr lang="nl-NL" dirty="0"/>
           </a:p>
@@ -5273,7 +5269,7 @@
     </p:spTree>
     <p:extLst>
       <p:ext uri="{BB962C8B-B14F-4D97-AF65-F5344CB8AC3E}">
-        <p14:creationId xmlns:p14="http://schemas.microsoft.com/office/powerpoint/2010/main" val="2949224143"/>
+        <p14:creationId xmlns:p14="http://schemas.microsoft.com/office/powerpoint/2010/main" val="3449526681"/>
       </p:ext>
     </p:extLst>
   </p:cSld>
@@ -5305,7 +5301,7 @@
           <p:cNvPr id="2" name="Title 1">
             <a:extLst>
               <a:ext uri="{FF2B5EF4-FFF2-40B4-BE49-F238E27FC236}">
-                <a16:creationId xmlns:a16="http://schemas.microsoft.com/office/drawing/2014/main" id="{9E28273B-A5A7-4D77-A7AD-1FDCD1170D15}"/>
+                <a16:creationId xmlns:a16="http://schemas.microsoft.com/office/drawing/2014/main" id="{EB7BE5E0-0047-4EE2-82BC-33D53C4C8708}"/>
               </a:ext>
             </a:extLst>
           </p:cNvPr>
@@ -5323,7 +5319,7 @@
           <a:p>
             <a:r>
               <a:rPr lang="en-US" dirty="0"/>
-              <a:t>Summary ##REWORD##</a:t>
+              <a:t>Phase 3 planning</a:t>
             </a:r>
             <a:endParaRPr lang="nl-NL" dirty="0"/>
           </a:p>
@@ -5334,7 +5330,7 @@
           <p:cNvPr id="3" name="Content Placeholder 2">
             <a:extLst>
               <a:ext uri="{FF2B5EF4-FFF2-40B4-BE49-F238E27FC236}">
-                <a16:creationId xmlns:a16="http://schemas.microsoft.com/office/drawing/2014/main" id="{5231EE77-30CE-457B-AC6B-CC6F0E1851CD}"/>
+                <a16:creationId xmlns:a16="http://schemas.microsoft.com/office/drawing/2014/main" id="{E8FBA5F1-78D1-47E4-B412-C1E4ACAE1E40}"/>
               </a:ext>
             </a:extLst>
           </p:cNvPr>
@@ -5350,93 +5346,10 @@
           <a:bodyPr/>
           <a:lstStyle/>
           <a:p>
-            <a:pPr marL="457200" indent="-457200">
-              <a:buClrTx/>
-              <a:buFont typeface="+mj-lt"/>
-              <a:buAutoNum type="arabicPeriod"/>
-            </a:pPr>
             <a:r>
               <a:rPr lang="en-US" dirty="0"/>
-              <a:t>Create a new game engine that allows us to do more and to understand the engine better</a:t>
-            </a:r>
-          </a:p>
-          <a:p>
-            <a:pPr marL="457200" indent="-457200">
-              <a:buClrTx/>
-              <a:buFont typeface="+mj-lt"/>
-              <a:buAutoNum type="arabicPeriod"/>
-            </a:pPr>
-            <a:r>
-              <a:rPr lang="en-US" dirty="0"/>
-              <a:t>Improve the way we create the terrain, water and other 3D objects</a:t>
-            </a:r>
-          </a:p>
-          <a:p>
-            <a:pPr marL="457200" indent="-457200">
-              <a:buClrTx/>
-              <a:buFont typeface="+mj-lt"/>
-              <a:buAutoNum type="arabicPeriod"/>
-            </a:pPr>
-            <a:r>
-              <a:rPr lang="en-US" dirty="0"/>
-              <a:t>Improve the structure of the physics engine</a:t>
-            </a:r>
-          </a:p>
-          <a:p>
-            <a:pPr marL="457200" indent="-457200">
-              <a:buClrTx/>
-              <a:buFont typeface="+mj-lt"/>
-              <a:buAutoNum type="arabicPeriod"/>
-            </a:pPr>
-            <a:r>
-              <a:rPr lang="en-US" dirty="0"/>
-              <a:t>Add multiple improved solvers for the physics equations</a:t>
-            </a:r>
-          </a:p>
-          <a:p>
-            <a:pPr marL="457200" indent="-457200">
-              <a:buClrTx/>
-              <a:buFont typeface="+mj-lt"/>
-              <a:buAutoNum type="arabicPeriod"/>
-            </a:pPr>
-            <a:r>
-              <a:rPr lang="en-US" dirty="0"/>
-              <a:t>Make the game properly playable</a:t>
-            </a:r>
-          </a:p>
-          <a:p>
-            <a:pPr marL="457200" indent="-457200">
-              <a:buClrTx/>
-              <a:buFont typeface="+mj-lt"/>
-              <a:buAutoNum type="arabicPeriod"/>
-            </a:pPr>
-            <a:r>
-              <a:rPr lang="en-US" dirty="0"/>
-              <a:t>Create a basic and more advanced AI to play the game</a:t>
-            </a:r>
-          </a:p>
-          <a:p>
-            <a:pPr marL="457200" indent="-457200">
-              <a:buClrTx/>
-              <a:buFont typeface="+mj-lt"/>
-              <a:buAutoNum type="arabicPeriod"/>
-            </a:pPr>
-            <a:endParaRPr lang="en-US" dirty="0"/>
-          </a:p>
-          <a:p>
-            <a:pPr marL="457200" indent="-457200">
-              <a:buClrTx/>
-              <a:buFont typeface="+mj-lt"/>
-              <a:buAutoNum type="arabicPeriod"/>
-            </a:pPr>
-            <a:endParaRPr lang="en-US" dirty="0"/>
-          </a:p>
-          <a:p>
-            <a:pPr marL="457200" indent="-457200">
-              <a:buClrTx/>
-              <a:buFont typeface="+mj-lt"/>
-              <a:buAutoNum type="arabicPeriod"/>
-            </a:pPr>
+              <a:t>##MAKE A DECISION ABOUT WHAT CHALLENGE TO PICK##</a:t>
+            </a:r>
             <a:endParaRPr lang="nl-NL" dirty="0"/>
           </a:p>
         </p:txBody>
@@ -5444,7 +5357,7 @@
     </p:spTree>
     <p:extLst>
       <p:ext uri="{BB962C8B-B14F-4D97-AF65-F5344CB8AC3E}">
-        <p14:creationId xmlns:p14="http://schemas.microsoft.com/office/powerpoint/2010/main" val="3168656213"/>
+        <p14:creationId xmlns:p14="http://schemas.microsoft.com/office/powerpoint/2010/main" val="2949224143"/>
       </p:ext>
     </p:extLst>
   </p:cSld>
@@ -5753,6 +5666,177 @@
 </file>
 
 <file path=ppt/slides/slide3.xml><?xml version="1.0" encoding="utf-8"?>
+<p:sld xmlns:a="http://schemas.openxmlformats.org/drawingml/2006/main" xmlns:r="http://schemas.openxmlformats.org/officeDocument/2006/relationships" xmlns:p="http://schemas.openxmlformats.org/presentationml/2006/main">
+  <p:cSld>
+    <p:spTree>
+      <p:nvGrpSpPr>
+        <p:cNvPr id="1" name=""/>
+        <p:cNvGrpSpPr/>
+        <p:nvPr/>
+      </p:nvGrpSpPr>
+      <p:grpSpPr>
+        <a:xfrm>
+          <a:off x="0" y="0"/>
+          <a:ext cx="0" cy="0"/>
+          <a:chOff x="0" y="0"/>
+          <a:chExt cx="0" cy="0"/>
+        </a:xfrm>
+      </p:grpSpPr>
+      <p:sp>
+        <p:nvSpPr>
+          <p:cNvPr id="2" name="Title 1">
+            <a:extLst>
+              <a:ext uri="{FF2B5EF4-FFF2-40B4-BE49-F238E27FC236}">
+                <a16:creationId xmlns:a16="http://schemas.microsoft.com/office/drawing/2014/main" id="{9E28273B-A5A7-4D77-A7AD-1FDCD1170D15}"/>
+              </a:ext>
+            </a:extLst>
+          </p:cNvPr>
+          <p:cNvSpPr>
+            <a:spLocks noGrp="1"/>
+          </p:cNvSpPr>
+          <p:nvPr>
+            <p:ph type="title"/>
+          </p:nvPr>
+        </p:nvSpPr>
+        <p:spPr/>
+        <p:txBody>
+          <a:bodyPr/>
+          <a:lstStyle/>
+          <a:p>
+            <a:r>
+              <a:rPr lang="en-US" dirty="0"/>
+              <a:t>What we did</a:t>
+            </a:r>
+            <a:endParaRPr lang="nl-NL" dirty="0"/>
+          </a:p>
+        </p:txBody>
+      </p:sp>
+      <p:sp>
+        <p:nvSpPr>
+          <p:cNvPr id="3" name="Content Placeholder 2">
+            <a:extLst>
+              <a:ext uri="{FF2B5EF4-FFF2-40B4-BE49-F238E27FC236}">
+                <a16:creationId xmlns:a16="http://schemas.microsoft.com/office/drawing/2014/main" id="{5231EE77-30CE-457B-AC6B-CC6F0E1851CD}"/>
+              </a:ext>
+            </a:extLst>
+          </p:cNvPr>
+          <p:cNvSpPr>
+            <a:spLocks noGrp="1"/>
+          </p:cNvSpPr>
+          <p:nvPr>
+            <p:ph idx="1"/>
+          </p:nvPr>
+        </p:nvSpPr>
+        <p:spPr/>
+        <p:txBody>
+          <a:bodyPr/>
+          <a:lstStyle/>
+          <a:p>
+            <a:pPr marL="457200" indent="-457200">
+              <a:buClrTx/>
+              <a:buFont typeface="+mj-lt"/>
+              <a:buAutoNum type="arabicPeriod"/>
+            </a:pPr>
+            <a:r>
+              <a:rPr lang="en-US" dirty="0"/>
+              <a:t>Create a new game engine that allows us to do more and to understand the engine better</a:t>
+            </a:r>
+          </a:p>
+          <a:p>
+            <a:pPr marL="457200" indent="-457200">
+              <a:buClrTx/>
+              <a:buFont typeface="+mj-lt"/>
+              <a:buAutoNum type="arabicPeriod"/>
+            </a:pPr>
+            <a:r>
+              <a:rPr lang="en-US" dirty="0"/>
+              <a:t>Improve the way we create the terrain, water and other 3D objects</a:t>
+            </a:r>
+          </a:p>
+          <a:p>
+            <a:pPr marL="457200" indent="-457200">
+              <a:buClrTx/>
+              <a:buFont typeface="+mj-lt"/>
+              <a:buAutoNum type="arabicPeriod"/>
+            </a:pPr>
+            <a:r>
+              <a:rPr lang="en-US" dirty="0"/>
+              <a:t>Improve the structure of the physics engine</a:t>
+            </a:r>
+          </a:p>
+          <a:p>
+            <a:pPr marL="457200" indent="-457200">
+              <a:buClrTx/>
+              <a:buFont typeface="+mj-lt"/>
+              <a:buAutoNum type="arabicPeriod"/>
+            </a:pPr>
+            <a:r>
+              <a:rPr lang="en-US" dirty="0"/>
+              <a:t>Add multiple improved solvers for the physics equations</a:t>
+            </a:r>
+          </a:p>
+          <a:p>
+            <a:pPr marL="457200" indent="-457200">
+              <a:buClrTx/>
+              <a:buFont typeface="+mj-lt"/>
+              <a:buAutoNum type="arabicPeriod"/>
+            </a:pPr>
+            <a:r>
+              <a:rPr lang="en-US" dirty="0"/>
+              <a:t>Make the game properly playable</a:t>
+            </a:r>
+          </a:p>
+          <a:p>
+            <a:pPr marL="457200" indent="-457200">
+              <a:buClrTx/>
+              <a:buFont typeface="+mj-lt"/>
+              <a:buAutoNum type="arabicPeriod"/>
+            </a:pPr>
+            <a:r>
+              <a:rPr lang="en-US" dirty="0"/>
+              <a:t>Create a basic and more advanced AI to play the game</a:t>
+            </a:r>
+          </a:p>
+          <a:p>
+            <a:pPr marL="457200" indent="-457200">
+              <a:buClrTx/>
+              <a:buFont typeface="+mj-lt"/>
+              <a:buAutoNum type="arabicPeriod"/>
+            </a:pPr>
+            <a:endParaRPr lang="en-US" dirty="0"/>
+          </a:p>
+          <a:p>
+            <a:pPr marL="457200" indent="-457200">
+              <a:buClrTx/>
+              <a:buFont typeface="+mj-lt"/>
+              <a:buAutoNum type="arabicPeriod"/>
+            </a:pPr>
+            <a:endParaRPr lang="en-US" dirty="0"/>
+          </a:p>
+          <a:p>
+            <a:pPr marL="457200" indent="-457200">
+              <a:buClrTx/>
+              <a:buFont typeface="+mj-lt"/>
+              <a:buAutoNum type="arabicPeriod"/>
+            </a:pPr>
+            <a:endParaRPr lang="nl-NL" dirty="0"/>
+          </a:p>
+        </p:txBody>
+      </p:sp>
+    </p:spTree>
+    <p:extLst>
+      <p:ext uri="{BB962C8B-B14F-4D97-AF65-F5344CB8AC3E}">
+        <p14:creationId xmlns:p14="http://schemas.microsoft.com/office/powerpoint/2010/main" val="3168656213"/>
+      </p:ext>
+    </p:extLst>
+  </p:cSld>
+  <p:clrMapOvr>
+    <a:masterClrMapping/>
+  </p:clrMapOvr>
+</p:sld>
+</file>
+
+<file path=ppt/slides/slide4.xml><?xml version="1.0" encoding="utf-8"?>
 <p:sld xmlns:a="http://schemas.openxmlformats.org/drawingml/2006/main" xmlns:r="http://schemas.openxmlformats.org/officeDocument/2006/relationships" xmlns:p="http://schemas.openxmlformats.org/presentationml/2006/main">
   <p:cSld>
     <p:spTree>
@@ -6074,7 +6158,7 @@
 </p:sld>
 </file>
 
-<file path=ppt/slides/slide4.xml><?xml version="1.0" encoding="utf-8"?>
+<file path=ppt/slides/slide5.xml><?xml version="1.0" encoding="utf-8"?>
 <p:sld xmlns:a="http://schemas.openxmlformats.org/drawingml/2006/main" xmlns:r="http://schemas.openxmlformats.org/officeDocument/2006/relationships" xmlns:p="http://schemas.openxmlformats.org/presentationml/2006/main">
   <p:cSld>
     <p:bg>
@@ -6551,156 +6635,6 @@
 </p:sld>
 </file>
 
-<file path=ppt/slides/slide5.xml><?xml version="1.0" encoding="utf-8"?>
-<p:sld xmlns:a="http://schemas.openxmlformats.org/drawingml/2006/main" xmlns:r="http://schemas.openxmlformats.org/officeDocument/2006/relationships" xmlns:p="http://schemas.openxmlformats.org/presentationml/2006/main">
-  <p:cSld>
-    <p:spTree>
-      <p:nvGrpSpPr>
-        <p:cNvPr id="1" name=""/>
-        <p:cNvGrpSpPr/>
-        <p:nvPr/>
-      </p:nvGrpSpPr>
-      <p:grpSpPr>
-        <a:xfrm>
-          <a:off x="0" y="0"/>
-          <a:ext cx="0" cy="0"/>
-          <a:chOff x="0" y="0"/>
-          <a:chExt cx="0" cy="0"/>
-        </a:xfrm>
-      </p:grpSpPr>
-      <p:sp>
-        <p:nvSpPr>
-          <p:cNvPr id="2" name="Title 1">
-            <a:extLst>
-              <a:ext uri="{FF2B5EF4-FFF2-40B4-BE49-F238E27FC236}">
-                <a16:creationId xmlns:a16="http://schemas.microsoft.com/office/drawing/2014/main" id="{439ABE64-F951-4A3B-9488-4522144D5827}"/>
-              </a:ext>
-            </a:extLst>
-          </p:cNvPr>
-          <p:cNvSpPr>
-            <a:spLocks noGrp="1"/>
-          </p:cNvSpPr>
-          <p:nvPr>
-            <p:ph type="title"/>
-          </p:nvPr>
-        </p:nvSpPr>
-        <p:spPr/>
-        <p:txBody>
-          <a:bodyPr/>
-          <a:lstStyle/>
-          <a:p>
-            <a:r>
-              <a:rPr lang="en-US" dirty="0"/>
-              <a:t>Our solvers</a:t>
-            </a:r>
-            <a:endParaRPr lang="nl-NL" dirty="0"/>
-          </a:p>
-        </p:txBody>
-      </p:sp>
-      <p:sp>
-        <p:nvSpPr>
-          <p:cNvPr id="3" name="Content Placeholder 2">
-            <a:extLst>
-              <a:ext uri="{FF2B5EF4-FFF2-40B4-BE49-F238E27FC236}">
-                <a16:creationId xmlns:a16="http://schemas.microsoft.com/office/drawing/2014/main" id="{678C0CFD-5A91-4EC8-9C81-632FE3FF7748}"/>
-              </a:ext>
-            </a:extLst>
-          </p:cNvPr>
-          <p:cNvSpPr>
-            <a:spLocks noGrp="1"/>
-          </p:cNvSpPr>
-          <p:nvPr>
-            <p:ph idx="1"/>
-          </p:nvPr>
-        </p:nvSpPr>
-        <p:spPr/>
-        <p:txBody>
-          <a:bodyPr>
-            <a:normAutofit/>
-          </a:bodyPr>
-          <a:lstStyle/>
-          <a:p>
-            <a:r>
-              <a:rPr lang="en-US" dirty="0"/>
-              <a:t>We rewrote the entire physics engine to improve the way it interacts with the rest of the game. We also added 3 new solvers to improve the accuracy of our calculations.</a:t>
-            </a:r>
-          </a:p>
-          <a:p>
-            <a:endParaRPr lang="en-US" dirty="0"/>
-          </a:p>
-          <a:p>
-            <a:pPr>
-              <a:buFont typeface="Wingdings" panose="05000000000000000000" pitchFamily="2" charset="2"/>
-              <a:buChar char="v"/>
-            </a:pPr>
-            <a:r>
-              <a:rPr lang="en-US" dirty="0"/>
-              <a:t> Second order Verlet </a:t>
-            </a:r>
-          </a:p>
-          <a:p>
-            <a:pPr>
-              <a:buFont typeface="Wingdings" panose="05000000000000000000" pitchFamily="2" charset="2"/>
-              <a:buChar char="v"/>
-            </a:pPr>
-            <a:r>
-              <a:rPr lang="en-US" dirty="0"/>
-              <a:t> Second order velocity Verlet</a:t>
-            </a:r>
-          </a:p>
-          <a:p>
-            <a:pPr>
-              <a:buFont typeface="Wingdings" panose="05000000000000000000" pitchFamily="2" charset="2"/>
-              <a:buChar char="v"/>
-            </a:pPr>
-            <a:r>
-              <a:rPr lang="en-US" dirty="0"/>
-              <a:t> 4</a:t>
-            </a:r>
-            <a:r>
-              <a:rPr lang="en-US" baseline="30000" dirty="0"/>
-              <a:t>th</a:t>
-            </a:r>
-            <a:r>
-              <a:rPr lang="en-US" dirty="0"/>
-              <a:t> order Runge-</a:t>
-            </a:r>
-            <a:r>
-              <a:rPr lang="en-US" dirty="0" err="1"/>
-              <a:t>Kutta</a:t>
-            </a:r>
-            <a:endParaRPr lang="en-US" dirty="0"/>
-          </a:p>
-          <a:p>
-            <a:endParaRPr lang="nl-NL" dirty="0"/>
-          </a:p>
-          <a:p>
-            <a:pPr marL="0" indent="0">
-              <a:buNone/>
-            </a:pPr>
-            <a:endParaRPr lang="nl-NL" dirty="0"/>
-          </a:p>
-          <a:p>
-            <a:endParaRPr lang="en-US" dirty="0"/>
-          </a:p>
-          <a:p>
-            <a:endParaRPr lang="nl-NL" dirty="0"/>
-          </a:p>
-        </p:txBody>
-      </p:sp>
-    </p:spTree>
-    <p:extLst>
-      <p:ext uri="{BB962C8B-B14F-4D97-AF65-F5344CB8AC3E}">
-        <p14:creationId xmlns:p14="http://schemas.microsoft.com/office/powerpoint/2010/main" val="423268700"/>
-      </p:ext>
-    </p:extLst>
-  </p:cSld>
-  <p:clrMapOvr>
-    <a:masterClrMapping/>
-  </p:clrMapOvr>
-</p:sld>
-</file>
-
 <file path=ppt/slides/slide6.xml><?xml version="1.0" encoding="utf-8"?>
 <p:sld xmlns:a="http://schemas.openxmlformats.org/drawingml/2006/main" xmlns:r="http://schemas.openxmlformats.org/officeDocument/2006/relationships" xmlns:p="http://schemas.openxmlformats.org/presentationml/2006/main">
   <p:cSld>
@@ -6723,6 +6657,156 @@
           <p:cNvPr id="2" name="Title 1">
             <a:extLst>
               <a:ext uri="{FF2B5EF4-FFF2-40B4-BE49-F238E27FC236}">
+                <a16:creationId xmlns:a16="http://schemas.microsoft.com/office/drawing/2014/main" id="{439ABE64-F951-4A3B-9488-4522144D5827}"/>
+              </a:ext>
+            </a:extLst>
+          </p:cNvPr>
+          <p:cNvSpPr>
+            <a:spLocks noGrp="1"/>
+          </p:cNvSpPr>
+          <p:nvPr>
+            <p:ph type="title"/>
+          </p:nvPr>
+        </p:nvSpPr>
+        <p:spPr/>
+        <p:txBody>
+          <a:bodyPr/>
+          <a:lstStyle/>
+          <a:p>
+            <a:r>
+              <a:rPr lang="en-US" dirty="0"/>
+              <a:t>Our solvers</a:t>
+            </a:r>
+            <a:endParaRPr lang="nl-NL" dirty="0"/>
+          </a:p>
+        </p:txBody>
+      </p:sp>
+      <p:sp>
+        <p:nvSpPr>
+          <p:cNvPr id="3" name="Content Placeholder 2">
+            <a:extLst>
+              <a:ext uri="{FF2B5EF4-FFF2-40B4-BE49-F238E27FC236}">
+                <a16:creationId xmlns:a16="http://schemas.microsoft.com/office/drawing/2014/main" id="{678C0CFD-5A91-4EC8-9C81-632FE3FF7748}"/>
+              </a:ext>
+            </a:extLst>
+          </p:cNvPr>
+          <p:cNvSpPr>
+            <a:spLocks noGrp="1"/>
+          </p:cNvSpPr>
+          <p:nvPr>
+            <p:ph idx="1"/>
+          </p:nvPr>
+        </p:nvSpPr>
+        <p:spPr/>
+        <p:txBody>
+          <a:bodyPr>
+            <a:normAutofit/>
+          </a:bodyPr>
+          <a:lstStyle/>
+          <a:p>
+            <a:r>
+              <a:rPr lang="en-US" dirty="0"/>
+              <a:t>We rewrote the entire physics engine to improve the way it interacts with the rest of the game. We also added 3 new solvers to improve the accuracy of our calculations.</a:t>
+            </a:r>
+          </a:p>
+          <a:p>
+            <a:endParaRPr lang="en-US" dirty="0"/>
+          </a:p>
+          <a:p>
+            <a:pPr>
+              <a:buFont typeface="Wingdings" panose="05000000000000000000" pitchFamily="2" charset="2"/>
+              <a:buChar char="v"/>
+            </a:pPr>
+            <a:r>
+              <a:rPr lang="en-US" dirty="0"/>
+              <a:t> Second order Verlet </a:t>
+            </a:r>
+          </a:p>
+          <a:p>
+            <a:pPr>
+              <a:buFont typeface="Wingdings" panose="05000000000000000000" pitchFamily="2" charset="2"/>
+              <a:buChar char="v"/>
+            </a:pPr>
+            <a:r>
+              <a:rPr lang="en-US" dirty="0"/>
+              <a:t> Second order velocity Verlet</a:t>
+            </a:r>
+          </a:p>
+          <a:p>
+            <a:pPr>
+              <a:buFont typeface="Wingdings" panose="05000000000000000000" pitchFamily="2" charset="2"/>
+              <a:buChar char="v"/>
+            </a:pPr>
+            <a:r>
+              <a:rPr lang="en-US" dirty="0"/>
+              <a:t> 4</a:t>
+            </a:r>
+            <a:r>
+              <a:rPr lang="en-US" baseline="30000" dirty="0"/>
+              <a:t>th</a:t>
+            </a:r>
+            <a:r>
+              <a:rPr lang="en-US" dirty="0"/>
+              <a:t> order Runge-</a:t>
+            </a:r>
+            <a:r>
+              <a:rPr lang="en-US" dirty="0" err="1"/>
+              <a:t>Kutta</a:t>
+            </a:r>
+            <a:endParaRPr lang="en-US" dirty="0"/>
+          </a:p>
+          <a:p>
+            <a:endParaRPr lang="nl-NL" dirty="0"/>
+          </a:p>
+          <a:p>
+            <a:pPr marL="0" indent="0">
+              <a:buNone/>
+            </a:pPr>
+            <a:endParaRPr lang="nl-NL" dirty="0"/>
+          </a:p>
+          <a:p>
+            <a:endParaRPr lang="en-US" dirty="0"/>
+          </a:p>
+          <a:p>
+            <a:endParaRPr lang="nl-NL" dirty="0"/>
+          </a:p>
+        </p:txBody>
+      </p:sp>
+    </p:spTree>
+    <p:extLst>
+      <p:ext uri="{BB962C8B-B14F-4D97-AF65-F5344CB8AC3E}">
+        <p14:creationId xmlns:p14="http://schemas.microsoft.com/office/powerpoint/2010/main" val="423268700"/>
+      </p:ext>
+    </p:extLst>
+  </p:cSld>
+  <p:clrMapOvr>
+    <a:masterClrMapping/>
+  </p:clrMapOvr>
+</p:sld>
+</file>
+
+<file path=ppt/slides/slide7.xml><?xml version="1.0" encoding="utf-8"?>
+<p:sld xmlns:a="http://schemas.openxmlformats.org/drawingml/2006/main" xmlns:r="http://schemas.openxmlformats.org/officeDocument/2006/relationships" xmlns:p="http://schemas.openxmlformats.org/presentationml/2006/main">
+  <p:cSld>
+    <p:spTree>
+      <p:nvGrpSpPr>
+        <p:cNvPr id="1" name=""/>
+        <p:cNvGrpSpPr/>
+        <p:nvPr/>
+      </p:nvGrpSpPr>
+      <p:grpSpPr>
+        <a:xfrm>
+          <a:off x="0" y="0"/>
+          <a:ext cx="0" cy="0"/>
+          <a:chOff x="0" y="0"/>
+          <a:chExt cx="0" cy="0"/>
+        </a:xfrm>
+      </p:grpSpPr>
+      <p:sp>
+        <p:nvSpPr>
+          <p:cNvPr id="2" name="Title 1">
+            <a:extLst>
+              <a:ext uri="{FF2B5EF4-FFF2-40B4-BE49-F238E27FC236}">
                 <a16:creationId xmlns:a16="http://schemas.microsoft.com/office/drawing/2014/main" id="{5FC132AA-6D25-43A2-85C9-4418A09EA0D6}"/>
               </a:ext>
             </a:extLst>
@@ -6825,7 +6909,7 @@
 </p:sld>
 </file>
 
-<file path=ppt/slides/slide7.xml><?xml version="1.0" encoding="utf-8"?>
+<file path=ppt/slides/slide8.xml><?xml version="1.0" encoding="utf-8"?>
 <p:sld xmlns:a="http://schemas.openxmlformats.org/drawingml/2006/main" xmlns:r="http://schemas.openxmlformats.org/officeDocument/2006/relationships" xmlns:p="http://schemas.openxmlformats.org/presentationml/2006/main">
   <p:cSld>
     <p:spTree>
@@ -7241,114 +7325,6 @@
 </p:sld>
 </file>
 
-<file path=ppt/slides/slide8.xml><?xml version="1.0" encoding="utf-8"?>
-<p:sld xmlns:a="http://schemas.openxmlformats.org/drawingml/2006/main" xmlns:r="http://schemas.openxmlformats.org/officeDocument/2006/relationships" xmlns:p="http://schemas.openxmlformats.org/presentationml/2006/main">
-  <p:cSld>
-    <p:spTree>
-      <p:nvGrpSpPr>
-        <p:cNvPr id="1" name=""/>
-        <p:cNvGrpSpPr/>
-        <p:nvPr/>
-      </p:nvGrpSpPr>
-      <p:grpSpPr>
-        <a:xfrm>
-          <a:off x="0" y="0"/>
-          <a:ext cx="0" cy="0"/>
-          <a:chOff x="0" y="0"/>
-          <a:chExt cx="0" cy="0"/>
-        </a:xfrm>
-      </p:grpSpPr>
-      <p:sp>
-        <p:nvSpPr>
-          <p:cNvPr id="2" name="Title 1">
-            <a:extLst>
-              <a:ext uri="{FF2B5EF4-FFF2-40B4-BE49-F238E27FC236}">
-                <a16:creationId xmlns:a16="http://schemas.microsoft.com/office/drawing/2014/main" id="{1C36BFA8-607F-4E4E-83B6-5954DC8395B4}"/>
-              </a:ext>
-            </a:extLst>
-          </p:cNvPr>
-          <p:cNvSpPr>
-            <a:spLocks noGrp="1"/>
-          </p:cNvSpPr>
-          <p:nvPr>
-            <p:ph type="title"/>
-          </p:nvPr>
-        </p:nvSpPr>
-        <p:spPr/>
-        <p:txBody>
-          <a:bodyPr/>
-          <a:lstStyle/>
-          <a:p>
-            <a:r>
-              <a:rPr lang="en-US" dirty="0"/>
-              <a:t>Our bot</a:t>
-            </a:r>
-            <a:endParaRPr lang="nl-NL" dirty="0"/>
-          </a:p>
-        </p:txBody>
-      </p:sp>
-      <p:sp>
-        <p:nvSpPr>
-          <p:cNvPr id="3" name="Content Placeholder 2">
-            <a:extLst>
-              <a:ext uri="{FF2B5EF4-FFF2-40B4-BE49-F238E27FC236}">
-                <a16:creationId xmlns:a16="http://schemas.microsoft.com/office/drawing/2014/main" id="{6686D720-4910-45E7-BDF5-F593F2F92E16}"/>
-              </a:ext>
-            </a:extLst>
-          </p:cNvPr>
-          <p:cNvSpPr>
-            <a:spLocks noGrp="1"/>
-          </p:cNvSpPr>
-          <p:nvPr>
-            <p:ph idx="1"/>
-          </p:nvPr>
-        </p:nvSpPr>
-        <p:spPr/>
-        <p:txBody>
-          <a:bodyPr/>
-          <a:lstStyle/>
-          <a:p>
-            <a:r>
-              <a:rPr lang="en-US" dirty="0"/>
-              <a:t>We have a basic and advanced bot. The basic bot is simple to implement, but limited in capability and the advanced bot is smarter, but hard to implement.</a:t>
-            </a:r>
-          </a:p>
-          <a:p>
-            <a:endParaRPr lang="en-US" dirty="0"/>
-          </a:p>
-          <a:p>
-            <a:r>
-              <a:rPr lang="en-US" dirty="0"/>
-              <a:t>Basic bot ##ADD IMAGE DEMONSTRATING HOW IT WORKS## OR ##text##</a:t>
-            </a:r>
-          </a:p>
-          <a:p>
-            <a:endParaRPr lang="en-US" dirty="0"/>
-          </a:p>
-          <a:p>
-            <a:pPr marL="0" indent="0">
-              <a:buNone/>
-            </a:pPr>
-            <a:endParaRPr lang="en-US" dirty="0"/>
-          </a:p>
-          <a:p>
-            <a:endParaRPr lang="nl-NL" dirty="0"/>
-          </a:p>
-        </p:txBody>
-      </p:sp>
-    </p:spTree>
-    <p:extLst>
-      <p:ext uri="{BB962C8B-B14F-4D97-AF65-F5344CB8AC3E}">
-        <p14:creationId xmlns:p14="http://schemas.microsoft.com/office/powerpoint/2010/main" val="3627781594"/>
-      </p:ext>
-    </p:extLst>
-  </p:cSld>
-  <p:clrMapOvr>
-    <a:masterClrMapping/>
-  </p:clrMapOvr>
-</p:sld>
-</file>
-
 <file path=ppt/slides/slide9.xml><?xml version="1.0" encoding="utf-8"?>
 <p:sld xmlns:a="http://schemas.openxmlformats.org/drawingml/2006/main" xmlns:r="http://schemas.openxmlformats.org/officeDocument/2006/relationships" xmlns:p="http://schemas.openxmlformats.org/presentationml/2006/main">
   <p:cSld>
@@ -7371,7 +7347,7 @@
           <p:cNvPr id="2" name="Title 1">
             <a:extLst>
               <a:ext uri="{FF2B5EF4-FFF2-40B4-BE49-F238E27FC236}">
-                <a16:creationId xmlns:a16="http://schemas.microsoft.com/office/drawing/2014/main" id="{6CE041DE-96AA-4C82-8200-E846B27DFF87}"/>
+                <a16:creationId xmlns:a16="http://schemas.microsoft.com/office/drawing/2014/main" id="{1C36BFA8-607F-4E4E-83B6-5954DC8395B4}"/>
               </a:ext>
             </a:extLst>
           </p:cNvPr>
@@ -7389,7 +7365,7 @@
           <a:p>
             <a:r>
               <a:rPr lang="en-US" dirty="0"/>
-              <a:t>Advanced bot</a:t>
+              <a:t>Our bot</a:t>
             </a:r>
             <a:endParaRPr lang="nl-NL" dirty="0"/>
           </a:p>
@@ -7400,7 +7376,7 @@
           <p:cNvPr id="3" name="Content Placeholder 2">
             <a:extLst>
               <a:ext uri="{FF2B5EF4-FFF2-40B4-BE49-F238E27FC236}">
-                <a16:creationId xmlns:a16="http://schemas.microsoft.com/office/drawing/2014/main" id="{BB3F33E9-7E59-412F-8665-5ECD6D6A4BBF}"/>
+                <a16:creationId xmlns:a16="http://schemas.microsoft.com/office/drawing/2014/main" id="{6686D720-4910-45E7-BDF5-F593F2F92E16}"/>
               </a:ext>
             </a:extLst>
           </p:cNvPr>
@@ -7415,6 +7391,30 @@
         <p:txBody>
           <a:bodyPr/>
           <a:lstStyle/>
+          <a:p>
+            <a:r>
+              <a:rPr lang="en-US" dirty="0"/>
+              <a:t>We have a basic and advanced bot. The basic bot is simple to implement, but limited in capability and the advanced bot is smarter, but hard to implement.</a:t>
+            </a:r>
+          </a:p>
+          <a:p>
+            <a:endParaRPr lang="en-US" dirty="0"/>
+          </a:p>
+          <a:p>
+            <a:r>
+              <a:rPr lang="en-US" dirty="0"/>
+              <a:t>Basic bot ##ADD IMAGE DEMONSTRATING HOW IT WORKS## OR ##text##</a:t>
+            </a:r>
+          </a:p>
+          <a:p>
+            <a:endParaRPr lang="en-US" dirty="0"/>
+          </a:p>
+          <a:p>
+            <a:pPr marL="0" indent="0">
+              <a:buNone/>
+            </a:pPr>
+            <a:endParaRPr lang="en-US" dirty="0"/>
+          </a:p>
           <a:p>
             <a:endParaRPr lang="nl-NL" dirty="0"/>
           </a:p>
@@ -7423,7 +7423,7 @@
     </p:spTree>
     <p:extLst>
       <p:ext uri="{BB962C8B-B14F-4D97-AF65-F5344CB8AC3E}">
-        <p14:creationId xmlns:p14="http://schemas.microsoft.com/office/powerpoint/2010/main" val="4033623988"/>
+        <p14:creationId xmlns:p14="http://schemas.microsoft.com/office/powerpoint/2010/main" val="3627781594"/>
       </p:ext>
     </p:extLst>
   </p:cSld>
@@ -8055,15 +8055,6 @@
 </file>
 
 <file path=customXml/item1.xml><?xml version="1.0" encoding="utf-8"?>
-<p:properties xmlns:p="http://schemas.microsoft.com/office/2006/metadata/properties" xmlns:xsi="http://www.w3.org/2001/XMLSchema-instance" xmlns:pc="http://schemas.microsoft.com/office/infopath/2007/PartnerControls">
-  <documentManagement>
-    <Status xmlns="71af3243-3dd4-4a8d-8c0d-dd76da1f02a5">Not started</Status>
-    <MediaServiceKeyPoints xmlns="71af3243-3dd4-4a8d-8c0d-dd76da1f02a5" xsi:nil="true"/>
-  </documentManagement>
-</p:properties>
-</file>
-
-<file path=customXml/item2.xml><?xml version="1.0" encoding="utf-8"?>
 <ct:contentTypeSchema xmlns:ct="http://schemas.microsoft.com/office/2006/metadata/contentType" xmlns:ma="http://schemas.microsoft.com/office/2006/metadata/properties/metaAttributes" ct:_="" ma:_="" ma:contentTypeName="Document" ma:contentTypeID="0x01010079F111ED35F8CC479449609E8A0923A6" ma:contentTypeVersion="12" ma:contentTypeDescription="Create a new document." ma:contentTypeScope="" ma:versionID="a410dd7f93c95333ffa1b60ed6adedd1">
   <xsd:schema xmlns:xsd="http://www.w3.org/2001/XMLSchema" xmlns:xs="http://www.w3.org/2001/XMLSchema" xmlns:p="http://schemas.microsoft.com/office/2006/metadata/properties" xmlns:ns2="71af3243-3dd4-4a8d-8c0d-dd76da1f02a5" xmlns:ns3="16c05727-aa75-4e4a-9b5f-8a80a1165891" targetNamespace="http://schemas.microsoft.com/office/2006/metadata/properties" ma:root="true" ma:fieldsID="a936d9baba76aa3866493feff160faab" ns2:_="" ns3:_="">
     <xsd:import namespace="71af3243-3dd4-4a8d-8c0d-dd76da1f02a5"/>
@@ -8284,6 +8275,15 @@
 </ct:contentTypeSchema>
 </file>
 
+<file path=customXml/item2.xml><?xml version="1.0" encoding="utf-8"?>
+<p:properties xmlns:p="http://schemas.microsoft.com/office/2006/metadata/properties" xmlns:xsi="http://www.w3.org/2001/XMLSchema-instance" xmlns:pc="http://schemas.microsoft.com/office/infopath/2007/PartnerControls">
+  <documentManagement>
+    <Status xmlns="71af3243-3dd4-4a8d-8c0d-dd76da1f02a5">Not started</Status>
+    <MediaServiceKeyPoints xmlns="71af3243-3dd4-4a8d-8c0d-dd76da1f02a5" xsi:nil="true"/>
+  </documentManagement>
+</p:properties>
+</file>
+
 <file path=customXml/item3.xml><?xml version="1.0" encoding="utf-8"?>
 <?mso-contentType ?>
 <FormTemplates xmlns="http://schemas.microsoft.com/sharepoint/v3/contenttype/forms">
@@ -8294,16 +8294,6 @@
 </file>
 
 <file path=customXml/itemProps1.xml><?xml version="1.0" encoding="utf-8"?>
-<ds:datastoreItem xmlns:ds="http://schemas.openxmlformats.org/officeDocument/2006/customXml" ds:itemID="{626E351D-C19B-467F-A5C7-085C4CECACA9}">
-  <ds:schemaRefs>
-    <ds:schemaRef ds:uri="http://schemas.microsoft.com/office/2006/metadata/properties"/>
-    <ds:schemaRef ds:uri="http://schemas.microsoft.com/office/infopath/2007/PartnerControls"/>
-    <ds:schemaRef ds:uri="71af3243-3dd4-4a8d-8c0d-dd76da1f02a5"/>
-  </ds:schemaRefs>
-</ds:datastoreItem>
-</file>
-
-<file path=customXml/itemProps2.xml><?xml version="1.0" encoding="utf-8"?>
 <ds:datastoreItem xmlns:ds="http://schemas.openxmlformats.org/officeDocument/2006/customXml" ds:itemID="{6E499CE6-06FC-4D3E-8B56-30558CC9D1A4}">
   <ds:schemaRefs>
     <ds:schemaRef ds:uri="http://schemas.microsoft.com/office/2006/metadata/contentType"/>
@@ -8322,6 +8312,16 @@
 </ds:datastoreItem>
 </file>
 
+<file path=customXml/itemProps2.xml><?xml version="1.0" encoding="utf-8"?>
+<ds:datastoreItem xmlns:ds="http://schemas.openxmlformats.org/officeDocument/2006/customXml" ds:itemID="{626E351D-C19B-467F-A5C7-085C4CECACA9}">
+  <ds:schemaRefs>
+    <ds:schemaRef ds:uri="http://schemas.microsoft.com/office/2006/metadata/properties"/>
+    <ds:schemaRef ds:uri="http://schemas.microsoft.com/office/infopath/2007/PartnerControls"/>
+    <ds:schemaRef ds:uri="71af3243-3dd4-4a8d-8c0d-dd76da1f02a5"/>
+  </ds:schemaRefs>
+</ds:datastoreItem>
+</file>
+
 <file path=customXml/itemProps3.xml><?xml version="1.0" encoding="utf-8"?>
 <ds:datastoreItem xmlns:ds="http://schemas.openxmlformats.org/officeDocument/2006/customXml" ds:itemID="{3C586965-D4BF-4605-8C1C-5B8CCCAB7737}">
   <ds:schemaRefs>

</xml_diff>

<commit_message>
Presentation: added advanced topics for phase 3
</commit_message>
<xml_diff>
--- a/Crazy Putting phase 2.pptx
+++ b/Crazy Putting phase 2.pptx
@@ -23,7 +23,7 @@
     <p:sldId id="303" r:id="rId17"/>
     <p:sldId id="292" r:id="rId18"/>
     <p:sldId id="300" r:id="rId19"/>
-    <p:sldId id="302" r:id="rId20"/>
+    <p:sldId id="306" r:id="rId20"/>
     <p:sldId id="295" r:id="rId21"/>
     <p:sldId id="287" r:id="rId22"/>
   </p:sldIdLst>
@@ -217,7 +217,7 @@
           <a:p>
             <a:fld id="{05052211-91C2-4B5D-9566-2C0C10015937}" type="datetimeFigureOut">
               <a:rPr lang="nl-NL" smtClean="0"/>
-              <a:t>12-5-2020</a:t>
+              <a:t>15-5-2020</a:t>
             </a:fld>
             <a:endParaRPr lang="nl-NL"/>
           </a:p>
@@ -376,7 +376,7 @@
           <a:p>
             <a:fld id="{F917F88C-BACD-4A94-B7B7-C91B49D4CB7C}" type="slidenum">
               <a:rPr lang="nl-NL" smtClean="0"/>
-              <a:t>‹nr.›</a:t>
+              <a:t>‹#›</a:t>
             </a:fld>
             <a:endParaRPr lang="nl-NL"/>
           </a:p>
@@ -1420,7 +1420,7 @@
           <a:p>
             <a:fld id="{9184DA70-C731-4C70-880D-CCD4705E623C}" type="datetime1">
               <a:rPr lang="en-US" smtClean="0"/>
-              <a:t>5/12/2020</a:t>
+              <a:t>5/15/2020</a:t>
             </a:fld>
             <a:endParaRPr lang="en-US" dirty="0"/>
           </a:p>
@@ -1474,7 +1474,7 @@
           <a:p>
             <a:fld id="{3A98EE3D-8CD1-4C3F-BD1C-C98C9596463C}" type="slidenum">
               <a:rPr lang="en-US" smtClean="0"/>
-              <a:t>‹nr.›</a:t>
+              <a:t>‹#›</a:t>
             </a:fld>
             <a:endParaRPr lang="en-US" dirty="0"/>
           </a:p>
@@ -1608,7 +1608,7 @@
           <a:p>
             <a:fld id="{4BE1D723-8F53-4F53-90B0-1982A396982E}" type="datetime1">
               <a:rPr lang="en-US" smtClean="0"/>
-              <a:t>5/12/2020</a:t>
+              <a:t>5/15/2020</a:t>
             </a:fld>
             <a:endParaRPr lang="en-US" dirty="0"/>
           </a:p>
@@ -1662,7 +1662,7 @@
           <a:p>
             <a:fld id="{3A98EE3D-8CD1-4C3F-BD1C-C98C9596463C}" type="slidenum">
               <a:rPr lang="en-US" smtClean="0"/>
-              <a:t>‹nr.›</a:t>
+              <a:t>‹#›</a:t>
             </a:fld>
             <a:endParaRPr lang="en-US" dirty="0"/>
           </a:p>
@@ -1981,7 +1981,7 @@
           <a:p>
             <a:fld id="{97669AF7-7BEB-44E4-9852-375E34362B5B}" type="datetime1">
               <a:rPr lang="en-US" smtClean="0"/>
-              <a:t>5/12/2020</a:t>
+              <a:t>5/15/2020</a:t>
             </a:fld>
             <a:endParaRPr lang="en-US" dirty="0"/>
           </a:p>
@@ -2035,7 +2035,7 @@
           <a:p>
             <a:fld id="{3A98EE3D-8CD1-4C3F-BD1C-C98C9596463C}" type="slidenum">
               <a:rPr lang="en-US" smtClean="0"/>
-              <a:t>‹nr.›</a:t>
+              <a:t>‹#›</a:t>
             </a:fld>
             <a:endParaRPr lang="en-US" dirty="0"/>
           </a:p>
@@ -2236,7 +2236,7 @@
           <a:p>
             <a:fld id="{BAAAC38D-0552-4C82-B593-E6124DFADBE2}" type="datetime1">
               <a:rPr lang="en-US" smtClean="0"/>
-              <a:t>5/12/2020</a:t>
+              <a:t>5/15/2020</a:t>
             </a:fld>
             <a:endParaRPr lang="en-US" dirty="0"/>
           </a:p>
@@ -2290,7 +2290,7 @@
           <a:p>
             <a:fld id="{3A98EE3D-8CD1-4C3F-BD1C-C98C9596463C}" type="slidenum">
               <a:rPr lang="en-US" smtClean="0"/>
-              <a:t>‹nr.›</a:t>
+              <a:t>‹#›</a:t>
             </a:fld>
             <a:endParaRPr lang="en-US" dirty="0"/>
           </a:p>
@@ -2633,7 +2633,7 @@
           <a:p>
             <a:fld id="{D9DF0F1C-5577-4ACB-BB62-DF8F3C494C7E}" type="datetime1">
               <a:rPr lang="en-US" smtClean="0"/>
-              <a:t>5/12/2020</a:t>
+              <a:t>5/15/2020</a:t>
             </a:fld>
             <a:endParaRPr lang="en-US" dirty="0"/>
           </a:p>
@@ -2687,7 +2687,7 @@
           <a:p>
             <a:fld id="{3A98EE3D-8CD1-4C3F-BD1C-C98C9596463C}" type="slidenum">
               <a:rPr lang="en-US" smtClean="0"/>
-              <a:t>‹nr.›</a:t>
+              <a:t>‹#›</a:t>
             </a:fld>
             <a:endParaRPr lang="en-US" dirty="0"/>
           </a:p>
@@ -2769,7 +2769,7 @@
           <a:p>
             <a:fld id="{1775B394-D9F9-4F0C-B15D-605F45CB9E9F}" type="datetime1">
               <a:rPr lang="en-US" smtClean="0"/>
-              <a:t>5/12/2020</a:t>
+              <a:t>5/15/2020</a:t>
             </a:fld>
             <a:endParaRPr lang="en-US" dirty="0"/>
           </a:p>
@@ -2823,7 +2823,7 @@
           <a:p>
             <a:fld id="{3A98EE3D-8CD1-4C3F-BD1C-C98C9596463C}" type="slidenum">
               <a:rPr lang="en-US" smtClean="0"/>
-              <a:t>‹nr.›</a:t>
+              <a:t>‹#›</a:t>
             </a:fld>
             <a:endParaRPr lang="en-US" dirty="0"/>
           </a:p>
@@ -2926,7 +2926,7 @@
           <a:p>
             <a:fld id="{39667345-2558-425A-8533-9BFDBCE15005}" type="datetime1">
               <a:rPr lang="en-US" smtClean="0"/>
-              <a:t>5/12/2020</a:t>
+              <a:t>5/15/2020</a:t>
             </a:fld>
             <a:endParaRPr lang="en-US" dirty="0"/>
           </a:p>
@@ -2980,7 +2980,7 @@
           <a:p>
             <a:fld id="{3A98EE3D-8CD1-4C3F-BD1C-C98C9596463C}" type="slidenum">
               <a:rPr lang="en-US" smtClean="0"/>
-              <a:t>‹nr.›</a:t>
+              <a:t>‹#›</a:t>
             </a:fld>
             <a:endParaRPr lang="en-US" dirty="0"/>
           </a:p>
@@ -3255,7 +3255,7 @@
           <a:p>
             <a:fld id="{92BEA474-078D-4E9B-9B14-09A87B19DC46}" type="datetime1">
               <a:rPr lang="en-US" smtClean="0"/>
-              <a:t>5/12/2020</a:t>
+              <a:t>5/15/2020</a:t>
             </a:fld>
             <a:endParaRPr lang="en-US" dirty="0"/>
           </a:p>
@@ -3319,7 +3319,7 @@
             <a:fld id="{3A98EE3D-8CD1-4C3F-BD1C-C98C9596463C}" type="slidenum">
               <a:rPr lang="en-US" smtClean="0"/>
               <a:pPr/>
-              <a:t>‹nr.›</a:t>
+              <a:t>‹#›</a:t>
             </a:fld>
             <a:endParaRPr lang="en-US" dirty="0"/>
           </a:p>
@@ -3605,7 +3605,7 @@
           <a:p>
             <a:fld id="{4907D986-8816-4272-A432-0437A28A9828}" type="datetime1">
               <a:rPr lang="en-US" smtClean="0"/>
-              <a:t>5/12/2020</a:t>
+              <a:t>5/15/2020</a:t>
             </a:fld>
             <a:endParaRPr lang="en-US" dirty="0"/>
           </a:p>
@@ -3653,7 +3653,7 @@
           <a:p>
             <a:fld id="{3A98EE3D-8CD1-4C3F-BD1C-C98C9596463C}" type="slidenum">
               <a:rPr lang="en-US" smtClean="0"/>
-              <a:t>‹nr.›</a:t>
+              <a:t>‹#›</a:t>
             </a:fld>
             <a:endParaRPr lang="en-US" dirty="0"/>
           </a:p>
@@ -3866,7 +3866,7 @@
           <a:p>
             <a:fld id="{62D6E202-B606-4609-B914-27C9371A1F6D}" type="datetime1">
               <a:rPr lang="en-US" smtClean="0"/>
-              <a:t>5/12/2020</a:t>
+              <a:t>5/15/2020</a:t>
             </a:fld>
             <a:endParaRPr lang="en-US" dirty="0"/>
           </a:p>
@@ -3940,7 +3940,7 @@
           <a:p>
             <a:fld id="{3A98EE3D-8CD1-4C3F-BD1C-C98C9596463C}" type="slidenum">
               <a:rPr lang="en-US" smtClean="0"/>
-              <a:t>‹nr.›</a:t>
+              <a:t>‹#›</a:t>
             </a:fld>
             <a:endParaRPr lang="en-US" dirty="0"/>
           </a:p>
@@ -6021,7 +6021,7 @@
           <a:p>
             <a:r>
               <a:rPr lang="en-US" dirty="0"/>
-              <a:t>Phase 3 planning</a:t>
+              <a:t>Phase 3 advanced topics</a:t>
             </a:r>
             <a:endParaRPr lang="nl-NL" dirty="0"/>
           </a:p>
@@ -6050,7 +6050,19 @@
           <a:p>
             <a:r>
               <a:rPr lang="en-US" dirty="0"/>
-              <a:t>##MAKE A DECISION ABOUT WHAT CHALLENGE TO PICK##</a:t>
+              <a:t>1. Having a random error in the initial position and velocity of the ball, including an analysis of the impact on the bot’s performance</a:t>
+            </a:r>
+          </a:p>
+          <a:p>
+            <a:r>
+              <a:rPr lang="en-US" dirty="0"/>
+              <a:t>2. Handling different (unknown) coefficients of friction and making sure the bot can handle them.</a:t>
+            </a:r>
+          </a:p>
+          <a:p>
+            <a:r>
+              <a:rPr lang="en-US" dirty="0"/>
+              <a:t>3. Allow for balls that can both fly and bounce, as well as improvements to the bot so it can handle these new options.</a:t>
             </a:r>
             <a:endParaRPr lang="nl-NL" dirty="0"/>
           </a:p>
@@ -6059,7 +6071,7 @@
     </p:spTree>
     <p:extLst>
       <p:ext uri="{BB962C8B-B14F-4D97-AF65-F5344CB8AC3E}">
-        <p14:creationId xmlns:p14="http://schemas.microsoft.com/office/powerpoint/2010/main" val="2949224143"/>
+        <p14:creationId xmlns:p14="http://schemas.microsoft.com/office/powerpoint/2010/main" val="2854100558"/>
       </p:ext>
     </p:extLst>
   </p:cSld>
@@ -7669,8 +7681,8 @@
           </a:p>
         </p:txBody>
       </p:sp>
-      <mc:AlternateContent xmlns:mc="http://schemas.openxmlformats.org/markup-compatibility/2006">
-        <mc:Choice xmlns:a14="http://schemas.microsoft.com/office/drawing/2010/main" Requires="a14">
+      <mc:AlternateContent xmlns:mc="http://schemas.openxmlformats.org/markup-compatibility/2006" xmlns:a14="http://schemas.microsoft.com/office/drawing/2010/main">
+        <mc:Choice Requires="a14">
           <p:sp>
             <p:nvSpPr>
               <p:cNvPr id="3" name="Content Placeholder 2">
@@ -8150,7 +8162,7 @@
             </p:txBody>
           </p:sp>
         </mc:Choice>
-        <mc:Fallback>
+        <mc:Fallback xmlns="">
           <p:sp>
             <p:nvSpPr>
               <p:cNvPr id="3" name="Content Placeholder 2">
@@ -8268,8 +8280,8 @@
           </a:p>
         </p:txBody>
       </p:sp>
-      <mc:AlternateContent xmlns:mc="http://schemas.openxmlformats.org/markup-compatibility/2006">
-        <mc:Choice xmlns:a14="http://schemas.microsoft.com/office/drawing/2010/main" Requires="a14">
+      <mc:AlternateContent xmlns:mc="http://schemas.openxmlformats.org/markup-compatibility/2006" xmlns:a14="http://schemas.microsoft.com/office/drawing/2010/main">
+        <mc:Choice Requires="a14">
           <p:sp>
             <p:nvSpPr>
               <p:cNvPr id="3" name="Content Placeholder 2">
@@ -8977,7 +8989,7 @@
             </p:txBody>
           </p:sp>
         </mc:Choice>
-        <mc:Fallback>
+        <mc:Fallback xmlns="">
           <p:sp>
             <p:nvSpPr>
               <p:cNvPr id="3" name="Content Placeholder 2">
@@ -9095,8 +9107,8 @@
           </a:p>
         </p:txBody>
       </p:sp>
-      <mc:AlternateContent xmlns:mc="http://schemas.openxmlformats.org/markup-compatibility/2006">
-        <mc:Choice xmlns:a14="http://schemas.microsoft.com/office/drawing/2010/main" Requires="a14">
+      <mc:AlternateContent xmlns:mc="http://schemas.openxmlformats.org/markup-compatibility/2006" xmlns:a14="http://schemas.microsoft.com/office/drawing/2010/main">
+        <mc:Choice Requires="a14">
           <p:sp>
             <p:nvSpPr>
               <p:cNvPr id="3" name="Content Placeholder 2">
@@ -10721,7 +10733,7 @@
             </p:txBody>
           </p:sp>
         </mc:Choice>
-        <mc:Fallback>
+        <mc:Fallback xmlns="">
           <p:sp>
             <p:nvSpPr>
               <p:cNvPr id="3" name="Content Placeholder 2">
@@ -11405,15 +11417,6 @@
 </file>
 
 <file path=customXml/item2.xml><?xml version="1.0" encoding="utf-8"?>
-<p:properties xmlns:p="http://schemas.microsoft.com/office/2006/metadata/properties" xmlns:xsi="http://www.w3.org/2001/XMLSchema-instance" xmlns:pc="http://schemas.microsoft.com/office/infopath/2007/PartnerControls">
-  <documentManagement>
-    <Status xmlns="71af3243-3dd4-4a8d-8c0d-dd76da1f02a5">Not started</Status>
-    <MediaServiceKeyPoints xmlns="71af3243-3dd4-4a8d-8c0d-dd76da1f02a5" xsi:nil="true"/>
-  </documentManagement>
-</p:properties>
-</file>
-
-<file path=customXml/item3.xml><?xml version="1.0" encoding="utf-8"?>
 <ct:contentTypeSchema xmlns:ct="http://schemas.microsoft.com/office/2006/metadata/contentType" xmlns:ma="http://schemas.microsoft.com/office/2006/metadata/properties/metaAttributes" ct:_="" ma:_="" ma:contentTypeName="Document" ma:contentTypeID="0x01010079F111ED35F8CC479449609E8A0923A6" ma:contentTypeVersion="12" ma:contentTypeDescription="Create a new document." ma:contentTypeScope="" ma:versionID="a410dd7f93c95333ffa1b60ed6adedd1">
   <xsd:schema xmlns:xsd="http://www.w3.org/2001/XMLSchema" xmlns:xs="http://www.w3.org/2001/XMLSchema" xmlns:p="http://schemas.microsoft.com/office/2006/metadata/properties" xmlns:ns2="71af3243-3dd4-4a8d-8c0d-dd76da1f02a5" xmlns:ns3="16c05727-aa75-4e4a-9b5f-8a80a1165891" targetNamespace="http://schemas.microsoft.com/office/2006/metadata/properties" ma:root="true" ma:fieldsID="a936d9baba76aa3866493feff160faab" ns2:_="" ns3:_="">
     <xsd:import namespace="71af3243-3dd4-4a8d-8c0d-dd76da1f02a5"/>
@@ -11634,6 +11637,15 @@
 </ct:contentTypeSchema>
 </file>
 
+<file path=customXml/item3.xml><?xml version="1.0" encoding="utf-8"?>
+<p:properties xmlns:p="http://schemas.microsoft.com/office/2006/metadata/properties" xmlns:xsi="http://www.w3.org/2001/XMLSchema-instance" xmlns:pc="http://schemas.microsoft.com/office/infopath/2007/PartnerControls">
+  <documentManagement>
+    <Status xmlns="71af3243-3dd4-4a8d-8c0d-dd76da1f02a5">Not started</Status>
+    <MediaServiceKeyPoints xmlns="71af3243-3dd4-4a8d-8c0d-dd76da1f02a5" xsi:nil="true"/>
+  </documentManagement>
+</p:properties>
+</file>
+
 <file path=customXml/itemProps1.xml><?xml version="1.0" encoding="utf-8"?>
 <ds:datastoreItem xmlns:ds="http://schemas.openxmlformats.org/officeDocument/2006/customXml" ds:itemID="{3C586965-D4BF-4605-8C1C-5B8CCCAB7737}">
   <ds:schemaRefs>
@@ -11643,16 +11655,6 @@
 </file>
 
 <file path=customXml/itemProps2.xml><?xml version="1.0" encoding="utf-8"?>
-<ds:datastoreItem xmlns:ds="http://schemas.openxmlformats.org/officeDocument/2006/customXml" ds:itemID="{626E351D-C19B-467F-A5C7-085C4CECACA9}">
-  <ds:schemaRefs>
-    <ds:schemaRef ds:uri="http://schemas.microsoft.com/office/2006/metadata/properties"/>
-    <ds:schemaRef ds:uri="http://schemas.microsoft.com/office/infopath/2007/PartnerControls"/>
-    <ds:schemaRef ds:uri="71af3243-3dd4-4a8d-8c0d-dd76da1f02a5"/>
-  </ds:schemaRefs>
-</ds:datastoreItem>
-</file>
-
-<file path=customXml/itemProps3.xml><?xml version="1.0" encoding="utf-8"?>
 <ds:datastoreItem xmlns:ds="http://schemas.openxmlformats.org/officeDocument/2006/customXml" ds:itemID="{6E499CE6-06FC-4D3E-8B56-30558CC9D1A4}">
   <ds:schemaRefs>
     <ds:schemaRef ds:uri="http://schemas.microsoft.com/office/2006/metadata/contentType"/>
@@ -11669,4 +11671,14 @@
     <ds:schemaRef ds:uri="http://schemas.microsoft.com/internal/obd"/>
   </ds:schemaRefs>
 </ds:datastoreItem>
+</file>
+
+<file path=customXml/itemProps3.xml><?xml version="1.0" encoding="utf-8"?>
+<ds:datastoreItem xmlns:ds="http://schemas.openxmlformats.org/officeDocument/2006/customXml" ds:itemID="{626E351D-C19B-467F-A5C7-085C4CECACA9}">
+  <ds:schemaRefs>
+    <ds:schemaRef ds:uri="http://schemas.microsoft.com/office/2006/metadata/properties"/>
+    <ds:schemaRef ds:uri="http://schemas.microsoft.com/office/infopath/2007/PartnerControls"/>
+    <ds:schemaRef ds:uri="71af3243-3dd4-4a8d-8c0d-dd76da1f02a5"/>
+  </ds:schemaRefs>
+</ds:datastoreItem>
 </file>
</xml_diff>

<commit_message>
Update of the presentation with the basic bot slide
</commit_message>
<xml_diff>
--- a/Crazy Putting phase 2.pptx
+++ b/Crazy Putting phase 2.pptx
@@ -5,7 +5,7 @@
     <p:sldMasterId id="2147483660" r:id="rId4"/>
   </p:sldMasterIdLst>
   <p:notesMasterIdLst>
-    <p:notesMasterId r:id="rId23"/>
+    <p:notesMasterId r:id="rId25"/>
   </p:notesMasterIdLst>
   <p:sldIdLst>
     <p:sldId id="265" r:id="rId5"/>
@@ -19,13 +19,15 @@
     <p:sldId id="305" r:id="rId13"/>
     <p:sldId id="298" r:id="rId14"/>
     <p:sldId id="294" r:id="rId15"/>
-    <p:sldId id="299" r:id="rId16"/>
-    <p:sldId id="303" r:id="rId17"/>
-    <p:sldId id="292" r:id="rId18"/>
-    <p:sldId id="300" r:id="rId19"/>
-    <p:sldId id="302" r:id="rId20"/>
-    <p:sldId id="295" r:id="rId21"/>
-    <p:sldId id="287" r:id="rId22"/>
+    <p:sldId id="306" r:id="rId16"/>
+    <p:sldId id="307" r:id="rId17"/>
+    <p:sldId id="299" r:id="rId18"/>
+    <p:sldId id="303" r:id="rId19"/>
+    <p:sldId id="292" r:id="rId20"/>
+    <p:sldId id="300" r:id="rId21"/>
+    <p:sldId id="302" r:id="rId22"/>
+    <p:sldId id="295" r:id="rId23"/>
+    <p:sldId id="287" r:id="rId24"/>
   </p:sldIdLst>
   <p:sldSz cx="12192000" cy="6858000"/>
   <p:notesSz cx="6858000" cy="9144000"/>
@@ -217,7 +219,7 @@
           <a:p>
             <a:fld id="{05052211-91C2-4B5D-9566-2C0C10015937}" type="datetimeFigureOut">
               <a:rPr lang="nl-NL" smtClean="0"/>
-              <a:t>12-5-2020</a:t>
+              <a:t>15-05-2020</a:t>
             </a:fld>
             <a:endParaRPr lang="nl-NL"/>
           </a:p>
@@ -376,7 +378,7 @@
           <a:p>
             <a:fld id="{F917F88C-BACD-4A94-B7B7-C91B49D4CB7C}" type="slidenum">
               <a:rPr lang="nl-NL" smtClean="0"/>
-              <a:t>‹nr.›</a:t>
+              <a:t>‹#›</a:t>
             </a:fld>
             <a:endParaRPr lang="nl-NL"/>
           </a:p>
@@ -1073,7 +1075,7 @@
           <a:p>
             <a:fld id="{F917F88C-BACD-4A94-B7B7-C91B49D4CB7C}" type="slidenum">
               <a:rPr lang="nl-NL" smtClean="0"/>
-              <a:t>15</a:t>
+              <a:t>17</a:t>
             </a:fld>
             <a:endParaRPr lang="nl-NL"/>
           </a:p>
@@ -1157,7 +1159,7 @@
           <a:p>
             <a:fld id="{F917F88C-BACD-4A94-B7B7-C91B49D4CB7C}" type="slidenum">
               <a:rPr lang="nl-NL" smtClean="0"/>
-              <a:t>18</a:t>
+              <a:t>20</a:t>
             </a:fld>
             <a:endParaRPr lang="nl-NL"/>
           </a:p>
@@ -1420,7 +1422,7 @@
           <a:p>
             <a:fld id="{9184DA70-C731-4C70-880D-CCD4705E623C}" type="datetime1">
               <a:rPr lang="en-US" smtClean="0"/>
-              <a:t>5/12/2020</a:t>
+              <a:t>5/15/20</a:t>
             </a:fld>
             <a:endParaRPr lang="en-US" dirty="0"/>
           </a:p>
@@ -1474,7 +1476,7 @@
           <a:p>
             <a:fld id="{3A98EE3D-8CD1-4C3F-BD1C-C98C9596463C}" type="slidenum">
               <a:rPr lang="en-US" smtClean="0"/>
-              <a:t>‹nr.›</a:t>
+              <a:t>‹#›</a:t>
             </a:fld>
             <a:endParaRPr lang="en-US" dirty="0"/>
           </a:p>
@@ -1608,7 +1610,7 @@
           <a:p>
             <a:fld id="{4BE1D723-8F53-4F53-90B0-1982A396982E}" type="datetime1">
               <a:rPr lang="en-US" smtClean="0"/>
-              <a:t>5/12/2020</a:t>
+              <a:t>5/15/20</a:t>
             </a:fld>
             <a:endParaRPr lang="en-US" dirty="0"/>
           </a:p>
@@ -1662,7 +1664,7 @@
           <a:p>
             <a:fld id="{3A98EE3D-8CD1-4C3F-BD1C-C98C9596463C}" type="slidenum">
               <a:rPr lang="en-US" smtClean="0"/>
-              <a:t>‹nr.›</a:t>
+              <a:t>‹#›</a:t>
             </a:fld>
             <a:endParaRPr lang="en-US" dirty="0"/>
           </a:p>
@@ -1981,7 +1983,7 @@
           <a:p>
             <a:fld id="{97669AF7-7BEB-44E4-9852-375E34362B5B}" type="datetime1">
               <a:rPr lang="en-US" smtClean="0"/>
-              <a:t>5/12/2020</a:t>
+              <a:t>5/15/20</a:t>
             </a:fld>
             <a:endParaRPr lang="en-US" dirty="0"/>
           </a:p>
@@ -2035,7 +2037,7 @@
           <a:p>
             <a:fld id="{3A98EE3D-8CD1-4C3F-BD1C-C98C9596463C}" type="slidenum">
               <a:rPr lang="en-US" smtClean="0"/>
-              <a:t>‹nr.›</a:t>
+              <a:t>‹#›</a:t>
             </a:fld>
             <a:endParaRPr lang="en-US" dirty="0"/>
           </a:p>
@@ -2236,7 +2238,7 @@
           <a:p>
             <a:fld id="{BAAAC38D-0552-4C82-B593-E6124DFADBE2}" type="datetime1">
               <a:rPr lang="en-US" smtClean="0"/>
-              <a:t>5/12/2020</a:t>
+              <a:t>5/15/20</a:t>
             </a:fld>
             <a:endParaRPr lang="en-US" dirty="0"/>
           </a:p>
@@ -2290,7 +2292,7 @@
           <a:p>
             <a:fld id="{3A98EE3D-8CD1-4C3F-BD1C-C98C9596463C}" type="slidenum">
               <a:rPr lang="en-US" smtClean="0"/>
-              <a:t>‹nr.›</a:t>
+              <a:t>‹#›</a:t>
             </a:fld>
             <a:endParaRPr lang="en-US" dirty="0"/>
           </a:p>
@@ -2633,7 +2635,7 @@
           <a:p>
             <a:fld id="{D9DF0F1C-5577-4ACB-BB62-DF8F3C494C7E}" type="datetime1">
               <a:rPr lang="en-US" smtClean="0"/>
-              <a:t>5/12/2020</a:t>
+              <a:t>5/15/20</a:t>
             </a:fld>
             <a:endParaRPr lang="en-US" dirty="0"/>
           </a:p>
@@ -2687,7 +2689,7 @@
           <a:p>
             <a:fld id="{3A98EE3D-8CD1-4C3F-BD1C-C98C9596463C}" type="slidenum">
               <a:rPr lang="en-US" smtClean="0"/>
-              <a:t>‹nr.›</a:t>
+              <a:t>‹#›</a:t>
             </a:fld>
             <a:endParaRPr lang="en-US" dirty="0"/>
           </a:p>
@@ -2769,7 +2771,7 @@
           <a:p>
             <a:fld id="{1775B394-D9F9-4F0C-B15D-605F45CB9E9F}" type="datetime1">
               <a:rPr lang="en-US" smtClean="0"/>
-              <a:t>5/12/2020</a:t>
+              <a:t>5/15/20</a:t>
             </a:fld>
             <a:endParaRPr lang="en-US" dirty="0"/>
           </a:p>
@@ -2823,7 +2825,7 @@
           <a:p>
             <a:fld id="{3A98EE3D-8CD1-4C3F-BD1C-C98C9596463C}" type="slidenum">
               <a:rPr lang="en-US" smtClean="0"/>
-              <a:t>‹nr.›</a:t>
+              <a:t>‹#›</a:t>
             </a:fld>
             <a:endParaRPr lang="en-US" dirty="0"/>
           </a:p>
@@ -2926,7 +2928,7 @@
           <a:p>
             <a:fld id="{39667345-2558-425A-8533-9BFDBCE15005}" type="datetime1">
               <a:rPr lang="en-US" smtClean="0"/>
-              <a:t>5/12/2020</a:t>
+              <a:t>5/15/20</a:t>
             </a:fld>
             <a:endParaRPr lang="en-US" dirty="0"/>
           </a:p>
@@ -2980,7 +2982,7 @@
           <a:p>
             <a:fld id="{3A98EE3D-8CD1-4C3F-BD1C-C98C9596463C}" type="slidenum">
               <a:rPr lang="en-US" smtClean="0"/>
-              <a:t>‹nr.›</a:t>
+              <a:t>‹#›</a:t>
             </a:fld>
             <a:endParaRPr lang="en-US" dirty="0"/>
           </a:p>
@@ -3255,7 +3257,7 @@
           <a:p>
             <a:fld id="{92BEA474-078D-4E9B-9B14-09A87B19DC46}" type="datetime1">
               <a:rPr lang="en-US" smtClean="0"/>
-              <a:t>5/12/2020</a:t>
+              <a:t>5/15/20</a:t>
             </a:fld>
             <a:endParaRPr lang="en-US" dirty="0"/>
           </a:p>
@@ -3319,7 +3321,7 @@
             <a:fld id="{3A98EE3D-8CD1-4C3F-BD1C-C98C9596463C}" type="slidenum">
               <a:rPr lang="en-US" smtClean="0"/>
               <a:pPr/>
-              <a:t>‹nr.›</a:t>
+              <a:t>‹#›</a:t>
             </a:fld>
             <a:endParaRPr lang="en-US" dirty="0"/>
           </a:p>
@@ -3605,7 +3607,7 @@
           <a:p>
             <a:fld id="{4907D986-8816-4272-A432-0437A28A9828}" type="datetime1">
               <a:rPr lang="en-US" smtClean="0"/>
-              <a:t>5/12/2020</a:t>
+              <a:t>5/15/20</a:t>
             </a:fld>
             <a:endParaRPr lang="en-US" dirty="0"/>
           </a:p>
@@ -3653,7 +3655,7 @@
           <a:p>
             <a:fld id="{3A98EE3D-8CD1-4C3F-BD1C-C98C9596463C}" type="slidenum">
               <a:rPr lang="en-US" smtClean="0"/>
-              <a:t>‹nr.›</a:t>
+              <a:t>‹#›</a:t>
             </a:fld>
             <a:endParaRPr lang="en-US" dirty="0"/>
           </a:p>
@@ -3866,7 +3868,7 @@
           <a:p>
             <a:fld id="{62D6E202-B606-4609-B914-27C9371A1F6D}" type="datetime1">
               <a:rPr lang="en-US" smtClean="0"/>
-              <a:t>5/12/2020</a:t>
+              <a:t>5/15/20</a:t>
             </a:fld>
             <a:endParaRPr lang="en-US" dirty="0"/>
           </a:p>
@@ -3940,7 +3942,7 @@
           <a:p>
             <a:fld id="{3A98EE3D-8CD1-4C3F-BD1C-C98C9596463C}" type="slidenum">
               <a:rPr lang="en-US" smtClean="0"/>
-              <a:t>‹nr.›</a:t>
+              <a:t>‹#›</a:t>
             </a:fld>
             <a:endParaRPr lang="en-US" dirty="0"/>
           </a:p>
@@ -5509,7 +5511,7 @@
           <p:cNvPr id="2" name="Title 1">
             <a:extLst>
               <a:ext uri="{FF2B5EF4-FFF2-40B4-BE49-F238E27FC236}">
-                <a16:creationId xmlns:a16="http://schemas.microsoft.com/office/drawing/2014/main" id="{6CE041DE-96AA-4C82-8200-E846B27DFF87}"/>
+                <a16:creationId xmlns:a16="http://schemas.microsoft.com/office/drawing/2014/main" id="{A9F3929B-6B52-F24B-B99E-464A5E747B8C}"/>
               </a:ext>
             </a:extLst>
           </p:cNvPr>
@@ -5527,9 +5529,8 @@
           <a:p>
             <a:r>
               <a:rPr lang="en-US" dirty="0"/>
-              <a:t>Advanced bot</a:t>
-            </a:r>
-            <a:endParaRPr lang="nl-NL" dirty="0"/>
+              <a:t>Basic Bot</a:t>
+            </a:r>
           </a:p>
         </p:txBody>
       </p:sp>
@@ -5538,7 +5539,7 @@
           <p:cNvPr id="3" name="Content Placeholder 2">
             <a:extLst>
               <a:ext uri="{FF2B5EF4-FFF2-40B4-BE49-F238E27FC236}">
-                <a16:creationId xmlns:a16="http://schemas.microsoft.com/office/drawing/2014/main" id="{BB3F33E9-7E59-412F-8665-5ECD6D6A4BBF}"/>
+                <a16:creationId xmlns:a16="http://schemas.microsoft.com/office/drawing/2014/main" id="{1C26ADBD-2744-2E41-B3A7-CD93EF0E7405}"/>
               </a:ext>
             </a:extLst>
           </p:cNvPr>
@@ -5549,19 +5550,87 @@
             <p:ph idx="1"/>
           </p:nvPr>
         </p:nvSpPr>
-        <p:spPr/>
+        <p:spPr>
+          <a:xfrm>
+            <a:off x="1097280" y="2193545"/>
+            <a:ext cx="10058400" cy="3760891"/>
+          </a:xfrm>
+        </p:spPr>
         <p:txBody>
           <a:bodyPr/>
           <a:lstStyle/>
           <a:p>
-            <a:endParaRPr lang="nl-NL" dirty="0"/>
+            <a:pPr>
+              <a:buFont typeface="Wingdings" pitchFamily="2" charset="2"/>
+              <a:buChar char="v"/>
+            </a:pPr>
+            <a:r>
+              <a:rPr lang="en-US" dirty="0"/>
+              <a:t> Find the location of the flag</a:t>
+            </a:r>
+          </a:p>
+          <a:p>
+            <a:pPr>
+              <a:buFont typeface="Wingdings" pitchFamily="2" charset="2"/>
+              <a:buChar char="v"/>
+            </a:pPr>
+            <a:r>
+              <a:rPr lang="en-US" dirty="0"/>
+              <a:t>Perform shots in this direction with maximal speed</a:t>
+            </a:r>
+          </a:p>
+          <a:p>
+            <a:pPr>
+              <a:buFont typeface="Wingdings" pitchFamily="2" charset="2"/>
+              <a:buChar char="v"/>
+            </a:pPr>
+            <a:r>
+              <a:rPr lang="en-US" dirty="0"/>
+              <a:t>Each shot that was in the radius of the hole is saved</a:t>
+            </a:r>
+          </a:p>
+          <a:p>
+            <a:pPr>
+              <a:buFont typeface="Wingdings" pitchFamily="2" charset="2"/>
+              <a:buChar char="v"/>
+            </a:pPr>
+            <a:r>
+              <a:rPr lang="en-US" dirty="0"/>
+              <a:t>Among those saves shots, aims to find the right velocity</a:t>
+            </a:r>
+          </a:p>
+          <a:p>
+            <a:pPr>
+              <a:buFont typeface="Wingdings" pitchFamily="2" charset="2"/>
+              <a:buChar char="v"/>
+            </a:pPr>
+            <a:r>
+              <a:rPr lang="en-US" dirty="0"/>
+              <a:t>If there is an obstacle, it will try to create shots with wider angle</a:t>
+            </a:r>
+          </a:p>
+          <a:p>
+            <a:pPr>
+              <a:buFont typeface="Wingdings" pitchFamily="2" charset="2"/>
+              <a:buChar char="v"/>
+            </a:pPr>
+            <a:r>
+              <a:rPr lang="en-US" dirty="0"/>
+              <a:t>Not able to find a solution in more than one shot is needed</a:t>
+            </a:r>
+          </a:p>
+          <a:p>
+            <a:pPr marL="0" indent="0">
+              <a:buNone/>
+            </a:pPr>
+            <a:endParaRPr lang="en-US" dirty="0"/>
           </a:p>
         </p:txBody>
       </p:sp>
     </p:spTree>
     <p:extLst>
       <p:ext uri="{BB962C8B-B14F-4D97-AF65-F5344CB8AC3E}">
-        <p14:creationId xmlns:p14="http://schemas.microsoft.com/office/powerpoint/2010/main" val="4033623988"/>
+        <p14:creationId xmlns:p14="http://schemas.microsoft.com/office/powerpoint/2010/main" val="589618186"/>
       </p:ext>
     </p:extLst>
   </p:cSld>
@@ -5588,12 +5657,50 @@
           <a:chExt cx="0" cy="0"/>
         </a:xfrm>
       </p:grpSpPr>
+      <p:pic>
+        <p:nvPicPr>
+          <p:cNvPr id="5" name="Content Placeholder 4" descr="A picture containing shirt&#10;&#10;Description automatically generated">
+            <a:extLst>
+              <a:ext uri="{FF2B5EF4-FFF2-40B4-BE49-F238E27FC236}">
+                <a16:creationId xmlns:a16="http://schemas.microsoft.com/office/drawing/2014/main" id="{1C26E6D7-7686-6446-8304-A1395CFF1205}"/>
+              </a:ext>
+            </a:extLst>
+          </p:cNvPr>
+          <p:cNvPicPr>
+            <a:picLocks noGrp="1" noChangeAspect="1"/>
+          </p:cNvPicPr>
+          <p:nvPr>
+            <p:ph idx="1"/>
+          </p:nvPr>
+        </p:nvPicPr>
+        <p:blipFill>
+          <a:blip r:embed="rId2"/>
+          <a:stretch>
+            <a:fillRect/>
+          </a:stretch>
+        </p:blipFill>
+        <p:spPr>
+          <a:xfrm>
+            <a:off x="4121528" y="1848348"/>
+            <a:ext cx="3948943" cy="4601129"/>
+          </a:xfrm>
+          <a:prstGeom prst="ellipse">
+            <a:avLst/>
+          </a:prstGeom>
+          <a:ln>
+            <a:noFill/>
+          </a:ln>
+          <a:effectLst>
+            <a:softEdge rad="112500"/>
+          </a:effectLst>
+        </p:spPr>
+      </p:pic>
       <p:sp>
         <p:nvSpPr>
           <p:cNvPr id="2" name="Title 1">
             <a:extLst>
               <a:ext uri="{FF2B5EF4-FFF2-40B4-BE49-F238E27FC236}">
-                <a16:creationId xmlns:a16="http://schemas.microsoft.com/office/drawing/2014/main" id="{8E9BBA27-5DE1-4A08-BB6E-19568827EB6F}"/>
+                <a16:creationId xmlns:a16="http://schemas.microsoft.com/office/drawing/2014/main" id="{9AB93B0A-6F7A-C541-9F50-1F6249B1CC8B}"/>
               </a:ext>
             </a:extLst>
           </p:cNvPr>
@@ -5611,81 +5718,15 @@
           <a:p>
             <a:r>
               <a:rPr lang="en-US" dirty="0"/>
-              <a:t>Bot comparison</a:t>
-            </a:r>
-            <a:endParaRPr lang="nl-NL" dirty="0"/>
-          </a:p>
-        </p:txBody>
-      </p:sp>
-      <p:sp>
-        <p:nvSpPr>
-          <p:cNvPr id="3" name="Content Placeholder 2">
-            <a:extLst>
-              <a:ext uri="{FF2B5EF4-FFF2-40B4-BE49-F238E27FC236}">
-                <a16:creationId xmlns:a16="http://schemas.microsoft.com/office/drawing/2014/main" id="{BD4E8E8E-4C2D-4DE9-8207-CB24F366E520}"/>
-              </a:ext>
-            </a:extLst>
-          </p:cNvPr>
-          <p:cNvSpPr>
-            <a:spLocks noGrp="1"/>
-          </p:cNvSpPr>
-          <p:nvPr>
-            <p:ph idx="1"/>
-          </p:nvPr>
-        </p:nvSpPr>
-        <p:spPr/>
-        <p:txBody>
-          <a:bodyPr/>
-          <a:lstStyle/>
-          <a:p>
-            <a:pPr>
-              <a:buFont typeface="Wingdings" panose="05000000000000000000" pitchFamily="2" charset="2"/>
-              <a:buChar char="v"/>
-            </a:pPr>
-            <a:r>
-              <a:rPr lang="en-US" dirty="0"/>
-              <a:t> Calculation speed</a:t>
-            </a:r>
-          </a:p>
-          <a:p>
-            <a:pPr>
-              <a:buFont typeface="Wingdings" panose="05000000000000000000" pitchFamily="2" charset="2"/>
-              <a:buChar char="v"/>
-            </a:pPr>
-            <a:r>
-              <a:rPr lang="en-US" dirty="0"/>
-              <a:t> Accuracy</a:t>
-            </a:r>
-          </a:p>
-          <a:p>
-            <a:pPr>
-              <a:buFont typeface="Wingdings" panose="05000000000000000000" pitchFamily="2" charset="2"/>
-              <a:buChar char="v"/>
-            </a:pPr>
-            <a:r>
-              <a:rPr lang="en-US" dirty="0"/>
-              <a:t> Versatility </a:t>
-            </a:r>
-          </a:p>
-          <a:p>
-            <a:pPr>
-              <a:buFont typeface="Wingdings" panose="05000000000000000000" pitchFamily="2" charset="2"/>
-              <a:buChar char="v"/>
-            </a:pPr>
-            <a:r>
-              <a:rPr lang="en-US" dirty="0"/>
-              <a:t> Limitations</a:t>
-            </a:r>
-          </a:p>
-          <a:p>
-            <a:endParaRPr lang="nl-NL" dirty="0"/>
+              <a:t>Example of the Wide shot</a:t>
+            </a:r>
           </a:p>
         </p:txBody>
       </p:sp>
     </p:spTree>
     <p:extLst>
       <p:ext uri="{BB962C8B-B14F-4D97-AF65-F5344CB8AC3E}">
-        <p14:creationId xmlns:p14="http://schemas.microsoft.com/office/powerpoint/2010/main" val="4156753096"/>
+        <p14:creationId xmlns:p14="http://schemas.microsoft.com/office/powerpoint/2010/main" val="1388889992"/>
       </p:ext>
     </p:extLst>
   </p:cSld>
@@ -5717,6 +5758,214 @@
           <p:cNvPr id="2" name="Title 1">
             <a:extLst>
               <a:ext uri="{FF2B5EF4-FFF2-40B4-BE49-F238E27FC236}">
+                <a16:creationId xmlns:a16="http://schemas.microsoft.com/office/drawing/2014/main" id="{6CE041DE-96AA-4C82-8200-E846B27DFF87}"/>
+              </a:ext>
+            </a:extLst>
+          </p:cNvPr>
+          <p:cNvSpPr>
+            <a:spLocks noGrp="1"/>
+          </p:cNvSpPr>
+          <p:nvPr>
+            <p:ph type="title"/>
+          </p:nvPr>
+        </p:nvSpPr>
+        <p:spPr/>
+        <p:txBody>
+          <a:bodyPr/>
+          <a:lstStyle/>
+          <a:p>
+            <a:r>
+              <a:rPr lang="en-US" dirty="0"/>
+              <a:t>Advanced bot</a:t>
+            </a:r>
+            <a:endParaRPr lang="nl-NL" dirty="0"/>
+          </a:p>
+        </p:txBody>
+      </p:sp>
+      <p:sp>
+        <p:nvSpPr>
+          <p:cNvPr id="3" name="Content Placeholder 2">
+            <a:extLst>
+              <a:ext uri="{FF2B5EF4-FFF2-40B4-BE49-F238E27FC236}">
+                <a16:creationId xmlns:a16="http://schemas.microsoft.com/office/drawing/2014/main" id="{BB3F33E9-7E59-412F-8665-5ECD6D6A4BBF}"/>
+              </a:ext>
+            </a:extLst>
+          </p:cNvPr>
+          <p:cNvSpPr>
+            <a:spLocks noGrp="1"/>
+          </p:cNvSpPr>
+          <p:nvPr>
+            <p:ph idx="1"/>
+          </p:nvPr>
+        </p:nvSpPr>
+        <p:spPr/>
+        <p:txBody>
+          <a:bodyPr/>
+          <a:lstStyle/>
+          <a:p>
+            <a:endParaRPr lang="nl-NL" dirty="0"/>
+          </a:p>
+        </p:txBody>
+      </p:sp>
+    </p:spTree>
+    <p:extLst>
+      <p:ext uri="{BB962C8B-B14F-4D97-AF65-F5344CB8AC3E}">
+        <p14:creationId xmlns:p14="http://schemas.microsoft.com/office/powerpoint/2010/main" val="4033623988"/>
+      </p:ext>
+    </p:extLst>
+  </p:cSld>
+  <p:clrMapOvr>
+    <a:masterClrMapping/>
+  </p:clrMapOvr>
+</p:sld>
+</file>
+
+<file path=ppt/slides/slide15.xml><?xml version="1.0" encoding="utf-8"?>
+<p:sld xmlns:a="http://schemas.openxmlformats.org/drawingml/2006/main" xmlns:r="http://schemas.openxmlformats.org/officeDocument/2006/relationships" xmlns:p="http://schemas.openxmlformats.org/presentationml/2006/main">
+  <p:cSld>
+    <p:spTree>
+      <p:nvGrpSpPr>
+        <p:cNvPr id="1" name=""/>
+        <p:cNvGrpSpPr/>
+        <p:nvPr/>
+      </p:nvGrpSpPr>
+      <p:grpSpPr>
+        <a:xfrm>
+          <a:off x="0" y="0"/>
+          <a:ext cx="0" cy="0"/>
+          <a:chOff x="0" y="0"/>
+          <a:chExt cx="0" cy="0"/>
+        </a:xfrm>
+      </p:grpSpPr>
+      <p:sp>
+        <p:nvSpPr>
+          <p:cNvPr id="2" name="Title 1">
+            <a:extLst>
+              <a:ext uri="{FF2B5EF4-FFF2-40B4-BE49-F238E27FC236}">
+                <a16:creationId xmlns:a16="http://schemas.microsoft.com/office/drawing/2014/main" id="{8E9BBA27-5DE1-4A08-BB6E-19568827EB6F}"/>
+              </a:ext>
+            </a:extLst>
+          </p:cNvPr>
+          <p:cNvSpPr>
+            <a:spLocks noGrp="1"/>
+          </p:cNvSpPr>
+          <p:nvPr>
+            <p:ph type="title"/>
+          </p:nvPr>
+        </p:nvSpPr>
+        <p:spPr/>
+        <p:txBody>
+          <a:bodyPr/>
+          <a:lstStyle/>
+          <a:p>
+            <a:r>
+              <a:rPr lang="en-US" dirty="0"/>
+              <a:t>Bot comparison</a:t>
+            </a:r>
+            <a:endParaRPr lang="nl-NL" dirty="0"/>
+          </a:p>
+        </p:txBody>
+      </p:sp>
+      <p:sp>
+        <p:nvSpPr>
+          <p:cNvPr id="3" name="Content Placeholder 2">
+            <a:extLst>
+              <a:ext uri="{FF2B5EF4-FFF2-40B4-BE49-F238E27FC236}">
+                <a16:creationId xmlns:a16="http://schemas.microsoft.com/office/drawing/2014/main" id="{BD4E8E8E-4C2D-4DE9-8207-CB24F366E520}"/>
+              </a:ext>
+            </a:extLst>
+          </p:cNvPr>
+          <p:cNvSpPr>
+            <a:spLocks noGrp="1"/>
+          </p:cNvSpPr>
+          <p:nvPr>
+            <p:ph idx="1"/>
+          </p:nvPr>
+        </p:nvSpPr>
+        <p:spPr/>
+        <p:txBody>
+          <a:bodyPr/>
+          <a:lstStyle/>
+          <a:p>
+            <a:pPr>
+              <a:buFont typeface="Wingdings" panose="05000000000000000000" pitchFamily="2" charset="2"/>
+              <a:buChar char="v"/>
+            </a:pPr>
+            <a:r>
+              <a:rPr lang="en-US" dirty="0"/>
+              <a:t> Calculation speed</a:t>
+            </a:r>
+          </a:p>
+          <a:p>
+            <a:pPr>
+              <a:buFont typeface="Wingdings" panose="05000000000000000000" pitchFamily="2" charset="2"/>
+              <a:buChar char="v"/>
+            </a:pPr>
+            <a:r>
+              <a:rPr lang="en-US" dirty="0"/>
+              <a:t> Accuracy</a:t>
+            </a:r>
+          </a:p>
+          <a:p>
+            <a:pPr>
+              <a:buFont typeface="Wingdings" panose="05000000000000000000" pitchFamily="2" charset="2"/>
+              <a:buChar char="v"/>
+            </a:pPr>
+            <a:r>
+              <a:rPr lang="en-US" dirty="0"/>
+              <a:t> Versatility </a:t>
+            </a:r>
+          </a:p>
+          <a:p>
+            <a:pPr>
+              <a:buFont typeface="Wingdings" panose="05000000000000000000" pitchFamily="2" charset="2"/>
+              <a:buChar char="v"/>
+            </a:pPr>
+            <a:r>
+              <a:rPr lang="en-US" dirty="0"/>
+              <a:t> Limitations</a:t>
+            </a:r>
+          </a:p>
+          <a:p>
+            <a:endParaRPr lang="nl-NL" dirty="0"/>
+          </a:p>
+        </p:txBody>
+      </p:sp>
+    </p:spTree>
+    <p:extLst>
+      <p:ext uri="{BB962C8B-B14F-4D97-AF65-F5344CB8AC3E}">
+        <p14:creationId xmlns:p14="http://schemas.microsoft.com/office/powerpoint/2010/main" val="4156753096"/>
+      </p:ext>
+    </p:extLst>
+  </p:cSld>
+  <p:clrMapOvr>
+    <a:masterClrMapping/>
+  </p:clrMapOvr>
+</p:sld>
+</file>
+
+<file path=ppt/slides/slide16.xml><?xml version="1.0" encoding="utf-8"?>
+<p:sld xmlns:a="http://schemas.openxmlformats.org/drawingml/2006/main" xmlns:r="http://schemas.openxmlformats.org/officeDocument/2006/relationships" xmlns:p="http://schemas.openxmlformats.org/presentationml/2006/main">
+  <p:cSld>
+    <p:spTree>
+      <p:nvGrpSpPr>
+        <p:cNvPr id="1" name=""/>
+        <p:cNvGrpSpPr/>
+        <p:nvPr/>
+      </p:nvGrpSpPr>
+      <p:grpSpPr>
+        <a:xfrm>
+          <a:off x="0" y="0"/>
+          <a:ext cx="0" cy="0"/>
+          <a:chOff x="0" y="0"/>
+          <a:chExt cx="0" cy="0"/>
+        </a:xfrm>
+      </p:grpSpPr>
+      <p:sp>
+        <p:nvSpPr>
+          <p:cNvPr id="2" name="Title 1">
+            <a:extLst>
+              <a:ext uri="{FF2B5EF4-FFF2-40B4-BE49-F238E27FC236}">
                 <a16:creationId xmlns:a16="http://schemas.microsoft.com/office/drawing/2014/main" id="{A7FB3999-0705-4616-AD41-58E9EC154488}"/>
               </a:ext>
             </a:extLst>
@@ -5792,7 +6041,7 @@
 </p:sld>
 </file>
 
-<file path=ppt/slides/slide15.xml><?xml version="1.0" encoding="utf-8"?>
+<file path=ppt/slides/slide17.xml><?xml version="1.0" encoding="utf-8"?>
 <p:sld xmlns:a="http://schemas.openxmlformats.org/drawingml/2006/main" xmlns:r="http://schemas.openxmlformats.org/officeDocument/2006/relationships" xmlns:p="http://schemas.openxmlformats.org/presentationml/2006/main">
   <p:cSld>
     <p:spTree>
@@ -5981,178 +6230,6 @@
 </p:sld>
 </file>
 
-<file path=ppt/slides/slide16.xml><?xml version="1.0" encoding="utf-8"?>
-<p:sld xmlns:a="http://schemas.openxmlformats.org/drawingml/2006/main" xmlns:r="http://schemas.openxmlformats.org/officeDocument/2006/relationships" xmlns:p="http://schemas.openxmlformats.org/presentationml/2006/main">
-  <p:cSld>
-    <p:spTree>
-      <p:nvGrpSpPr>
-        <p:cNvPr id="1" name=""/>
-        <p:cNvGrpSpPr/>
-        <p:nvPr/>
-      </p:nvGrpSpPr>
-      <p:grpSpPr>
-        <a:xfrm>
-          <a:off x="0" y="0"/>
-          <a:ext cx="0" cy="0"/>
-          <a:chOff x="0" y="0"/>
-          <a:chExt cx="0" cy="0"/>
-        </a:xfrm>
-      </p:grpSpPr>
-      <p:sp>
-        <p:nvSpPr>
-          <p:cNvPr id="2" name="Title 1">
-            <a:extLst>
-              <a:ext uri="{FF2B5EF4-FFF2-40B4-BE49-F238E27FC236}">
-                <a16:creationId xmlns:a16="http://schemas.microsoft.com/office/drawing/2014/main" id="{EB7BE5E0-0047-4EE2-82BC-33D53C4C8708}"/>
-              </a:ext>
-            </a:extLst>
-          </p:cNvPr>
-          <p:cNvSpPr>
-            <a:spLocks noGrp="1"/>
-          </p:cNvSpPr>
-          <p:nvPr>
-            <p:ph type="title"/>
-          </p:nvPr>
-        </p:nvSpPr>
-        <p:spPr/>
-        <p:txBody>
-          <a:bodyPr/>
-          <a:lstStyle/>
-          <a:p>
-            <a:r>
-              <a:rPr lang="en-US" dirty="0"/>
-              <a:t>Phase 3 planning</a:t>
-            </a:r>
-            <a:endParaRPr lang="nl-NL" dirty="0"/>
-          </a:p>
-        </p:txBody>
-      </p:sp>
-      <p:sp>
-        <p:nvSpPr>
-          <p:cNvPr id="3" name="Content Placeholder 2">
-            <a:extLst>
-              <a:ext uri="{FF2B5EF4-FFF2-40B4-BE49-F238E27FC236}">
-                <a16:creationId xmlns:a16="http://schemas.microsoft.com/office/drawing/2014/main" id="{E8FBA5F1-78D1-47E4-B412-C1E4ACAE1E40}"/>
-              </a:ext>
-            </a:extLst>
-          </p:cNvPr>
-          <p:cNvSpPr>
-            <a:spLocks noGrp="1"/>
-          </p:cNvSpPr>
-          <p:nvPr>
-            <p:ph idx="1"/>
-          </p:nvPr>
-        </p:nvSpPr>
-        <p:spPr/>
-        <p:txBody>
-          <a:bodyPr/>
-          <a:lstStyle/>
-          <a:p>
-            <a:r>
-              <a:rPr lang="en-US" dirty="0"/>
-              <a:t>##MAKE A DECISION ABOUT WHAT CHALLENGE TO PICK##</a:t>
-            </a:r>
-            <a:endParaRPr lang="nl-NL" dirty="0"/>
-          </a:p>
-        </p:txBody>
-      </p:sp>
-    </p:spTree>
-    <p:extLst>
-      <p:ext uri="{BB962C8B-B14F-4D97-AF65-F5344CB8AC3E}">
-        <p14:creationId xmlns:p14="http://schemas.microsoft.com/office/powerpoint/2010/main" val="2949224143"/>
-      </p:ext>
-    </p:extLst>
-  </p:cSld>
-  <p:clrMapOvr>
-    <a:masterClrMapping/>
-  </p:clrMapOvr>
-</p:sld>
-</file>
-
-<file path=ppt/slides/slide17.xml><?xml version="1.0" encoding="utf-8"?>
-<p:sld xmlns:a="http://schemas.openxmlformats.org/drawingml/2006/main" xmlns:r="http://schemas.openxmlformats.org/officeDocument/2006/relationships" xmlns:p="http://schemas.openxmlformats.org/presentationml/2006/main">
-  <p:cSld>
-    <p:spTree>
-      <p:nvGrpSpPr>
-        <p:cNvPr id="1" name=""/>
-        <p:cNvGrpSpPr/>
-        <p:nvPr/>
-      </p:nvGrpSpPr>
-      <p:grpSpPr>
-        <a:xfrm>
-          <a:off x="0" y="0"/>
-          <a:ext cx="0" cy="0"/>
-          <a:chOff x="0" y="0"/>
-          <a:chExt cx="0" cy="0"/>
-        </a:xfrm>
-      </p:grpSpPr>
-      <p:sp>
-        <p:nvSpPr>
-          <p:cNvPr id="2" name="Title 1">
-            <a:extLst>
-              <a:ext uri="{FF2B5EF4-FFF2-40B4-BE49-F238E27FC236}">
-                <a16:creationId xmlns:a16="http://schemas.microsoft.com/office/drawing/2014/main" id="{AC24F4CF-25C7-4101-9DC3-9DA467D3C53C}"/>
-              </a:ext>
-            </a:extLst>
-          </p:cNvPr>
-          <p:cNvSpPr>
-            <a:spLocks noGrp="1"/>
-          </p:cNvSpPr>
-          <p:nvPr>
-            <p:ph type="title"/>
-          </p:nvPr>
-        </p:nvSpPr>
-        <p:spPr/>
-        <p:txBody>
-          <a:bodyPr/>
-          <a:lstStyle/>
-          <a:p>
-            <a:r>
-              <a:rPr lang="en-US" dirty="0"/>
-              <a:t>Questions?</a:t>
-            </a:r>
-            <a:endParaRPr lang="nl-NL" dirty="0"/>
-          </a:p>
-        </p:txBody>
-      </p:sp>
-      <p:sp>
-        <p:nvSpPr>
-          <p:cNvPr id="3" name="Content Placeholder 2">
-            <a:extLst>
-              <a:ext uri="{FF2B5EF4-FFF2-40B4-BE49-F238E27FC236}">
-                <a16:creationId xmlns:a16="http://schemas.microsoft.com/office/drawing/2014/main" id="{94E0A375-AB7A-4233-817A-01E2760FFDF7}"/>
-              </a:ext>
-            </a:extLst>
-          </p:cNvPr>
-          <p:cNvSpPr>
-            <a:spLocks noGrp="1"/>
-          </p:cNvSpPr>
-          <p:nvPr>
-            <p:ph idx="1"/>
-          </p:nvPr>
-        </p:nvSpPr>
-        <p:spPr/>
-        <p:txBody>
-          <a:bodyPr/>
-          <a:lstStyle/>
-          <a:p>
-            <a:endParaRPr lang="nl-NL" dirty="0"/>
-          </a:p>
-        </p:txBody>
-      </p:sp>
-    </p:spTree>
-    <p:extLst>
-      <p:ext uri="{BB962C8B-B14F-4D97-AF65-F5344CB8AC3E}">
-        <p14:creationId xmlns:p14="http://schemas.microsoft.com/office/powerpoint/2010/main" val="4090330523"/>
-      </p:ext>
-    </p:extLst>
-  </p:cSld>
-  <p:clrMapOvr>
-    <a:masterClrMapping/>
-  </p:clrMapOvr>
-</p:sld>
-</file>
-
 <file path=ppt/slides/slide18.xml><?xml version="1.0" encoding="utf-8"?>
 <p:sld xmlns:a="http://schemas.openxmlformats.org/drawingml/2006/main" xmlns:r="http://schemas.openxmlformats.org/officeDocument/2006/relationships" xmlns:p="http://schemas.openxmlformats.org/presentationml/2006/main">
   <p:cSld>
@@ -6175,7 +6252,7 @@
           <p:cNvPr id="2" name="Title 1">
             <a:extLst>
               <a:ext uri="{FF2B5EF4-FFF2-40B4-BE49-F238E27FC236}">
-                <a16:creationId xmlns:a16="http://schemas.microsoft.com/office/drawing/2014/main" id="{D1D181A1-54DA-4C45-8817-6C1A0ADAACA7}"/>
+                <a16:creationId xmlns:a16="http://schemas.microsoft.com/office/drawing/2014/main" id="{EB7BE5E0-0047-4EE2-82BC-33D53C4C8708}"/>
               </a:ext>
             </a:extLst>
           </p:cNvPr>
@@ -6193,7 +6270,7 @@
           <a:p>
             <a:r>
               <a:rPr lang="en-US" dirty="0"/>
-              <a:t>References</a:t>
+              <a:t>Phase 3 planning</a:t>
             </a:r>
             <a:endParaRPr lang="nl-NL" dirty="0"/>
           </a:p>
@@ -6204,7 +6281,7 @@
           <p:cNvPr id="3" name="Content Placeholder 2">
             <a:extLst>
               <a:ext uri="{FF2B5EF4-FFF2-40B4-BE49-F238E27FC236}">
-                <a16:creationId xmlns:a16="http://schemas.microsoft.com/office/drawing/2014/main" id="{ACF3768A-4F58-42E2-AD90-5CA51596B4BE}"/>
+                <a16:creationId xmlns:a16="http://schemas.microsoft.com/office/drawing/2014/main" id="{E8FBA5F1-78D1-47E4-B412-C1E4ACAE1E40}"/>
               </a:ext>
             </a:extLst>
           </p:cNvPr>
@@ -6215,172 +6292,107 @@
             <p:ph idx="1"/>
           </p:nvPr>
         </p:nvSpPr>
-        <p:spPr>
-          <a:xfrm>
-            <a:off x="1097280" y="2108201"/>
-            <a:ext cx="10058400" cy="4262619"/>
-          </a:xfrm>
-        </p:spPr>
+        <p:spPr/>
         <p:txBody>
-          <a:bodyPr>
-            <a:normAutofit fontScale="92500" lnSpcReduction="10000"/>
-          </a:bodyPr>
+          <a:bodyPr/>
           <a:lstStyle/>
           <a:p>
-            <a:pPr>
-              <a:spcBef>
-                <a:spcPts val="0"/>
-              </a:spcBef>
-              <a:spcAft>
-                <a:spcPts val="600"/>
-              </a:spcAft>
-            </a:pPr>
-            <a:r>
-              <a:rPr lang="en-US" b="1" dirty="0"/>
-              <a:t>Engine tutorials</a:t>
-            </a:r>
-          </a:p>
-          <a:p>
-            <a:pPr>
-              <a:spcBef>
-                <a:spcPts val="0"/>
-              </a:spcBef>
-              <a:spcAft>
-                <a:spcPts val="600"/>
-              </a:spcAft>
-            </a:pPr>
             <a:r>
               <a:rPr lang="en-US" dirty="0"/>
-              <a:t>Thin Matrix. (2014-2016). Videos 1-33. Retrieved from https://www.youtube.com/watch?v=VS8wlS9hF8E&amp;list=PLRIWtICgwaX0u7Rf9zkZhLoLuZVfUksDP</a:t>
-            </a:r>
-          </a:p>
-          <a:p>
-            <a:pPr>
-              <a:spcBef>
-                <a:spcPts val="0"/>
-              </a:spcBef>
-              <a:spcAft>
-                <a:spcPts val="600"/>
-              </a:spcAft>
-            </a:pPr>
-            <a:r>
-              <a:rPr lang="en-US" b="1" dirty="0"/>
-              <a:t>Water rendering tutorials</a:t>
-            </a:r>
-          </a:p>
-          <a:p>
-            <a:pPr>
-              <a:spcBef>
-                <a:spcPts val="0"/>
-              </a:spcBef>
-              <a:spcAft>
-                <a:spcPts val="600"/>
-              </a:spcAft>
-            </a:pPr>
-            <a:r>
-              <a:rPr lang="en-US" dirty="0"/>
-              <a:t>Thin Matrix. (2015). Videos 1-8. Retrieved from https://www.youtube.com/watch?v=HusvGeEDU_U&amp;list=PLRIWtICgwaX23jiqVByUs0bqhnalNTNZh</a:t>
-            </a:r>
-          </a:p>
-          <a:p>
-            <a:pPr>
-              <a:spcBef>
-                <a:spcPts val="0"/>
-              </a:spcBef>
-              <a:spcAft>
-                <a:spcPts val="600"/>
-              </a:spcAft>
-            </a:pPr>
-            <a:r>
-              <a:rPr lang="en-US" b="1" dirty="0"/>
-              <a:t>Physics equations</a:t>
-            </a:r>
-          </a:p>
-          <a:p>
-            <a:pPr>
-              <a:spcBef>
-                <a:spcPts val="0"/>
-              </a:spcBef>
-              <a:spcAft>
-                <a:spcPts val="600"/>
-              </a:spcAft>
-            </a:pPr>
-            <a:r>
-              <a:rPr lang="en-GB" dirty="0" err="1"/>
-              <a:t>Teschner</a:t>
-            </a:r>
-            <a:r>
-              <a:rPr lang="en-GB" dirty="0"/>
-              <a:t>, M. (n.d.). </a:t>
-            </a:r>
-            <a:r>
-              <a:rPr lang="en-GB" i="1" dirty="0"/>
-              <a:t>Simulation in Computer Graphics - Particles</a:t>
-            </a:r>
-            <a:r>
-              <a:rPr lang="en-GB" dirty="0"/>
-              <a:t>. Retrieved from https://cg.informatik.uni-freiburg.de/course_notes/sim_02_particles.pdf</a:t>
-            </a:r>
-          </a:p>
-          <a:p>
-            <a:pPr>
-              <a:spcBef>
-                <a:spcPts val="0"/>
-              </a:spcBef>
-              <a:spcAft>
-                <a:spcPts val="600"/>
-              </a:spcAft>
-            </a:pPr>
-            <a:r>
-              <a:rPr lang="en-US" dirty="0"/>
-              <a:t>University of Delaware. (n.d.). </a:t>
-            </a:r>
-            <a:r>
-              <a:rPr lang="en-US" i="1" dirty="0" err="1"/>
-              <a:t>Verlet</a:t>
-            </a:r>
-            <a:r>
-              <a:rPr lang="en-US" i="1" dirty="0"/>
-              <a:t> Method</a:t>
-            </a:r>
-            <a:r>
-              <a:rPr lang="en-US" dirty="0"/>
-              <a:t>. Retrieved from </a:t>
-            </a:r>
-            <a:r>
-              <a:rPr lang="en-GB" dirty="0"/>
-              <a:t>http://www.physics.udel.edu/~bnikolic/teaching/phys660/numerical_ode/node5.html</a:t>
-            </a:r>
-          </a:p>
-          <a:p>
-            <a:pPr>
-              <a:spcBef>
-                <a:spcPts val="0"/>
-              </a:spcBef>
-              <a:spcAft>
-                <a:spcPts val="600"/>
-              </a:spcAft>
-            </a:pPr>
-            <a:r>
-              <a:rPr lang="en-GB" dirty="0"/>
-              <a:t>Holm, C. (2012). </a:t>
-            </a:r>
-            <a:r>
-              <a:rPr lang="en-GB" i="1" dirty="0"/>
-              <a:t>Simulation Methods in Physics 1</a:t>
-            </a:r>
-            <a:r>
-              <a:rPr lang="en-GB" dirty="0"/>
-              <a:t>. Retrieved from https://www2.icp.uni-stuttgart.de/~icp/mediawiki/images/5/54/Skript_sim_methods_I.pdf</a:t>
-            </a:r>
-            <a:endParaRPr lang="en-US" dirty="0"/>
+              <a:t>##MAKE A DECISION ABOUT WHAT CHALLENGE TO PICK##</a:t>
+            </a:r>
+            <a:endParaRPr lang="nl-NL" dirty="0"/>
           </a:p>
         </p:txBody>
       </p:sp>
     </p:spTree>
     <p:extLst>
       <p:ext uri="{BB962C8B-B14F-4D97-AF65-F5344CB8AC3E}">
-        <p14:creationId xmlns:p14="http://schemas.microsoft.com/office/powerpoint/2010/main" val="2297088198"/>
+        <p14:creationId xmlns:p14="http://schemas.microsoft.com/office/powerpoint/2010/main" val="2949224143"/>
+      </p:ext>
+    </p:extLst>
+  </p:cSld>
+  <p:clrMapOvr>
+    <a:masterClrMapping/>
+  </p:clrMapOvr>
+</p:sld>
+</file>
+
+<file path=ppt/slides/slide19.xml><?xml version="1.0" encoding="utf-8"?>
+<p:sld xmlns:a="http://schemas.openxmlformats.org/drawingml/2006/main" xmlns:r="http://schemas.openxmlformats.org/officeDocument/2006/relationships" xmlns:p="http://schemas.openxmlformats.org/presentationml/2006/main">
+  <p:cSld>
+    <p:spTree>
+      <p:nvGrpSpPr>
+        <p:cNvPr id="1" name=""/>
+        <p:cNvGrpSpPr/>
+        <p:nvPr/>
+      </p:nvGrpSpPr>
+      <p:grpSpPr>
+        <a:xfrm>
+          <a:off x="0" y="0"/>
+          <a:ext cx="0" cy="0"/>
+          <a:chOff x="0" y="0"/>
+          <a:chExt cx="0" cy="0"/>
+        </a:xfrm>
+      </p:grpSpPr>
+      <p:sp>
+        <p:nvSpPr>
+          <p:cNvPr id="2" name="Title 1">
+            <a:extLst>
+              <a:ext uri="{FF2B5EF4-FFF2-40B4-BE49-F238E27FC236}">
+                <a16:creationId xmlns:a16="http://schemas.microsoft.com/office/drawing/2014/main" id="{AC24F4CF-25C7-4101-9DC3-9DA467D3C53C}"/>
+              </a:ext>
+            </a:extLst>
+          </p:cNvPr>
+          <p:cNvSpPr>
+            <a:spLocks noGrp="1"/>
+          </p:cNvSpPr>
+          <p:nvPr>
+            <p:ph type="title"/>
+          </p:nvPr>
+        </p:nvSpPr>
+        <p:spPr/>
+        <p:txBody>
+          <a:bodyPr/>
+          <a:lstStyle/>
+          <a:p>
+            <a:r>
+              <a:rPr lang="en-US" dirty="0"/>
+              <a:t>Questions?</a:t>
+            </a:r>
+            <a:endParaRPr lang="nl-NL" dirty="0"/>
+          </a:p>
+        </p:txBody>
+      </p:sp>
+      <p:sp>
+        <p:nvSpPr>
+          <p:cNvPr id="3" name="Content Placeholder 2">
+            <a:extLst>
+              <a:ext uri="{FF2B5EF4-FFF2-40B4-BE49-F238E27FC236}">
+                <a16:creationId xmlns:a16="http://schemas.microsoft.com/office/drawing/2014/main" id="{94E0A375-AB7A-4233-817A-01E2760FFDF7}"/>
+              </a:ext>
+            </a:extLst>
+          </p:cNvPr>
+          <p:cNvSpPr>
+            <a:spLocks noGrp="1"/>
+          </p:cNvSpPr>
+          <p:nvPr>
+            <p:ph idx="1"/>
+          </p:nvPr>
+        </p:nvSpPr>
+        <p:spPr/>
+        <p:txBody>
+          <a:bodyPr/>
+          <a:lstStyle/>
+          <a:p>
+            <a:endParaRPr lang="nl-NL" dirty="0"/>
+          </a:p>
+        </p:txBody>
+      </p:sp>
+    </p:spTree>
+    <p:extLst>
+      <p:ext uri="{BB962C8B-B14F-4D97-AF65-F5344CB8AC3E}">
+        <p14:creationId xmlns:p14="http://schemas.microsoft.com/office/powerpoint/2010/main" val="4090330523"/>
       </p:ext>
     </p:extLst>
   </p:cSld>
@@ -6475,6 +6487,243 @@
     <p:extLst>
       <p:ext uri="{BB962C8B-B14F-4D97-AF65-F5344CB8AC3E}">
         <p14:creationId xmlns:p14="http://schemas.microsoft.com/office/powerpoint/2010/main" val="503401743"/>
+      </p:ext>
+    </p:extLst>
+  </p:cSld>
+  <p:clrMapOvr>
+    <a:masterClrMapping/>
+  </p:clrMapOvr>
+</p:sld>
+</file>
+
+<file path=ppt/slides/slide20.xml><?xml version="1.0" encoding="utf-8"?>
+<p:sld xmlns:a="http://schemas.openxmlformats.org/drawingml/2006/main" xmlns:r="http://schemas.openxmlformats.org/officeDocument/2006/relationships" xmlns:p="http://schemas.openxmlformats.org/presentationml/2006/main">
+  <p:cSld>
+    <p:spTree>
+      <p:nvGrpSpPr>
+        <p:cNvPr id="1" name=""/>
+        <p:cNvGrpSpPr/>
+        <p:nvPr/>
+      </p:nvGrpSpPr>
+      <p:grpSpPr>
+        <a:xfrm>
+          <a:off x="0" y="0"/>
+          <a:ext cx="0" cy="0"/>
+          <a:chOff x="0" y="0"/>
+          <a:chExt cx="0" cy="0"/>
+        </a:xfrm>
+      </p:grpSpPr>
+      <p:sp>
+        <p:nvSpPr>
+          <p:cNvPr id="2" name="Title 1">
+            <a:extLst>
+              <a:ext uri="{FF2B5EF4-FFF2-40B4-BE49-F238E27FC236}">
+                <a16:creationId xmlns:a16="http://schemas.microsoft.com/office/drawing/2014/main" id="{D1D181A1-54DA-4C45-8817-6C1A0ADAACA7}"/>
+              </a:ext>
+            </a:extLst>
+          </p:cNvPr>
+          <p:cNvSpPr>
+            <a:spLocks noGrp="1"/>
+          </p:cNvSpPr>
+          <p:nvPr>
+            <p:ph type="title"/>
+          </p:nvPr>
+        </p:nvSpPr>
+        <p:spPr/>
+        <p:txBody>
+          <a:bodyPr/>
+          <a:lstStyle/>
+          <a:p>
+            <a:r>
+              <a:rPr lang="en-US" dirty="0"/>
+              <a:t>References</a:t>
+            </a:r>
+            <a:endParaRPr lang="nl-NL" dirty="0"/>
+          </a:p>
+        </p:txBody>
+      </p:sp>
+      <p:sp>
+        <p:nvSpPr>
+          <p:cNvPr id="3" name="Content Placeholder 2">
+            <a:extLst>
+              <a:ext uri="{FF2B5EF4-FFF2-40B4-BE49-F238E27FC236}">
+                <a16:creationId xmlns:a16="http://schemas.microsoft.com/office/drawing/2014/main" id="{ACF3768A-4F58-42E2-AD90-5CA51596B4BE}"/>
+              </a:ext>
+            </a:extLst>
+          </p:cNvPr>
+          <p:cNvSpPr>
+            <a:spLocks noGrp="1"/>
+          </p:cNvSpPr>
+          <p:nvPr>
+            <p:ph idx="1"/>
+          </p:nvPr>
+        </p:nvSpPr>
+        <p:spPr>
+          <a:xfrm>
+            <a:off x="1097280" y="2108201"/>
+            <a:ext cx="10058400" cy="4262619"/>
+          </a:xfrm>
+        </p:spPr>
+        <p:txBody>
+          <a:bodyPr>
+            <a:normAutofit fontScale="92500" lnSpcReduction="10000"/>
+          </a:bodyPr>
+          <a:lstStyle/>
+          <a:p>
+            <a:pPr>
+              <a:spcBef>
+                <a:spcPts val="0"/>
+              </a:spcBef>
+              <a:spcAft>
+                <a:spcPts val="600"/>
+              </a:spcAft>
+            </a:pPr>
+            <a:r>
+              <a:rPr lang="en-US" b="1" dirty="0"/>
+              <a:t>Engine tutorials</a:t>
+            </a:r>
+          </a:p>
+          <a:p>
+            <a:pPr>
+              <a:spcBef>
+                <a:spcPts val="0"/>
+              </a:spcBef>
+              <a:spcAft>
+                <a:spcPts val="600"/>
+              </a:spcAft>
+            </a:pPr>
+            <a:r>
+              <a:rPr lang="en-US" dirty="0"/>
+              <a:t>Thin Matrix. (2014-2016). Videos 1-33. Retrieved from https://www.youtube.com/watch?v=VS8wlS9hF8E&amp;list=PLRIWtICgwaX0u7Rf9zkZhLoLuZVfUksDP</a:t>
+            </a:r>
+          </a:p>
+          <a:p>
+            <a:pPr>
+              <a:spcBef>
+                <a:spcPts val="0"/>
+              </a:spcBef>
+              <a:spcAft>
+                <a:spcPts val="600"/>
+              </a:spcAft>
+            </a:pPr>
+            <a:r>
+              <a:rPr lang="en-US" b="1" dirty="0"/>
+              <a:t>Water rendering tutorials</a:t>
+            </a:r>
+          </a:p>
+          <a:p>
+            <a:pPr>
+              <a:spcBef>
+                <a:spcPts val="0"/>
+              </a:spcBef>
+              <a:spcAft>
+                <a:spcPts val="600"/>
+              </a:spcAft>
+            </a:pPr>
+            <a:r>
+              <a:rPr lang="en-US" dirty="0"/>
+              <a:t>Thin Matrix. (2015). Videos 1-8. Retrieved from https://www.youtube.com/watch?v=HusvGeEDU_U&amp;list=PLRIWtICgwaX23jiqVByUs0bqhnalNTNZh</a:t>
+            </a:r>
+          </a:p>
+          <a:p>
+            <a:pPr>
+              <a:spcBef>
+                <a:spcPts val="0"/>
+              </a:spcBef>
+              <a:spcAft>
+                <a:spcPts val="600"/>
+              </a:spcAft>
+            </a:pPr>
+            <a:r>
+              <a:rPr lang="en-US" b="1" dirty="0"/>
+              <a:t>Physics equations</a:t>
+            </a:r>
+          </a:p>
+          <a:p>
+            <a:pPr>
+              <a:spcBef>
+                <a:spcPts val="0"/>
+              </a:spcBef>
+              <a:spcAft>
+                <a:spcPts val="600"/>
+              </a:spcAft>
+            </a:pPr>
+            <a:r>
+              <a:rPr lang="en-GB" dirty="0" err="1"/>
+              <a:t>Teschner</a:t>
+            </a:r>
+            <a:r>
+              <a:rPr lang="en-GB" dirty="0"/>
+              <a:t>, M. (n.d.). </a:t>
+            </a:r>
+            <a:r>
+              <a:rPr lang="en-GB" i="1" dirty="0"/>
+              <a:t>Simulation in Computer Graphics - Particles</a:t>
+            </a:r>
+            <a:r>
+              <a:rPr lang="en-GB" dirty="0"/>
+              <a:t>. Retrieved from https://cg.informatik.uni-freiburg.de/course_notes/sim_02_particles.pdf</a:t>
+            </a:r>
+          </a:p>
+          <a:p>
+            <a:pPr>
+              <a:spcBef>
+                <a:spcPts val="0"/>
+              </a:spcBef>
+              <a:spcAft>
+                <a:spcPts val="600"/>
+              </a:spcAft>
+            </a:pPr>
+            <a:r>
+              <a:rPr lang="en-US" dirty="0"/>
+              <a:t>University of Delaware. (n.d.). </a:t>
+            </a:r>
+            <a:r>
+              <a:rPr lang="en-US" i="1" dirty="0" err="1"/>
+              <a:t>Verlet</a:t>
+            </a:r>
+            <a:r>
+              <a:rPr lang="en-US" i="1" dirty="0"/>
+              <a:t> Method</a:t>
+            </a:r>
+            <a:r>
+              <a:rPr lang="en-US" dirty="0"/>
+              <a:t>. Retrieved from </a:t>
+            </a:r>
+            <a:r>
+              <a:rPr lang="en-GB" dirty="0"/>
+              <a:t>http://www.physics.udel.edu/~bnikolic/teaching/phys660/numerical_ode/node5.html</a:t>
+            </a:r>
+          </a:p>
+          <a:p>
+            <a:pPr>
+              <a:spcBef>
+                <a:spcPts val="0"/>
+              </a:spcBef>
+              <a:spcAft>
+                <a:spcPts val="600"/>
+              </a:spcAft>
+            </a:pPr>
+            <a:r>
+              <a:rPr lang="en-GB" dirty="0"/>
+              <a:t>Holm, C. (2012). </a:t>
+            </a:r>
+            <a:r>
+              <a:rPr lang="en-GB" i="1" dirty="0"/>
+              <a:t>Simulation Methods in Physics 1</a:t>
+            </a:r>
+            <a:r>
+              <a:rPr lang="en-GB" dirty="0"/>
+              <a:t>. Retrieved from https://www2.icp.uni-stuttgart.de/~icp/mediawiki/images/5/54/Skript_sim_methods_I.pdf</a:t>
+            </a:r>
+            <a:endParaRPr lang="en-US" dirty="0"/>
+          </a:p>
+        </p:txBody>
+      </p:sp>
+    </p:spTree>
+    <p:extLst>
+      <p:ext uri="{BB962C8B-B14F-4D97-AF65-F5344CB8AC3E}">
+        <p14:creationId xmlns:p14="http://schemas.microsoft.com/office/powerpoint/2010/main" val="2297088198"/>
       </p:ext>
     </p:extLst>
   </p:cSld>
@@ -7669,8 +7918,8 @@
           </a:p>
         </p:txBody>
       </p:sp>
-      <mc:AlternateContent xmlns:mc="http://schemas.openxmlformats.org/markup-compatibility/2006">
-        <mc:Choice xmlns:a14="http://schemas.microsoft.com/office/drawing/2010/main" Requires="a14">
+      <mc:AlternateContent xmlns:mc="http://schemas.openxmlformats.org/markup-compatibility/2006" xmlns:a14="http://schemas.microsoft.com/office/drawing/2010/main">
+        <mc:Choice Requires="a14">
           <p:sp>
             <p:nvSpPr>
               <p:cNvPr id="3" name="Content Placeholder 2">
@@ -8150,7 +8399,7 @@
             </p:txBody>
           </p:sp>
         </mc:Choice>
-        <mc:Fallback>
+        <mc:Fallback xmlns="">
           <p:sp>
             <p:nvSpPr>
               <p:cNvPr id="3" name="Content Placeholder 2">
@@ -8268,8 +8517,8 @@
           </a:p>
         </p:txBody>
       </p:sp>
-      <mc:AlternateContent xmlns:mc="http://schemas.openxmlformats.org/markup-compatibility/2006">
-        <mc:Choice xmlns:a14="http://schemas.microsoft.com/office/drawing/2010/main" Requires="a14">
+      <mc:AlternateContent xmlns:mc="http://schemas.openxmlformats.org/markup-compatibility/2006" xmlns:a14="http://schemas.microsoft.com/office/drawing/2010/main">
+        <mc:Choice Requires="a14">
           <p:sp>
             <p:nvSpPr>
               <p:cNvPr id="3" name="Content Placeholder 2">
@@ -8977,7 +9226,7 @@
             </p:txBody>
           </p:sp>
         </mc:Choice>
-        <mc:Fallback>
+        <mc:Fallback xmlns="">
           <p:sp>
             <p:nvSpPr>
               <p:cNvPr id="3" name="Content Placeholder 2">
@@ -9095,8 +9344,8 @@
           </a:p>
         </p:txBody>
       </p:sp>
-      <mc:AlternateContent xmlns:mc="http://schemas.openxmlformats.org/markup-compatibility/2006">
-        <mc:Choice xmlns:a14="http://schemas.microsoft.com/office/drawing/2010/main" Requires="a14">
+      <mc:AlternateContent xmlns:mc="http://schemas.openxmlformats.org/markup-compatibility/2006" xmlns:a14="http://schemas.microsoft.com/office/drawing/2010/main">
+        <mc:Choice Requires="a14">
           <p:sp>
             <p:nvSpPr>
               <p:cNvPr id="3" name="Content Placeholder 2">
@@ -10721,7 +10970,7 @@
             </p:txBody>
           </p:sp>
         </mc:Choice>
-        <mc:Fallback>
+        <mc:Fallback xmlns="">
           <p:sp>
             <p:nvSpPr>
               <p:cNvPr id="3" name="Content Placeholder 2">
@@ -11396,21 +11645,21 @@
 </file>
 
 <file path=customXml/item1.xml><?xml version="1.0" encoding="utf-8"?>
+<p:properties xmlns:p="http://schemas.microsoft.com/office/2006/metadata/properties" xmlns:xsi="http://www.w3.org/2001/XMLSchema-instance" xmlns:pc="http://schemas.microsoft.com/office/infopath/2007/PartnerControls">
+  <documentManagement>
+    <Status xmlns="71af3243-3dd4-4a8d-8c0d-dd76da1f02a5">Not started</Status>
+    <MediaServiceKeyPoints xmlns="71af3243-3dd4-4a8d-8c0d-dd76da1f02a5" xsi:nil="true"/>
+  </documentManagement>
+</p:properties>
+</file>
+
+<file path=customXml/item2.xml><?xml version="1.0" encoding="utf-8"?>
 <?mso-contentType ?>
 <FormTemplates xmlns="http://schemas.microsoft.com/sharepoint/v3/contenttype/forms">
   <Display>DocumentLibraryForm</Display>
   <Edit>DocumentLibraryForm</Edit>
   <New>DocumentLibraryForm</New>
 </FormTemplates>
-</file>
-
-<file path=customXml/item2.xml><?xml version="1.0" encoding="utf-8"?>
-<p:properties xmlns:p="http://schemas.microsoft.com/office/2006/metadata/properties" xmlns:xsi="http://www.w3.org/2001/XMLSchema-instance" xmlns:pc="http://schemas.microsoft.com/office/infopath/2007/PartnerControls">
-  <documentManagement>
-    <Status xmlns="71af3243-3dd4-4a8d-8c0d-dd76da1f02a5">Not started</Status>
-    <MediaServiceKeyPoints xmlns="71af3243-3dd4-4a8d-8c0d-dd76da1f02a5" xsi:nil="true"/>
-  </documentManagement>
-</p:properties>
 </file>
 
 <file path=customXml/item3.xml><?xml version="1.0" encoding="utf-8"?>
@@ -11635,19 +11884,19 @@
 </file>
 
 <file path=customXml/itemProps1.xml><?xml version="1.0" encoding="utf-8"?>
-<ds:datastoreItem xmlns:ds="http://schemas.openxmlformats.org/officeDocument/2006/customXml" ds:itemID="{3C586965-D4BF-4605-8C1C-5B8CCCAB7737}">
+<ds:datastoreItem xmlns:ds="http://schemas.openxmlformats.org/officeDocument/2006/customXml" ds:itemID="{626E351D-C19B-467F-A5C7-085C4CECACA9}">
   <ds:schemaRefs>
-    <ds:schemaRef ds:uri="http://schemas.microsoft.com/sharepoint/v3/contenttype/forms"/>
+    <ds:schemaRef ds:uri="http://schemas.microsoft.com/office/2006/metadata/properties"/>
+    <ds:schemaRef ds:uri="http://schemas.microsoft.com/office/infopath/2007/PartnerControls"/>
+    <ds:schemaRef ds:uri="71af3243-3dd4-4a8d-8c0d-dd76da1f02a5"/>
   </ds:schemaRefs>
 </ds:datastoreItem>
 </file>
 
 <file path=customXml/itemProps2.xml><?xml version="1.0" encoding="utf-8"?>
-<ds:datastoreItem xmlns:ds="http://schemas.openxmlformats.org/officeDocument/2006/customXml" ds:itemID="{626E351D-C19B-467F-A5C7-085C4CECACA9}">
+<ds:datastoreItem xmlns:ds="http://schemas.openxmlformats.org/officeDocument/2006/customXml" ds:itemID="{3C586965-D4BF-4605-8C1C-5B8CCCAB7737}">
   <ds:schemaRefs>
-    <ds:schemaRef ds:uri="http://schemas.microsoft.com/office/2006/metadata/properties"/>
-    <ds:schemaRef ds:uri="http://schemas.microsoft.com/office/infopath/2007/PartnerControls"/>
-    <ds:schemaRef ds:uri="71af3243-3dd4-4a8d-8c0d-dd76da1f02a5"/>
+    <ds:schemaRef ds:uri="http://schemas.microsoft.com/sharepoint/v3/contenttype/forms"/>
   </ds:schemaRefs>
 </ds:datastoreItem>
 </file>

</xml_diff>

<commit_message>
Small change to the bot slide and references
</commit_message>
<xml_diff>
--- a/Crazy Putting phase 2.pptx
+++ b/Crazy Putting phase 2.pptx
@@ -219,7 +219,7 @@
           <a:p>
             <a:fld id="{05052211-91C2-4B5D-9566-2C0C10015937}" type="datetimeFigureOut">
               <a:rPr lang="nl-NL" smtClean="0"/>
-              <a:t>15-05-2020</a:t>
+              <a:t>16-5-2020</a:t>
             </a:fld>
             <a:endParaRPr lang="nl-NL"/>
           </a:p>
@@ -1509,7 +1509,7 @@
           <a:p>
             <a:fld id="{9184DA70-C731-4C70-880D-CCD4705E623C}" type="datetime1">
               <a:rPr lang="en-US" smtClean="0"/>
-              <a:t>5/15/20</a:t>
+              <a:t>5/16/2020</a:t>
             </a:fld>
             <a:endParaRPr lang="en-US" dirty="0"/>
           </a:p>
@@ -1697,7 +1697,7 @@
           <a:p>
             <a:fld id="{4BE1D723-8F53-4F53-90B0-1982A396982E}" type="datetime1">
               <a:rPr lang="en-US" smtClean="0"/>
-              <a:t>5/15/20</a:t>
+              <a:t>5/16/2020</a:t>
             </a:fld>
             <a:endParaRPr lang="en-US" dirty="0"/>
           </a:p>
@@ -2070,7 +2070,7 @@
           <a:p>
             <a:fld id="{97669AF7-7BEB-44E4-9852-375E34362B5B}" type="datetime1">
               <a:rPr lang="en-US" smtClean="0"/>
-              <a:t>5/15/20</a:t>
+              <a:t>5/16/2020</a:t>
             </a:fld>
             <a:endParaRPr lang="en-US" dirty="0"/>
           </a:p>
@@ -2325,7 +2325,7 @@
           <a:p>
             <a:fld id="{BAAAC38D-0552-4C82-B593-E6124DFADBE2}" type="datetime1">
               <a:rPr lang="en-US" smtClean="0"/>
-              <a:t>5/15/20</a:t>
+              <a:t>5/16/2020</a:t>
             </a:fld>
             <a:endParaRPr lang="en-US" dirty="0"/>
           </a:p>
@@ -2722,7 +2722,7 @@
           <a:p>
             <a:fld id="{D9DF0F1C-5577-4ACB-BB62-DF8F3C494C7E}" type="datetime1">
               <a:rPr lang="en-US" smtClean="0"/>
-              <a:t>5/15/20</a:t>
+              <a:t>5/16/2020</a:t>
             </a:fld>
             <a:endParaRPr lang="en-US" dirty="0"/>
           </a:p>
@@ -2858,7 +2858,7 @@
           <a:p>
             <a:fld id="{1775B394-D9F9-4F0C-B15D-605F45CB9E9F}" type="datetime1">
               <a:rPr lang="en-US" smtClean="0"/>
-              <a:t>5/15/20</a:t>
+              <a:t>5/16/2020</a:t>
             </a:fld>
             <a:endParaRPr lang="en-US" dirty="0"/>
           </a:p>
@@ -3015,7 +3015,7 @@
           <a:p>
             <a:fld id="{39667345-2558-425A-8533-9BFDBCE15005}" type="datetime1">
               <a:rPr lang="en-US" smtClean="0"/>
-              <a:t>5/15/20</a:t>
+              <a:t>5/16/2020</a:t>
             </a:fld>
             <a:endParaRPr lang="en-US" dirty="0"/>
           </a:p>
@@ -3344,7 +3344,7 @@
           <a:p>
             <a:fld id="{92BEA474-078D-4E9B-9B14-09A87B19DC46}" type="datetime1">
               <a:rPr lang="en-US" smtClean="0"/>
-              <a:t>5/15/20</a:t>
+              <a:t>5/16/2020</a:t>
             </a:fld>
             <a:endParaRPr lang="en-US" dirty="0"/>
           </a:p>
@@ -3694,7 +3694,7 @@
           <a:p>
             <a:fld id="{4907D986-8816-4272-A432-0437A28A9828}" type="datetime1">
               <a:rPr lang="en-US" smtClean="0"/>
-              <a:t>5/15/20</a:t>
+              <a:t>5/16/2020</a:t>
             </a:fld>
             <a:endParaRPr lang="en-US" dirty="0"/>
           </a:p>
@@ -3955,7 +3955,7 @@
           <a:p>
             <a:fld id="{62D6E202-B606-4609-B914-27C9371A1F6D}" type="datetime1">
               <a:rPr lang="en-US" smtClean="0"/>
-              <a:t>5/15/20</a:t>
+              <a:t>5/16/2020</a:t>
             </a:fld>
             <a:endParaRPr lang="en-US" dirty="0"/>
           </a:p>
@@ -5564,7 +5564,7 @@
           <a:p>
             <a:r>
               <a:rPr lang="en-US" dirty="0"/>
-              <a:t>Our bot</a:t>
+              <a:t>Our bots</a:t>
             </a:r>
             <a:endParaRPr lang="nl-NL" dirty="0"/>
           </a:p>
@@ -5593,16 +5593,7 @@
           <a:p>
             <a:r>
               <a:rPr lang="en-US" dirty="0"/>
-              <a:t>We have a basic and advanced bot. The basic bot is simple to implement, but limited in capability and the advanced bot is smarter, but hard to implement.</a:t>
-            </a:r>
-          </a:p>
-          <a:p>
-            <a:endParaRPr lang="en-US" dirty="0"/>
-          </a:p>
-          <a:p>
-            <a:r>
-              <a:rPr lang="en-US" dirty="0"/>
-              <a:t>Basic bot ##ADD IMAGE DEMONSTRATING HOW IT WORKS## OR ##text##</a:t>
+              <a:t>We have a basic and advanced bot. The basic bot is simple to implement, but limited in capability and the advanced bot is smarter, but a little harder to implement.</a:t>
             </a:r>
           </a:p>
           <a:p>
@@ -6720,7 +6711,7 @@
         </p:spPr>
         <p:txBody>
           <a:bodyPr>
-            <a:normAutofit lnSpcReduction="10000"/>
+            <a:normAutofit fontScale="85000" lnSpcReduction="20000"/>
           </a:bodyPr>
           <a:lstStyle/>
           <a:p>
@@ -6748,7 +6739,7 @@
             </a:pPr>
             <a:r>
               <a:rPr lang="en-US" dirty="0"/>
-              <a:t>Thin Matrix. (2014-2016). Videos 1-33. Retrieved from https://www.youtube.com/watch?v=VS8wlS9hF8E&amp;list=PLRIWtICgwaX0u7Rf9zkZhLoLuZVfUksDP</a:t>
+              <a:t>Thin Matrix. (2014-2016). Videos 1-33. Retrieved from https://www.youtube.com/watch?v=VS8wlS9hF8E&amp;list=PLRIWtICgwaX0u7Rf9zkZhLoLuZVfUksDP  </a:t>
             </a:r>
           </a:p>
           <a:p>
@@ -6761,8 +6752,28 @@
               </a:spcAft>
             </a:pPr>
             <a:r>
-              <a:rPr lang="en-US" b="1" dirty="0"/>
-              <a:t>Water rendering tutorials</a:t>
+              <a:rPr lang="en-US" dirty="0" err="1"/>
+              <a:t>MrManiac</a:t>
+            </a:r>
+            <a:r>
+              <a:rPr lang="en-US" dirty="0"/>
+              <a:t>. (2015). Button tutorial - </a:t>
+            </a:r>
+            <a:r>
+              <a:rPr lang="en-US" dirty="0" err="1"/>
+              <a:t>ThinMatrix</a:t>
+            </a:r>
+            <a:r>
+              <a:rPr lang="en-US" dirty="0"/>
+              <a:t> </a:t>
+            </a:r>
+            <a:r>
+              <a:rPr lang="en-US" dirty="0" err="1"/>
+              <a:t>opengl</a:t>
+            </a:r>
+            <a:r>
+              <a:rPr lang="en-US" dirty="0"/>
+              <a:t> extension video. Retrieved from https://www.youtube.com/watch?v=GmmR37-LBPQ</a:t>
             </a:r>
           </a:p>
           <a:p>
@@ -6775,8 +6786,8 @@
               </a:spcAft>
             </a:pPr>
             <a:r>
-              <a:rPr lang="en-US" dirty="0"/>
-              <a:t>Thin Matrix. (2015). Videos 1-8. Retrieved from https://www.youtube.com/watch?v=HusvGeEDU_U&amp;list=PLRIWtICgwaX23jiqVByUs0bqhnalNTNZh</a:t>
+              <a:rPr lang="en-US" b="1" dirty="0"/>
+              <a:t>Water rendering tutorials</a:t>
             </a:r>
           </a:p>
           <a:p>
@@ -6789,8 +6800,8 @@
               </a:spcAft>
             </a:pPr>
             <a:r>
-              <a:rPr lang="en-US" b="1" dirty="0"/>
-              <a:t>Physics equations</a:t>
+              <a:rPr lang="en-US" dirty="0"/>
+              <a:t>Thin Matrix. (2015). Videos 1-8. Retrieved from https://www.youtube.com/watch?v=HusvGeEDU_U&amp;list=PLRIWtICgwaX23jiqVByUs0bqhnalNTNZh</a:t>
             </a:r>
           </a:p>
           <a:p>
@@ -6803,20 +6814,8 @@
               </a:spcAft>
             </a:pPr>
             <a:r>
-              <a:rPr lang="en-GB" dirty="0" err="1"/>
-              <a:t>Teschner</a:t>
-            </a:r>
-            <a:r>
-              <a:rPr lang="en-GB" dirty="0"/>
-              <a:t>, M. (n.d.). </a:t>
-            </a:r>
-            <a:r>
-              <a:rPr lang="en-GB" i="1" dirty="0"/>
-              <a:t>Simulation in Computer Graphics - Particles</a:t>
-            </a:r>
-            <a:r>
-              <a:rPr lang="en-GB" dirty="0"/>
-              <a:t>. Retrieved from https://cg.informatik.uni-freiburg.de/course_notes/sim_02_particles.pdf</a:t>
+              <a:rPr lang="en-US" b="1" dirty="0"/>
+              <a:t>Physics equations</a:t>
             </a:r>
           </a:p>
           <a:p>
@@ -6829,24 +6828,20 @@
               </a:spcAft>
             </a:pPr>
             <a:r>
-              <a:rPr lang="en-US" dirty="0"/>
-              <a:t>University of Delaware. (n.d.). </a:t>
-            </a:r>
-            <a:r>
-              <a:rPr lang="en-US" i="1" dirty="0" err="1"/>
-              <a:t>Verlet</a:t>
-            </a:r>
-            <a:r>
-              <a:rPr lang="en-US" i="1" dirty="0"/>
-              <a:t> Method</a:t>
-            </a:r>
-            <a:r>
-              <a:rPr lang="en-US" dirty="0"/>
-              <a:t>. Retrieved from </a:t>
+              <a:rPr lang="en-GB" dirty="0" err="1"/>
+              <a:t>Teschner</a:t>
             </a:r>
             <a:r>
               <a:rPr lang="en-GB" dirty="0"/>
-              <a:t>http://www.physics.udel.edu/~bnikolic/teaching/phys660/numerical_ode/node5.html</a:t>
+              <a:t>, M. (n.d.). </a:t>
+            </a:r>
+            <a:r>
+              <a:rPr lang="en-GB" i="1" dirty="0"/>
+              <a:t>Simulation in Computer Graphics - Particles</a:t>
+            </a:r>
+            <a:r>
+              <a:rPr lang="en-GB" dirty="0"/>
+              <a:t>. Retrieved from https://cg.informatik.uni-freiburg.de/course_notes/sim_02_particles.pdf</a:t>
             </a:r>
           </a:p>
           <a:p>
@@ -6859,6 +6854,36 @@
               </a:spcAft>
             </a:pPr>
             <a:r>
+              <a:rPr lang="en-US" dirty="0"/>
+              <a:t>University of Delaware. (n.d.). </a:t>
+            </a:r>
+            <a:r>
+              <a:rPr lang="en-US" i="1" dirty="0" err="1"/>
+              <a:t>Verlet</a:t>
+            </a:r>
+            <a:r>
+              <a:rPr lang="en-US" i="1" dirty="0"/>
+              <a:t> Method</a:t>
+            </a:r>
+            <a:r>
+              <a:rPr lang="en-US" dirty="0"/>
+              <a:t>. Retrieved from </a:t>
+            </a:r>
+            <a:r>
+              <a:rPr lang="en-GB" dirty="0"/>
+              <a:t>http://www.physics.udel.edu/~bnikolic/teaching/phys660/numerical_ode/node5.html</a:t>
+            </a:r>
+          </a:p>
+          <a:p>
+            <a:pPr>
+              <a:spcBef>
+                <a:spcPts val="0"/>
+              </a:spcBef>
+              <a:spcAft>
+                <a:spcPts val="600"/>
+              </a:spcAft>
+            </a:pPr>
+            <a:r>
               <a:rPr lang="en-GB" dirty="0"/>
               <a:t>Holm, C. (2012). </a:t>
             </a:r>
@@ -6868,8 +6893,19 @@
             </a:r>
             <a:r>
               <a:rPr lang="en-GB" dirty="0"/>
-              <a:t>. Retrieved from</a:t>
-            </a:r>
+              <a:t>. Retrieved from https://www2.icp.uni-stuttgart.de/~icp/mediawiki/images/5/54/Skript_sim_methods_I.pdf</a:t>
+            </a:r>
+          </a:p>
+          <a:p>
+            <a:pPr marL="0" indent="0">
+              <a:spcBef>
+                <a:spcPts val="0"/>
+              </a:spcBef>
+              <a:spcAft>
+                <a:spcPts val="600"/>
+              </a:spcAft>
+              <a:buNone/>
+            </a:pPr>
             <a:endParaRPr lang="en-US" dirty="0"/>
           </a:p>
         </p:txBody>
@@ -11791,6 +11827,15 @@
 </file>
 
 <file path=customXml/item1.xml><?xml version="1.0" encoding="utf-8"?>
+<p:properties xmlns:p="http://schemas.microsoft.com/office/2006/metadata/properties" xmlns:xsi="http://www.w3.org/2001/XMLSchema-instance" xmlns:pc="http://schemas.microsoft.com/office/infopath/2007/PartnerControls">
+  <documentManagement>
+    <Status xmlns="71af3243-3dd4-4a8d-8c0d-dd76da1f02a5">Not started</Status>
+    <MediaServiceKeyPoints xmlns="71af3243-3dd4-4a8d-8c0d-dd76da1f02a5" xsi:nil="true"/>
+  </documentManagement>
+</p:properties>
+</file>
+
+<file path=customXml/item2.xml><?xml version="1.0" encoding="utf-8"?>
 <ct:contentTypeSchema xmlns:ct="http://schemas.microsoft.com/office/2006/metadata/contentType" xmlns:ma="http://schemas.microsoft.com/office/2006/metadata/properties/metaAttributes" ct:_="" ma:_="" ma:contentTypeName="Document" ma:contentTypeID="0x01010079F111ED35F8CC479449609E8A0923A6" ma:contentTypeVersion="12" ma:contentTypeDescription="Create a new document." ma:contentTypeScope="" ma:versionID="a410dd7f93c95333ffa1b60ed6adedd1">
   <xsd:schema xmlns:xsd="http://www.w3.org/2001/XMLSchema" xmlns:xs="http://www.w3.org/2001/XMLSchema" xmlns:p="http://schemas.microsoft.com/office/2006/metadata/properties" xmlns:ns2="71af3243-3dd4-4a8d-8c0d-dd76da1f02a5" xmlns:ns3="16c05727-aa75-4e4a-9b5f-8a80a1165891" targetNamespace="http://schemas.microsoft.com/office/2006/metadata/properties" ma:root="true" ma:fieldsID="a936d9baba76aa3866493feff160faab" ns2:_="" ns3:_="">
     <xsd:import namespace="71af3243-3dd4-4a8d-8c0d-dd76da1f02a5"/>
@@ -12011,15 +12056,6 @@
 </ct:contentTypeSchema>
 </file>
 
-<file path=customXml/item2.xml><?xml version="1.0" encoding="utf-8"?>
-<p:properties xmlns:p="http://schemas.microsoft.com/office/2006/metadata/properties" xmlns:xsi="http://www.w3.org/2001/XMLSchema-instance" xmlns:pc="http://schemas.microsoft.com/office/infopath/2007/PartnerControls">
-  <documentManagement>
-    <Status xmlns="71af3243-3dd4-4a8d-8c0d-dd76da1f02a5">Not started</Status>
-    <MediaServiceKeyPoints xmlns="71af3243-3dd4-4a8d-8c0d-dd76da1f02a5" xsi:nil="true"/>
-  </documentManagement>
-</p:properties>
-</file>
-
 <file path=customXml/item3.xml><?xml version="1.0" encoding="utf-8"?>
 <?mso-contentType ?>
 <FormTemplates xmlns="http://schemas.microsoft.com/sharepoint/v3/contenttype/forms">
@@ -12030,6 +12066,16 @@
 </file>
 
 <file path=customXml/itemProps1.xml><?xml version="1.0" encoding="utf-8"?>
+<ds:datastoreItem xmlns:ds="http://schemas.openxmlformats.org/officeDocument/2006/customXml" ds:itemID="{626E351D-C19B-467F-A5C7-085C4CECACA9}">
+  <ds:schemaRefs>
+    <ds:schemaRef ds:uri="http://schemas.microsoft.com/office/2006/metadata/properties"/>
+    <ds:schemaRef ds:uri="http://schemas.microsoft.com/office/infopath/2007/PartnerControls"/>
+    <ds:schemaRef ds:uri="71af3243-3dd4-4a8d-8c0d-dd76da1f02a5"/>
+  </ds:schemaRefs>
+</ds:datastoreItem>
+</file>
+
+<file path=customXml/itemProps2.xml><?xml version="1.0" encoding="utf-8"?>
 <ds:datastoreItem xmlns:ds="http://schemas.openxmlformats.org/officeDocument/2006/customXml" ds:itemID="{6E499CE6-06FC-4D3E-8B56-30558CC9D1A4}">
   <ds:schemaRefs>
     <ds:schemaRef ds:uri="http://schemas.microsoft.com/office/2006/metadata/contentType"/>
@@ -12048,16 +12094,6 @@
 </ds:datastoreItem>
 </file>
 
-<file path=customXml/itemProps2.xml><?xml version="1.0" encoding="utf-8"?>
-<ds:datastoreItem xmlns:ds="http://schemas.openxmlformats.org/officeDocument/2006/customXml" ds:itemID="{626E351D-C19B-467F-A5C7-085C4CECACA9}">
-  <ds:schemaRefs>
-    <ds:schemaRef ds:uri="http://schemas.microsoft.com/office/2006/metadata/properties"/>
-    <ds:schemaRef ds:uri="http://schemas.microsoft.com/office/infopath/2007/PartnerControls"/>
-    <ds:schemaRef ds:uri="71af3243-3dd4-4a8d-8c0d-dd76da1f02a5"/>
-  </ds:schemaRefs>
-</ds:datastoreItem>
-</file>
-
 <file path=customXml/itemProps3.xml><?xml version="1.0" encoding="utf-8"?>
 <ds:datastoreItem xmlns:ds="http://schemas.openxmlformats.org/officeDocument/2006/customXml" ds:itemID="{3C586965-D4BF-4605-8C1C-5B8CCCAB7737}">
   <ds:schemaRefs>

</xml_diff>

<commit_message>
Fixed 90 degree offset for camera angle, but found out that every object is rotated incorrectly.
</commit_message>
<xml_diff>
--- a/Crazy Putting phase 2.pptx
+++ b/Crazy Putting phase 2.pptx
@@ -535,6 +535,15 @@
               <a:rPr lang="en-US" dirty="0"/>
               <a:t>Add game engine image</a:t>
             </a:r>
+          </a:p>
+          <a:p>
+            <a:endParaRPr lang="en-US" dirty="0"/>
+          </a:p>
+          <a:p>
+            <a:r>
+              <a:rPr lang="en-US" dirty="0"/>
+              <a:t>Jean</a:t>
+            </a:r>
             <a:endParaRPr lang="nl-NL" dirty="0"/>
           </a:p>
         </p:txBody>
@@ -566,6 +575,370 @@
     <p:extLst>
       <p:ext uri="{BB962C8B-B14F-4D97-AF65-F5344CB8AC3E}">
         <p14:creationId xmlns:p14="http://schemas.microsoft.com/office/powerpoint/2010/main" val="3156062854"/>
+      </p:ext>
+    </p:extLst>
+  </p:cSld>
+  <p:clrMapOvr>
+    <a:masterClrMapping/>
+  </p:clrMapOvr>
+</p:notes>
+</file>
+
+<file path=ppt/notesSlides/notesSlide10.xml><?xml version="1.0" encoding="utf-8"?>
+<p:notes xmlns:a="http://schemas.openxmlformats.org/drawingml/2006/main" xmlns:r="http://schemas.openxmlformats.org/officeDocument/2006/relationships" xmlns:p="http://schemas.openxmlformats.org/presentationml/2006/main">
+  <p:cSld>
+    <p:spTree>
+      <p:nvGrpSpPr>
+        <p:cNvPr id="1" name=""/>
+        <p:cNvGrpSpPr/>
+        <p:nvPr/>
+      </p:nvGrpSpPr>
+      <p:grpSpPr>
+        <a:xfrm>
+          <a:off x="0" y="0"/>
+          <a:ext cx="0" cy="0"/>
+          <a:chOff x="0" y="0"/>
+          <a:chExt cx="0" cy="0"/>
+        </a:xfrm>
+      </p:grpSpPr>
+      <p:sp>
+        <p:nvSpPr>
+          <p:cNvPr id="2" name="Slide Image Placeholder 1"/>
+          <p:cNvSpPr>
+            <a:spLocks noGrp="1" noRot="1" noChangeAspect="1"/>
+          </p:cNvSpPr>
+          <p:nvPr>
+            <p:ph type="sldImg"/>
+          </p:nvPr>
+        </p:nvSpPr>
+        <p:spPr/>
+      </p:sp>
+      <p:sp>
+        <p:nvSpPr>
+          <p:cNvPr id="3" name="Notes Placeholder 2"/>
+          <p:cNvSpPr>
+            <a:spLocks noGrp="1"/>
+          </p:cNvSpPr>
+          <p:nvPr>
+            <p:ph type="body" idx="1"/>
+          </p:nvPr>
+        </p:nvSpPr>
+        <p:spPr/>
+        <p:txBody>
+          <a:bodyPr/>
+          <a:lstStyle/>
+          <a:p>
+            <a:endParaRPr lang="nl-NL" dirty="0"/>
+          </a:p>
+        </p:txBody>
+      </p:sp>
+      <p:sp>
+        <p:nvSpPr>
+          <p:cNvPr id="4" name="Slide Number Placeholder 3"/>
+          <p:cNvSpPr>
+            <a:spLocks noGrp="1"/>
+          </p:cNvSpPr>
+          <p:nvPr>
+            <p:ph type="sldNum" sz="quarter" idx="5"/>
+          </p:nvPr>
+        </p:nvSpPr>
+        <p:spPr/>
+        <p:txBody>
+          <a:bodyPr/>
+          <a:lstStyle/>
+          <a:p>
+            <a:fld id="{F917F88C-BACD-4A94-B7B7-C91B49D4CB7C}" type="slidenum">
+              <a:rPr lang="nl-NL" smtClean="0"/>
+              <a:t>17</a:t>
+            </a:fld>
+            <a:endParaRPr lang="nl-NL"/>
+          </a:p>
+        </p:txBody>
+      </p:sp>
+    </p:spTree>
+    <p:extLst>
+      <p:ext uri="{BB962C8B-B14F-4D97-AF65-F5344CB8AC3E}">
+        <p14:creationId xmlns:p14="http://schemas.microsoft.com/office/powerpoint/2010/main" val="578386216"/>
+      </p:ext>
+    </p:extLst>
+  </p:cSld>
+  <p:clrMapOvr>
+    <a:masterClrMapping/>
+  </p:clrMapOvr>
+</p:notes>
+</file>
+
+<file path=ppt/notesSlides/notesSlide11.xml><?xml version="1.0" encoding="utf-8"?>
+<p:notes xmlns:a="http://schemas.openxmlformats.org/drawingml/2006/main" xmlns:r="http://schemas.openxmlformats.org/officeDocument/2006/relationships" xmlns:p="http://schemas.openxmlformats.org/presentationml/2006/main">
+  <p:cSld>
+    <p:spTree>
+      <p:nvGrpSpPr>
+        <p:cNvPr id="1" name=""/>
+        <p:cNvGrpSpPr/>
+        <p:nvPr/>
+      </p:nvGrpSpPr>
+      <p:grpSpPr>
+        <a:xfrm>
+          <a:off x="0" y="0"/>
+          <a:ext cx="0" cy="0"/>
+          <a:chOff x="0" y="0"/>
+          <a:chExt cx="0" cy="0"/>
+        </a:xfrm>
+      </p:grpSpPr>
+      <p:sp>
+        <p:nvSpPr>
+          <p:cNvPr id="2" name="Slide Image Placeholder 1"/>
+          <p:cNvSpPr>
+            <a:spLocks noGrp="1" noRot="1" noChangeAspect="1"/>
+          </p:cNvSpPr>
+          <p:nvPr>
+            <p:ph type="sldImg"/>
+          </p:nvPr>
+        </p:nvSpPr>
+        <p:spPr/>
+      </p:sp>
+      <p:sp>
+        <p:nvSpPr>
+          <p:cNvPr id="3" name="Notes Placeholder 2"/>
+          <p:cNvSpPr>
+            <a:spLocks noGrp="1"/>
+          </p:cNvSpPr>
+          <p:nvPr>
+            <p:ph type="body" idx="1"/>
+          </p:nvPr>
+        </p:nvSpPr>
+        <p:spPr/>
+        <p:txBody>
+          <a:bodyPr/>
+          <a:lstStyle/>
+          <a:p>
+            <a:r>
+              <a:rPr lang="en-US" dirty="0"/>
+              <a:t>Haoran</a:t>
+            </a:r>
+            <a:endParaRPr lang="nl-NL" dirty="0"/>
+          </a:p>
+        </p:txBody>
+      </p:sp>
+      <p:sp>
+        <p:nvSpPr>
+          <p:cNvPr id="4" name="Slide Number Placeholder 3"/>
+          <p:cNvSpPr>
+            <a:spLocks noGrp="1"/>
+          </p:cNvSpPr>
+          <p:nvPr>
+            <p:ph type="sldNum" sz="quarter" idx="5"/>
+          </p:nvPr>
+        </p:nvSpPr>
+        <p:spPr/>
+        <p:txBody>
+          <a:bodyPr/>
+          <a:lstStyle/>
+          <a:p>
+            <a:fld id="{F917F88C-BACD-4A94-B7B7-C91B49D4CB7C}" type="slidenum">
+              <a:rPr lang="nl-NL" smtClean="0"/>
+              <a:t>18</a:t>
+            </a:fld>
+            <a:endParaRPr lang="nl-NL"/>
+          </a:p>
+        </p:txBody>
+      </p:sp>
+    </p:spTree>
+    <p:extLst>
+      <p:ext uri="{BB962C8B-B14F-4D97-AF65-F5344CB8AC3E}">
+        <p14:creationId xmlns:p14="http://schemas.microsoft.com/office/powerpoint/2010/main" val="4239059902"/>
+      </p:ext>
+    </p:extLst>
+  </p:cSld>
+  <p:clrMapOvr>
+    <a:masterClrMapping/>
+  </p:clrMapOvr>
+</p:notes>
+</file>
+
+<file path=ppt/notesSlides/notesSlide12.xml><?xml version="1.0" encoding="utf-8"?>
+<p:notes xmlns:a="http://schemas.openxmlformats.org/drawingml/2006/main" xmlns:r="http://schemas.openxmlformats.org/officeDocument/2006/relationships" xmlns:p="http://schemas.openxmlformats.org/presentationml/2006/main">
+  <p:cSld>
+    <p:spTree>
+      <p:nvGrpSpPr>
+        <p:cNvPr id="1" name=""/>
+        <p:cNvGrpSpPr/>
+        <p:nvPr/>
+      </p:nvGrpSpPr>
+      <p:grpSpPr>
+        <a:xfrm>
+          <a:off x="0" y="0"/>
+          <a:ext cx="0" cy="0"/>
+          <a:chOff x="0" y="0"/>
+          <a:chExt cx="0" cy="0"/>
+        </a:xfrm>
+      </p:grpSpPr>
+      <p:sp>
+        <p:nvSpPr>
+          <p:cNvPr id="2" name="Slide Image Placeholder 1"/>
+          <p:cNvSpPr>
+            <a:spLocks noGrp="1" noRot="1" noChangeAspect="1"/>
+          </p:cNvSpPr>
+          <p:nvPr>
+            <p:ph type="sldImg"/>
+          </p:nvPr>
+        </p:nvSpPr>
+        <p:spPr/>
+      </p:sp>
+      <p:sp>
+        <p:nvSpPr>
+          <p:cNvPr id="3" name="Notes Placeholder 2"/>
+          <p:cNvSpPr>
+            <a:spLocks noGrp="1"/>
+          </p:cNvSpPr>
+          <p:nvPr>
+            <p:ph type="body" idx="1"/>
+          </p:nvPr>
+        </p:nvSpPr>
+        <p:spPr/>
+        <p:txBody>
+          <a:bodyPr/>
+          <a:lstStyle/>
+          <a:p>
+            <a:pPr marL="0" marR="0" lvl="0" indent="0" algn="l" defTabSz="914400" rtl="0" eaLnBrk="1" fontAlgn="auto" latinLnBrk="0" hangingPunct="1">
+              <a:lnSpc>
+                <a:spcPct val="100000"/>
+              </a:lnSpc>
+              <a:spcBef>
+                <a:spcPts val="0"/>
+              </a:spcBef>
+              <a:spcAft>
+                <a:spcPts val="0"/>
+              </a:spcAft>
+              <a:buClrTx/>
+              <a:buSzTx/>
+              <a:buFontTx/>
+              <a:buNone/>
+              <a:tabLst/>
+              <a:defRPr/>
+            </a:pPr>
+            <a:r>
+              <a:rPr lang="en-US" dirty="0"/>
+              <a:t>Haoran</a:t>
+            </a:r>
+            <a:endParaRPr lang="nl-NL" dirty="0"/>
+          </a:p>
+          <a:p>
+            <a:endParaRPr lang="nl-NL" dirty="0"/>
+          </a:p>
+        </p:txBody>
+      </p:sp>
+      <p:sp>
+        <p:nvSpPr>
+          <p:cNvPr id="4" name="Slide Number Placeholder 3"/>
+          <p:cNvSpPr>
+            <a:spLocks noGrp="1"/>
+          </p:cNvSpPr>
+          <p:nvPr>
+            <p:ph type="sldNum" sz="quarter" idx="5"/>
+          </p:nvPr>
+        </p:nvSpPr>
+        <p:spPr/>
+        <p:txBody>
+          <a:bodyPr/>
+          <a:lstStyle/>
+          <a:p>
+            <a:fld id="{F917F88C-BACD-4A94-B7B7-C91B49D4CB7C}" type="slidenum">
+              <a:rPr lang="nl-NL" smtClean="0"/>
+              <a:t>19</a:t>
+            </a:fld>
+            <a:endParaRPr lang="nl-NL"/>
+          </a:p>
+        </p:txBody>
+      </p:sp>
+    </p:spTree>
+    <p:extLst>
+      <p:ext uri="{BB962C8B-B14F-4D97-AF65-F5344CB8AC3E}">
+        <p14:creationId xmlns:p14="http://schemas.microsoft.com/office/powerpoint/2010/main" val="698330914"/>
+      </p:ext>
+    </p:extLst>
+  </p:cSld>
+  <p:clrMapOvr>
+    <a:masterClrMapping/>
+  </p:clrMapOvr>
+</p:notes>
+</file>
+
+<file path=ppt/notesSlides/notesSlide13.xml><?xml version="1.0" encoding="utf-8"?>
+<p:notes xmlns:a="http://schemas.openxmlformats.org/drawingml/2006/main" xmlns:r="http://schemas.openxmlformats.org/officeDocument/2006/relationships" xmlns:p="http://schemas.openxmlformats.org/presentationml/2006/main">
+  <p:cSld>
+    <p:spTree>
+      <p:nvGrpSpPr>
+        <p:cNvPr id="1" name=""/>
+        <p:cNvGrpSpPr/>
+        <p:nvPr/>
+      </p:nvGrpSpPr>
+      <p:grpSpPr>
+        <a:xfrm>
+          <a:off x="0" y="0"/>
+          <a:ext cx="0" cy="0"/>
+          <a:chOff x="0" y="0"/>
+          <a:chExt cx="0" cy="0"/>
+        </a:xfrm>
+      </p:grpSpPr>
+      <p:sp>
+        <p:nvSpPr>
+          <p:cNvPr id="2" name="Slide Image Placeholder 1"/>
+          <p:cNvSpPr>
+            <a:spLocks noGrp="1" noRot="1" noChangeAspect="1"/>
+          </p:cNvSpPr>
+          <p:nvPr>
+            <p:ph type="sldImg"/>
+          </p:nvPr>
+        </p:nvSpPr>
+        <p:spPr/>
+      </p:sp>
+      <p:sp>
+        <p:nvSpPr>
+          <p:cNvPr id="3" name="Notes Placeholder 2"/>
+          <p:cNvSpPr>
+            <a:spLocks noGrp="1"/>
+          </p:cNvSpPr>
+          <p:nvPr>
+            <p:ph type="body" idx="1"/>
+          </p:nvPr>
+        </p:nvSpPr>
+        <p:spPr/>
+        <p:txBody>
+          <a:bodyPr/>
+          <a:lstStyle/>
+          <a:p>
+            <a:endParaRPr lang="nl-NL" dirty="0"/>
+          </a:p>
+        </p:txBody>
+      </p:sp>
+      <p:sp>
+        <p:nvSpPr>
+          <p:cNvPr id="4" name="Slide Number Placeholder 3"/>
+          <p:cNvSpPr>
+            <a:spLocks noGrp="1"/>
+          </p:cNvSpPr>
+          <p:nvPr>
+            <p:ph type="sldNum" sz="quarter" idx="5"/>
+          </p:nvPr>
+        </p:nvSpPr>
+        <p:spPr/>
+        <p:txBody>
+          <a:bodyPr/>
+          <a:lstStyle/>
+          <a:p>
+            <a:fld id="{F917F88C-BACD-4A94-B7B7-C91B49D4CB7C}" type="slidenum">
+              <a:rPr lang="nl-NL" smtClean="0"/>
+              <a:t>20</a:t>
+            </a:fld>
+            <a:endParaRPr lang="nl-NL"/>
+          </a:p>
+        </p:txBody>
+      </p:sp>
+    </p:spTree>
+    <p:extLst>
+      <p:ext uri="{BB962C8B-B14F-4D97-AF65-F5344CB8AC3E}">
+        <p14:creationId xmlns:p14="http://schemas.microsoft.com/office/powerpoint/2010/main" val="1481435570"/>
       </p:ext>
     </p:extLst>
   </p:cSld>
@@ -619,10 +992,31 @@
           <a:bodyPr/>
           <a:lstStyle/>
           <a:p>
-            <a:r>
-              <a:rPr lang="nl-NL" dirty="0"/>
-              <a:t>https://youtu.be/n98XWUwbvXo</a:t>
-            </a:r>
+            <a:pPr marL="0" marR="0" lvl="0" indent="0" algn="l" defTabSz="914400" rtl="0" eaLnBrk="1" fontAlgn="auto" latinLnBrk="0" hangingPunct="1">
+              <a:lnSpc>
+                <a:spcPct val="100000"/>
+              </a:lnSpc>
+              <a:spcBef>
+                <a:spcPts val="0"/>
+              </a:spcBef>
+              <a:spcAft>
+                <a:spcPts val="0"/>
+              </a:spcAft>
+              <a:buClrTx/>
+              <a:buSzTx/>
+              <a:buFontTx/>
+              <a:buNone/>
+              <a:tabLst/>
+              <a:defRPr/>
+            </a:pPr>
+            <a:r>
+              <a:rPr lang="en-US" dirty="0"/>
+              <a:t>Jean</a:t>
+            </a:r>
+            <a:endParaRPr lang="nl-NL" dirty="0"/>
+          </a:p>
+          <a:p>
+            <a:endParaRPr lang="nl-NL" dirty="0"/>
           </a:p>
         </p:txBody>
       </p:sp>
@@ -643,7 +1037,7 @@
           <a:p>
             <a:fld id="{F917F88C-BACD-4A94-B7B7-C91B49D4CB7C}" type="slidenum">
               <a:rPr lang="nl-NL" smtClean="0"/>
-              <a:t>5</a:t>
+              <a:t>2</a:t>
             </a:fld>
             <a:endParaRPr lang="nl-NL"/>
           </a:p>
@@ -652,7 +1046,7 @@
     </p:spTree>
     <p:extLst>
       <p:ext uri="{BB962C8B-B14F-4D97-AF65-F5344CB8AC3E}">
-        <p14:creationId xmlns:p14="http://schemas.microsoft.com/office/powerpoint/2010/main" val="844264571"/>
+        <p14:creationId xmlns:p14="http://schemas.microsoft.com/office/powerpoint/2010/main" val="723823530"/>
       </p:ext>
     </p:extLst>
   </p:cSld>
@@ -706,6 +1100,30 @@
           <a:bodyPr/>
           <a:lstStyle/>
           <a:p>
+            <a:pPr marL="0" marR="0" lvl="0" indent="0" algn="l" defTabSz="914400" rtl="0" eaLnBrk="1" fontAlgn="auto" latinLnBrk="0" hangingPunct="1">
+              <a:lnSpc>
+                <a:spcPct val="100000"/>
+              </a:lnSpc>
+              <a:spcBef>
+                <a:spcPts val="0"/>
+              </a:spcBef>
+              <a:spcAft>
+                <a:spcPts val="0"/>
+              </a:spcAft>
+              <a:buClrTx/>
+              <a:buSzTx/>
+              <a:buFontTx/>
+              <a:buNone/>
+              <a:tabLst/>
+              <a:defRPr/>
+            </a:pPr>
+            <a:r>
+              <a:rPr lang="en-US" dirty="0"/>
+              <a:t>Jean</a:t>
+            </a:r>
+            <a:endParaRPr lang="nl-NL" dirty="0"/>
+          </a:p>
+          <a:p>
             <a:endParaRPr lang="nl-NL" dirty="0"/>
           </a:p>
         </p:txBody>
@@ -727,7 +1145,7 @@
           <a:p>
             <a:fld id="{F917F88C-BACD-4A94-B7B7-C91B49D4CB7C}" type="slidenum">
               <a:rPr lang="nl-NL" smtClean="0"/>
-              <a:t>6</a:t>
+              <a:t>3</a:t>
             </a:fld>
             <a:endParaRPr lang="nl-NL"/>
           </a:p>
@@ -736,7 +1154,7 @@
     </p:spTree>
     <p:extLst>
       <p:ext uri="{BB962C8B-B14F-4D97-AF65-F5344CB8AC3E}">
-        <p14:creationId xmlns:p14="http://schemas.microsoft.com/office/powerpoint/2010/main" val="4253772193"/>
+        <p14:creationId xmlns:p14="http://schemas.microsoft.com/office/powerpoint/2010/main" val="1320508690"/>
       </p:ext>
     </p:extLst>
   </p:cSld>
@@ -791,10 +1209,9 @@
           <a:lstStyle/>
           <a:p>
             <a:r>
-              <a:rPr lang="en-US" dirty="0"/>
-              <a:t>First ask the examiners if they would like us to explain the formulas. Possibly skip this slide</a:t>
-            </a:r>
-            <a:endParaRPr lang="nl-NL" dirty="0"/>
+              <a:rPr lang="nl-NL" dirty="0"/>
+              <a:t>https://youtu.be/n98XWUwbvXo</a:t>
+            </a:r>
           </a:p>
         </p:txBody>
       </p:sp>
@@ -815,7 +1232,7 @@
           <a:p>
             <a:fld id="{F917F88C-BACD-4A94-B7B7-C91B49D4CB7C}" type="slidenum">
               <a:rPr lang="nl-NL" smtClean="0"/>
-              <a:t>7</a:t>
+              <a:t>5</a:t>
             </a:fld>
             <a:endParaRPr lang="nl-NL"/>
           </a:p>
@@ -824,7 +1241,7 @@
     </p:spTree>
     <p:extLst>
       <p:ext uri="{BB962C8B-B14F-4D97-AF65-F5344CB8AC3E}">
-        <p14:creationId xmlns:p14="http://schemas.microsoft.com/office/powerpoint/2010/main" val="876129242"/>
+        <p14:creationId xmlns:p14="http://schemas.microsoft.com/office/powerpoint/2010/main" val="844264571"/>
       </p:ext>
     </p:extLst>
   </p:cSld>
@@ -878,10 +1295,6 @@
           <a:bodyPr/>
           <a:lstStyle/>
           <a:p>
-            <a:r>
-              <a:rPr lang="en-US" dirty="0"/>
-              <a:t>First ask the examiners if they would like us to explain the formulas. Possibly skip this slide</a:t>
-            </a:r>
             <a:endParaRPr lang="nl-NL" dirty="0"/>
           </a:p>
         </p:txBody>
@@ -903,7 +1316,7 @@
           <a:p>
             <a:fld id="{F917F88C-BACD-4A94-B7B7-C91B49D4CB7C}" type="slidenum">
               <a:rPr lang="nl-NL" smtClean="0"/>
-              <a:t>8</a:t>
+              <a:t>6</a:t>
             </a:fld>
             <a:endParaRPr lang="nl-NL"/>
           </a:p>
@@ -912,7 +1325,7 @@
     </p:spTree>
     <p:extLst>
       <p:ext uri="{BB962C8B-B14F-4D97-AF65-F5344CB8AC3E}">
-        <p14:creationId xmlns:p14="http://schemas.microsoft.com/office/powerpoint/2010/main" val="2843381561"/>
+        <p14:creationId xmlns:p14="http://schemas.microsoft.com/office/powerpoint/2010/main" val="4253772193"/>
       </p:ext>
     </p:extLst>
   </p:cSld>
@@ -991,7 +1404,7 @@
           <a:p>
             <a:fld id="{F917F88C-BACD-4A94-B7B7-C91B49D4CB7C}" type="slidenum">
               <a:rPr lang="nl-NL" smtClean="0"/>
-              <a:t>9</a:t>
+              <a:t>7</a:t>
             </a:fld>
             <a:endParaRPr lang="nl-NL"/>
           </a:p>
@@ -1000,7 +1413,7 @@
     </p:spTree>
     <p:extLst>
       <p:ext uri="{BB962C8B-B14F-4D97-AF65-F5344CB8AC3E}">
-        <p14:creationId xmlns:p14="http://schemas.microsoft.com/office/powerpoint/2010/main" val="1933149079"/>
+        <p14:creationId xmlns:p14="http://schemas.microsoft.com/office/powerpoint/2010/main" val="876129242"/>
       </p:ext>
     </p:extLst>
   </p:cSld>
@@ -1055,9 +1468,10 @@
           <a:lstStyle/>
           <a:p>
             <a:r>
-              <a:rPr lang="nl-NL" dirty="0"/>
-              <a:t>https://gamedev.stackexchange.com/questions/33694/pros-and-cons-of-different-integrators</a:t>
-            </a:r>
+              <a:rPr lang="en-US" dirty="0"/>
+              <a:t>First ask the examiners if they would like us to explain the formulas. Possibly skip this slide</a:t>
+            </a:r>
+            <a:endParaRPr lang="nl-NL" dirty="0"/>
           </a:p>
         </p:txBody>
       </p:sp>
@@ -1078,7 +1492,7 @@
           <a:p>
             <a:fld id="{F917F88C-BACD-4A94-B7B7-C91B49D4CB7C}" type="slidenum">
               <a:rPr lang="nl-NL" smtClean="0"/>
-              <a:t>10</a:t>
+              <a:t>8</a:t>
             </a:fld>
             <a:endParaRPr lang="nl-NL"/>
           </a:p>
@@ -1087,7 +1501,7 @@
     </p:spTree>
     <p:extLst>
       <p:ext uri="{BB962C8B-B14F-4D97-AF65-F5344CB8AC3E}">
-        <p14:creationId xmlns:p14="http://schemas.microsoft.com/office/powerpoint/2010/main" val="36093434"/>
+        <p14:creationId xmlns:p14="http://schemas.microsoft.com/office/powerpoint/2010/main" val="2843381561"/>
       </p:ext>
     </p:extLst>
   </p:cSld>
@@ -1141,6 +1555,10 @@
           <a:bodyPr/>
           <a:lstStyle/>
           <a:p>
+            <a:r>
+              <a:rPr lang="en-US" dirty="0"/>
+              <a:t>First ask the examiners if they would like us to explain the formulas. Possibly skip this slide</a:t>
+            </a:r>
             <a:endParaRPr lang="nl-NL" dirty="0"/>
           </a:p>
         </p:txBody>
@@ -1162,7 +1580,7 @@
           <a:p>
             <a:fld id="{F917F88C-BACD-4A94-B7B7-C91B49D4CB7C}" type="slidenum">
               <a:rPr lang="nl-NL" smtClean="0"/>
-              <a:t>17</a:t>
+              <a:t>9</a:t>
             </a:fld>
             <a:endParaRPr lang="nl-NL"/>
           </a:p>
@@ -1171,7 +1589,7 @@
     </p:spTree>
     <p:extLst>
       <p:ext uri="{BB962C8B-B14F-4D97-AF65-F5344CB8AC3E}">
-        <p14:creationId xmlns:p14="http://schemas.microsoft.com/office/powerpoint/2010/main" val="578386216"/>
+        <p14:creationId xmlns:p14="http://schemas.microsoft.com/office/powerpoint/2010/main" val="1933149079"/>
       </p:ext>
     </p:extLst>
   </p:cSld>
@@ -1225,7 +1643,10 @@
           <a:bodyPr/>
           <a:lstStyle/>
           <a:p>
-            <a:endParaRPr lang="nl-NL" dirty="0"/>
+            <a:r>
+              <a:rPr lang="nl-NL" dirty="0"/>
+              <a:t>https://gamedev.stackexchange.com/questions/33694/pros-and-cons-of-different-integrators</a:t>
+            </a:r>
           </a:p>
         </p:txBody>
       </p:sp>
@@ -1246,7 +1667,7 @@
           <a:p>
             <a:fld id="{F917F88C-BACD-4A94-B7B7-C91B49D4CB7C}" type="slidenum">
               <a:rPr lang="nl-NL" smtClean="0"/>
-              <a:t>20</a:t>
+              <a:t>10</a:t>
             </a:fld>
             <a:endParaRPr lang="nl-NL"/>
           </a:p>
@@ -1255,7 +1676,7 @@
     </p:spTree>
     <p:extLst>
       <p:ext uri="{BB962C8B-B14F-4D97-AF65-F5344CB8AC3E}">
-        <p14:creationId xmlns:p14="http://schemas.microsoft.com/office/powerpoint/2010/main" val="1481435570"/>
+        <p14:creationId xmlns:p14="http://schemas.microsoft.com/office/powerpoint/2010/main" val="36093434"/>
       </p:ext>
     </p:extLst>
   </p:cSld>
@@ -7737,7 +8158,7 @@
         </p:blipFill>
         <p:spPr>
           <a:xfrm>
-            <a:off x="4742017" y="1517039"/>
+            <a:off x="4742017" y="1527199"/>
             <a:ext cx="6798082" cy="3823921"/>
           </a:xfrm>
           <a:prstGeom prst="rect">
@@ -11827,15 +12248,6 @@
 </file>
 
 <file path=customXml/item1.xml><?xml version="1.0" encoding="utf-8"?>
-<p:properties xmlns:p="http://schemas.microsoft.com/office/2006/metadata/properties" xmlns:xsi="http://www.w3.org/2001/XMLSchema-instance" xmlns:pc="http://schemas.microsoft.com/office/infopath/2007/PartnerControls">
-  <documentManagement>
-    <Status xmlns="71af3243-3dd4-4a8d-8c0d-dd76da1f02a5">Not started</Status>
-    <MediaServiceKeyPoints xmlns="71af3243-3dd4-4a8d-8c0d-dd76da1f02a5" xsi:nil="true"/>
-  </documentManagement>
-</p:properties>
-</file>
-
-<file path=customXml/item2.xml><?xml version="1.0" encoding="utf-8"?>
 <ct:contentTypeSchema xmlns:ct="http://schemas.microsoft.com/office/2006/metadata/contentType" xmlns:ma="http://schemas.microsoft.com/office/2006/metadata/properties/metaAttributes" ct:_="" ma:_="" ma:contentTypeName="Document" ma:contentTypeID="0x01010079F111ED35F8CC479449609E8A0923A6" ma:contentTypeVersion="12" ma:contentTypeDescription="Create a new document." ma:contentTypeScope="" ma:versionID="a410dd7f93c95333ffa1b60ed6adedd1">
   <xsd:schema xmlns:xsd="http://www.w3.org/2001/XMLSchema" xmlns:xs="http://www.w3.org/2001/XMLSchema" xmlns:p="http://schemas.microsoft.com/office/2006/metadata/properties" xmlns:ns2="71af3243-3dd4-4a8d-8c0d-dd76da1f02a5" xmlns:ns3="16c05727-aa75-4e4a-9b5f-8a80a1165891" targetNamespace="http://schemas.microsoft.com/office/2006/metadata/properties" ma:root="true" ma:fieldsID="a936d9baba76aa3866493feff160faab" ns2:_="" ns3:_="">
     <xsd:import namespace="71af3243-3dd4-4a8d-8c0d-dd76da1f02a5"/>
@@ -12056,6 +12468,15 @@
 </ct:contentTypeSchema>
 </file>
 
+<file path=customXml/item2.xml><?xml version="1.0" encoding="utf-8"?>
+<p:properties xmlns:p="http://schemas.microsoft.com/office/2006/metadata/properties" xmlns:xsi="http://www.w3.org/2001/XMLSchema-instance" xmlns:pc="http://schemas.microsoft.com/office/infopath/2007/PartnerControls">
+  <documentManagement>
+    <Status xmlns="71af3243-3dd4-4a8d-8c0d-dd76da1f02a5">Not started</Status>
+    <MediaServiceKeyPoints xmlns="71af3243-3dd4-4a8d-8c0d-dd76da1f02a5" xsi:nil="true"/>
+  </documentManagement>
+</p:properties>
+</file>
+
 <file path=customXml/item3.xml><?xml version="1.0" encoding="utf-8"?>
 <?mso-contentType ?>
 <FormTemplates xmlns="http://schemas.microsoft.com/sharepoint/v3/contenttype/forms">
@@ -12066,16 +12487,6 @@
 </file>
 
 <file path=customXml/itemProps1.xml><?xml version="1.0" encoding="utf-8"?>
-<ds:datastoreItem xmlns:ds="http://schemas.openxmlformats.org/officeDocument/2006/customXml" ds:itemID="{626E351D-C19B-467F-A5C7-085C4CECACA9}">
-  <ds:schemaRefs>
-    <ds:schemaRef ds:uri="http://schemas.microsoft.com/office/2006/metadata/properties"/>
-    <ds:schemaRef ds:uri="http://schemas.microsoft.com/office/infopath/2007/PartnerControls"/>
-    <ds:schemaRef ds:uri="71af3243-3dd4-4a8d-8c0d-dd76da1f02a5"/>
-  </ds:schemaRefs>
-</ds:datastoreItem>
-</file>
-
-<file path=customXml/itemProps2.xml><?xml version="1.0" encoding="utf-8"?>
 <ds:datastoreItem xmlns:ds="http://schemas.openxmlformats.org/officeDocument/2006/customXml" ds:itemID="{6E499CE6-06FC-4D3E-8B56-30558CC9D1A4}">
   <ds:schemaRefs>
     <ds:schemaRef ds:uri="http://schemas.microsoft.com/office/2006/metadata/contentType"/>
@@ -12094,6 +12505,16 @@
 </ds:datastoreItem>
 </file>
 
+<file path=customXml/itemProps2.xml><?xml version="1.0" encoding="utf-8"?>
+<ds:datastoreItem xmlns:ds="http://schemas.openxmlformats.org/officeDocument/2006/customXml" ds:itemID="{626E351D-C19B-467F-A5C7-085C4CECACA9}">
+  <ds:schemaRefs>
+    <ds:schemaRef ds:uri="http://schemas.microsoft.com/office/2006/metadata/properties"/>
+    <ds:schemaRef ds:uri="http://schemas.microsoft.com/office/infopath/2007/PartnerControls"/>
+    <ds:schemaRef ds:uri="71af3243-3dd4-4a8d-8c0d-dd76da1f02a5"/>
+  </ds:schemaRefs>
+</ds:datastoreItem>
+</file>
+
 <file path=customXml/itemProps3.xml><?xml version="1.0" encoding="utf-8"?>
 <ds:datastoreItem xmlns:ds="http://schemas.openxmlformats.org/officeDocument/2006/customXml" ds:itemID="{3C586965-D4BF-4605-8C1C-5B8CCCAB7737}">
   <ds:schemaRefs>

</xml_diff>

<commit_message>
Updated presentation, trying to test new test function
</commit_message>
<xml_diff>
--- a/Crazy Putting phase 2.pptx
+++ b/Crazy Putting phase 2.pptx
@@ -5,7 +5,7 @@
     <p:sldMasterId id="2147483660" r:id="rId4"/>
   </p:sldMasterIdLst>
   <p:notesMasterIdLst>
-    <p:notesMasterId r:id="rId26"/>
+    <p:notesMasterId r:id="rId25"/>
   </p:notesMasterIdLst>
   <p:sldIdLst>
     <p:sldId id="265" r:id="rId5"/>
@@ -22,13 +22,12 @@
     <p:sldId id="307" r:id="rId16"/>
     <p:sldId id="308" r:id="rId17"/>
     <p:sldId id="299" r:id="rId18"/>
-    <p:sldId id="303" r:id="rId19"/>
-    <p:sldId id="309" r:id="rId20"/>
-    <p:sldId id="292" r:id="rId21"/>
-    <p:sldId id="300" r:id="rId22"/>
-    <p:sldId id="306" r:id="rId23"/>
-    <p:sldId id="295" r:id="rId24"/>
-    <p:sldId id="287" r:id="rId25"/>
+    <p:sldId id="309" r:id="rId19"/>
+    <p:sldId id="292" r:id="rId20"/>
+    <p:sldId id="300" r:id="rId21"/>
+    <p:sldId id="306" r:id="rId22"/>
+    <p:sldId id="295" r:id="rId23"/>
+    <p:sldId id="287" r:id="rId24"/>
   </p:sldIdLst>
   <p:sldSz cx="12192000" cy="6858000"/>
   <p:notesSz cx="6858000" cy="9144000"/>
@@ -220,7 +219,7 @@
           <a:p>
             <a:fld id="{05052211-91C2-4B5D-9566-2C0C10015937}" type="datetimeFigureOut">
               <a:rPr lang="nl-NL" smtClean="0"/>
-              <a:t>17-05-2020</a:t>
+              <a:t>18-5-2020</a:t>
             </a:fld>
             <a:endParaRPr lang="nl-NL"/>
           </a:p>
@@ -650,7 +649,7 @@
           <a:p>
             <a:fld id="{F917F88C-BACD-4A94-B7B7-C91B49D4CB7C}" type="slidenum">
               <a:rPr lang="nl-NL" smtClean="0"/>
-              <a:t>18</a:t>
+              <a:t>17</a:t>
             </a:fld>
             <a:endParaRPr lang="nl-NL"/>
           </a:p>
@@ -738,7 +737,7 @@
           <a:p>
             <a:fld id="{F917F88C-BACD-4A94-B7B7-C91B49D4CB7C}" type="slidenum">
               <a:rPr lang="nl-NL" smtClean="0"/>
-              <a:t>19</a:t>
+              <a:t>18</a:t>
             </a:fld>
             <a:endParaRPr lang="nl-NL"/>
           </a:p>
@@ -846,7 +845,7 @@
           <a:p>
             <a:fld id="{F917F88C-BACD-4A94-B7B7-C91B49D4CB7C}" type="slidenum">
               <a:rPr lang="nl-NL" smtClean="0"/>
-              <a:t>20</a:t>
+              <a:t>19</a:t>
             </a:fld>
             <a:endParaRPr lang="nl-NL"/>
           </a:p>
@@ -930,7 +929,7 @@
           <a:p>
             <a:fld id="{F917F88C-BACD-4A94-B7B7-C91B49D4CB7C}" type="slidenum">
               <a:rPr lang="nl-NL" smtClean="0"/>
-              <a:t>21</a:t>
+              <a:t>20</a:t>
             </a:fld>
             <a:endParaRPr lang="nl-NL"/>
           </a:p>
@@ -1931,7 +1930,7 @@
           <a:p>
             <a:fld id="{9184DA70-C731-4C70-880D-CCD4705E623C}" type="datetime1">
               <a:rPr lang="en-US" smtClean="0"/>
-              <a:t>5/17/20</a:t>
+              <a:t>5/18/2020</a:t>
             </a:fld>
             <a:endParaRPr lang="en-US" dirty="0"/>
           </a:p>
@@ -2119,7 +2118,7 @@
           <a:p>
             <a:fld id="{4BE1D723-8F53-4F53-90B0-1982A396982E}" type="datetime1">
               <a:rPr lang="en-US" smtClean="0"/>
-              <a:t>5/17/20</a:t>
+              <a:t>5/18/2020</a:t>
             </a:fld>
             <a:endParaRPr lang="en-US" dirty="0"/>
           </a:p>
@@ -2492,7 +2491,7 @@
           <a:p>
             <a:fld id="{97669AF7-7BEB-44E4-9852-375E34362B5B}" type="datetime1">
               <a:rPr lang="en-US" smtClean="0"/>
-              <a:t>5/17/20</a:t>
+              <a:t>5/18/2020</a:t>
             </a:fld>
             <a:endParaRPr lang="en-US" dirty="0"/>
           </a:p>
@@ -2747,7 +2746,7 @@
           <a:p>
             <a:fld id="{BAAAC38D-0552-4C82-B593-E6124DFADBE2}" type="datetime1">
               <a:rPr lang="en-US" smtClean="0"/>
-              <a:t>5/17/20</a:t>
+              <a:t>5/18/2020</a:t>
             </a:fld>
             <a:endParaRPr lang="en-US" dirty="0"/>
           </a:p>
@@ -3144,7 +3143,7 @@
           <a:p>
             <a:fld id="{D9DF0F1C-5577-4ACB-BB62-DF8F3C494C7E}" type="datetime1">
               <a:rPr lang="en-US" smtClean="0"/>
-              <a:t>5/17/20</a:t>
+              <a:t>5/18/2020</a:t>
             </a:fld>
             <a:endParaRPr lang="en-US" dirty="0"/>
           </a:p>
@@ -3280,7 +3279,7 @@
           <a:p>
             <a:fld id="{1775B394-D9F9-4F0C-B15D-605F45CB9E9F}" type="datetime1">
               <a:rPr lang="en-US" smtClean="0"/>
-              <a:t>5/17/20</a:t>
+              <a:t>5/18/2020</a:t>
             </a:fld>
             <a:endParaRPr lang="en-US" dirty="0"/>
           </a:p>
@@ -3437,7 +3436,7 @@
           <a:p>
             <a:fld id="{39667345-2558-425A-8533-9BFDBCE15005}" type="datetime1">
               <a:rPr lang="en-US" smtClean="0"/>
-              <a:t>5/17/20</a:t>
+              <a:t>5/18/2020</a:t>
             </a:fld>
             <a:endParaRPr lang="en-US" dirty="0"/>
           </a:p>
@@ -3766,7 +3765,7 @@
           <a:p>
             <a:fld id="{92BEA474-078D-4E9B-9B14-09A87B19DC46}" type="datetime1">
               <a:rPr lang="en-US" smtClean="0"/>
-              <a:t>5/17/20</a:t>
+              <a:t>5/18/2020</a:t>
             </a:fld>
             <a:endParaRPr lang="en-US" dirty="0"/>
           </a:p>
@@ -4116,7 +4115,7 @@
           <a:p>
             <a:fld id="{4907D986-8816-4272-A432-0437A28A9828}" type="datetime1">
               <a:rPr lang="en-US" smtClean="0"/>
-              <a:t>5/17/20</a:t>
+              <a:t>5/18/2020</a:t>
             </a:fld>
             <a:endParaRPr lang="en-US" dirty="0"/>
           </a:p>
@@ -4377,7 +4376,7 @@
           <a:p>
             <a:fld id="{62D6E202-B606-4609-B914-27C9371A1F6D}" type="datetime1">
               <a:rPr lang="en-US" smtClean="0"/>
-              <a:t>5/17/20</a:t>
+              <a:t>5/18/2020</a:t>
             </a:fld>
             <a:endParaRPr lang="en-US" dirty="0"/>
           </a:p>
@@ -6048,6 +6047,14 @@
 <file path=ppt/slides/slide12.xml><?xml version="1.0" encoding="utf-8"?>
 <p:sld xmlns:a="http://schemas.openxmlformats.org/drawingml/2006/main" xmlns:r="http://schemas.openxmlformats.org/officeDocument/2006/relationships" xmlns:p="http://schemas.openxmlformats.org/presentationml/2006/main">
   <p:cSld>
+    <p:bg>
+      <p:bgPr>
+        <a:solidFill>
+          <a:schemeClr val="bg1"/>
+        </a:solidFill>
+        <a:effectLst/>
+      </p:bgPr>
+    </p:bg>
     <p:spTree>
       <p:nvGrpSpPr>
         <p:cNvPr id="1" name=""/>
@@ -6062,6 +6069,121 @@
           <a:chExt cx="0" cy="0"/>
         </a:xfrm>
       </p:grpSpPr>
+      <p:sp useBgFill="1">
+        <p:nvSpPr>
+          <p:cNvPr id="15" name="Rectangle 14">
+            <a:extLst>
+              <a:ext uri="{FF2B5EF4-FFF2-40B4-BE49-F238E27FC236}">
+                <a16:creationId xmlns:a16="http://schemas.microsoft.com/office/drawing/2014/main" id="{3741B58E-3B65-4A01-A276-975AB2CF8A08}"/>
+              </a:ext>
+              <a:ext uri="{C183D7F6-B498-43B3-948B-1728B52AA6E4}">
+                <adec:decorative xmlns:adec="http://schemas.microsoft.com/office/drawing/2017/decorative" val="1"/>
+              </a:ext>
+            </a:extLst>
+          </p:cNvPr>
+          <p:cNvSpPr>
+            <a:spLocks noGrp="1" noRot="1" noChangeAspect="1" noMove="1" noResize="1" noEditPoints="1" noAdjustHandles="1" noChangeArrowheads="1" noChangeShapeType="1" noTextEdit="1"/>
+          </p:cNvSpPr>
+          <p:nvPr>
+            <p:extLst>
+              <p:ext uri="{386F3935-93C4-4BCD-93E2-E3B085C9AB24}">
+                <p16:designElem xmlns:p16="http://schemas.microsoft.com/office/powerpoint/2015/main" val="1"/>
+              </p:ext>
+            </p:extLst>
+          </p:nvPr>
+        </p:nvSpPr>
+        <p:spPr>
+          <a:xfrm>
+            <a:off x="0" y="0"/>
+            <a:ext cx="12186315" cy="6858000"/>
+          </a:xfrm>
+          <a:prstGeom prst="rect">
+            <a:avLst/>
+          </a:prstGeom>
+          <a:ln>
+            <a:noFill/>
+          </a:ln>
+        </p:spPr>
+        <p:style>
+          <a:lnRef idx="2">
+            <a:schemeClr val="accent6">
+              <a:shade val="50000"/>
+            </a:schemeClr>
+          </a:lnRef>
+          <a:fillRef idx="1001">
+            <a:schemeClr val="lt1"/>
+          </a:fillRef>
+          <a:effectRef idx="0">
+            <a:schemeClr val="accent6"/>
+          </a:effectRef>
+          <a:fontRef idx="minor">
+            <a:schemeClr val="lt1"/>
+          </a:fontRef>
+        </p:style>
+        <p:txBody>
+          <a:bodyPr rtlCol="0" anchor="ctr"/>
+          <a:lstStyle/>
+          <a:p>
+            <a:pPr algn="ctr"/>
+            <a:endParaRPr lang="en-US"/>
+          </a:p>
+        </p:txBody>
+      </p:sp>
+      <p:sp>
+        <p:nvSpPr>
+          <p:cNvPr id="17" name="Rectangle 16">
+            <a:extLst>
+              <a:ext uri="{FF2B5EF4-FFF2-40B4-BE49-F238E27FC236}">
+                <a16:creationId xmlns:a16="http://schemas.microsoft.com/office/drawing/2014/main" id="{7AAC67C3-831B-4AB1-A259-DFB839CAFAFC}"/>
+              </a:ext>
+              <a:ext uri="{C183D7F6-B498-43B3-948B-1728B52AA6E4}">
+                <adec:decorative xmlns:adec="http://schemas.microsoft.com/office/drawing/2017/decorative" val="1"/>
+              </a:ext>
+            </a:extLst>
+          </p:cNvPr>
+          <p:cNvSpPr>
+            <a:spLocks noGrp="1" noRot="1" noChangeAspect="1" noMove="1" noResize="1" noEditPoints="1" noAdjustHandles="1" noChangeArrowheads="1" noChangeShapeType="1" noTextEdit="1"/>
+          </p:cNvSpPr>
+          <p:nvPr>
+            <p:extLst>
+              <p:ext uri="{386F3935-93C4-4BCD-93E2-E3B085C9AB24}">
+                <p16:designElem xmlns:p16="http://schemas.microsoft.com/office/powerpoint/2015/main" val="1"/>
+              </p:ext>
+            </p:extLst>
+          </p:nvPr>
+        </p:nvSpPr>
+        <p:spPr>
+          <a:xfrm>
+            <a:off x="16" y="-1"/>
+            <a:ext cx="4648593" cy="6857999"/>
+          </a:xfrm>
+          <a:prstGeom prst="rect">
+            <a:avLst/>
+          </a:prstGeom>
+          <a:solidFill>
+            <a:schemeClr val="accent1"/>
+          </a:solidFill>
+          <a:ln>
+            <a:noFill/>
+          </a:ln>
+        </p:spPr>
+        <p:style>
+          <a:lnRef idx="2">
+            <a:schemeClr val="accent1">
+              <a:shade val="50000"/>
+            </a:schemeClr>
+          </a:lnRef>
+          <a:fillRef idx="1">
+            <a:schemeClr val="accent1"/>
+          </a:fillRef>
+          <a:effectRef idx="0">
+            <a:schemeClr val="accent1"/>
+          </a:effectRef>
+          <a:fontRef idx="minor">
+            <a:schemeClr val="lt1"/>
+          </a:fontRef>
+        </p:style>
+      </p:sp>
       <p:sp>
         <p:nvSpPr>
           <p:cNvPr id="2" name="Title 1">
@@ -6078,13 +6200,24 @@
             <p:ph type="title"/>
           </p:nvPr>
         </p:nvSpPr>
-        <p:spPr/>
+        <p:spPr>
+          <a:xfrm>
+            <a:off x="492369" y="605896"/>
+            <a:ext cx="3642309" cy="5646208"/>
+          </a:xfrm>
+        </p:spPr>
         <p:txBody>
-          <a:bodyPr/>
+          <a:bodyPr anchor="ctr">
+            <a:normAutofit/>
+          </a:bodyPr>
           <a:lstStyle/>
           <a:p>
             <a:r>
-              <a:rPr lang="en-US" dirty="0"/>
+              <a:rPr lang="en-US" sz="4400">
+                <a:solidFill>
+                  <a:srgbClr val="FFFFFF"/>
+                </a:solidFill>
+              </a:rPr>
               <a:t>Basic Bot</a:t>
             </a:r>
           </a:p>
@@ -6106,61 +6239,159 @@
             <p:ph idx="1"/>
           </p:nvPr>
         </p:nvSpPr>
-        <p:spPr/>
+        <p:spPr>
+          <a:xfrm>
+            <a:off x="5231958" y="605896"/>
+            <a:ext cx="5923721" cy="5646208"/>
+          </a:xfrm>
+        </p:spPr>
         <p:txBody>
-          <a:bodyPr/>
+          <a:bodyPr anchor="ctr">
+            <a:normAutofit/>
+          </a:bodyPr>
           <a:lstStyle/>
           <a:p>
             <a:pPr>
+              <a:lnSpc>
+                <a:spcPct val="100000"/>
+              </a:lnSpc>
               <a:buFont typeface="Wingdings" pitchFamily="2" charset="2"/>
               <a:buChar char="v"/>
             </a:pPr>
             <a:r>
-              <a:rPr lang="en-US" dirty="0"/>
-              <a:t>Finds the location of the flag</a:t>
+              <a:rPr lang="en-US" sz="2400" dirty="0"/>
+              <a:t> Finds the location of the flag</a:t>
             </a:r>
           </a:p>
           <a:p>
             <a:pPr>
+              <a:lnSpc>
+                <a:spcPct val="100000"/>
+              </a:lnSpc>
               <a:buFont typeface="Wingdings" pitchFamily="2" charset="2"/>
               <a:buChar char="v"/>
             </a:pPr>
             <a:r>
-              <a:rPr lang="en-US" dirty="0"/>
-              <a:t>Computes shots in the area of the flag and stores the successful ones</a:t>
+              <a:rPr lang="en-US" sz="2400" dirty="0"/>
+              <a:t> Computes shots in the area of the flag and stores the successful ones</a:t>
             </a:r>
           </a:p>
           <a:p>
             <a:pPr>
+              <a:lnSpc>
+                <a:spcPct val="100000"/>
+              </a:lnSpc>
               <a:buFont typeface="Wingdings" pitchFamily="2" charset="2"/>
               <a:buChar char="v"/>
             </a:pPr>
             <a:r>
-              <a:rPr lang="en-US" dirty="0"/>
-              <a:t>For each successful shot stored, it aims to try the perfect velocity</a:t>
+              <a:rPr lang="en-US" sz="2400" dirty="0"/>
+              <a:t> For each successful shot stored, it aims to try the perfect velocity</a:t>
             </a:r>
           </a:p>
           <a:p>
             <a:pPr>
+              <a:lnSpc>
+                <a:spcPct val="100000"/>
+              </a:lnSpc>
               <a:buFont typeface="Wingdings" pitchFamily="2" charset="2"/>
               <a:buChar char="v"/>
             </a:pPr>
             <a:r>
-              <a:rPr lang="en-US" dirty="0"/>
-              <a:t>If there is an obstacle between the ball and the flag, it will shoot the ball with a wider angle</a:t>
+              <a:rPr lang="en-US" sz="2400" dirty="0"/>
+              <a:t> If there is an obstacle between the ball and the flag, it will shoot the ball with a wider angle</a:t>
             </a:r>
           </a:p>
           <a:p>
             <a:pPr>
+              <a:lnSpc>
+                <a:spcPct val="100000"/>
+              </a:lnSpc>
               <a:buFont typeface="Wingdings" pitchFamily="2" charset="2"/>
               <a:buChar char="v"/>
             </a:pPr>
             <a:r>
-              <a:rPr lang="en-US" dirty="0"/>
-              <a:t>If no hole in one solution is possible, it won’t find a solution.</a:t>
+              <a:rPr lang="en-US" sz="2400" dirty="0"/>
+              <a:t> If no hole in one solution is possible, it won’t find a solution.</a:t>
+            </a:r>
+          </a:p>
+          <a:p>
+            <a:pPr>
+              <a:lnSpc>
+                <a:spcPct val="100000"/>
+              </a:lnSpc>
+              <a:buFont typeface="Wingdings" pitchFamily="2" charset="2"/>
+              <a:buChar char="v"/>
+            </a:pPr>
+            <a:r>
+              <a:rPr lang="en-US" sz="2400" dirty="0"/>
+              <a:t> O(</a:t>
+            </a:r>
+            <a:r>
+              <a:rPr lang="en-US" sz="2400" dirty="0" err="1"/>
+              <a:t>maxVelocity</a:t>
+            </a:r>
+            <a:r>
+              <a:rPr lang="en-US" sz="2400" dirty="0"/>
+              <a:t> / (degree step * velocity step))</a:t>
             </a:r>
           </a:p>
         </p:txBody>
+      </p:sp>
+      <p:sp>
+        <p:nvSpPr>
+          <p:cNvPr id="19" name="Rectangle 18">
+            <a:extLst>
+              <a:ext uri="{FF2B5EF4-FFF2-40B4-BE49-F238E27FC236}">
+                <a16:creationId xmlns:a16="http://schemas.microsoft.com/office/drawing/2014/main" id="{FCAEED9E-BB91-43A0-911B-1ACD8803E3CE}"/>
+              </a:ext>
+              <a:ext uri="{C183D7F6-B498-43B3-948B-1728B52AA6E4}">
+                <adec:decorative xmlns:adec="http://schemas.microsoft.com/office/drawing/2017/decorative" val="1"/>
+              </a:ext>
+            </a:extLst>
+          </p:cNvPr>
+          <p:cNvSpPr>
+            <a:spLocks noGrp="1" noRot="1" noChangeAspect="1" noMove="1" noResize="1" noEditPoints="1" noAdjustHandles="1" noChangeArrowheads="1" noChangeShapeType="1" noTextEdit="1"/>
+          </p:cNvSpPr>
+          <p:nvPr>
+            <p:extLst>
+              <p:ext uri="{386F3935-93C4-4BCD-93E2-E3B085C9AB24}">
+                <p16:designElem xmlns:p16="http://schemas.microsoft.com/office/powerpoint/2015/main" val="1"/>
+              </p:ext>
+            </p:extLst>
+          </p:nvPr>
+        </p:nvSpPr>
+        <p:spPr>
+          <a:xfrm>
+            <a:off x="0" y="6400800"/>
+            <a:ext cx="12192000" cy="457200"/>
+          </a:xfrm>
+          <a:prstGeom prst="rect">
+            <a:avLst/>
+          </a:prstGeom>
+          <a:solidFill>
+            <a:srgbClr val="262626"/>
+          </a:solidFill>
+          <a:ln>
+            <a:noFill/>
+          </a:ln>
+        </p:spPr>
+        <p:style>
+          <a:lnRef idx="2">
+            <a:schemeClr val="accent1">
+              <a:shade val="50000"/>
+            </a:schemeClr>
+          </a:lnRef>
+          <a:fillRef idx="1">
+            <a:schemeClr val="accent1"/>
+          </a:fillRef>
+          <a:effectRef idx="0">
+            <a:schemeClr val="accent1"/>
+          </a:effectRef>
+          <a:fontRef idx="minor">
+            <a:schemeClr val="lt1"/>
+          </a:fontRef>
+        </p:style>
       </p:sp>
     </p:spTree>
     <p:extLst>
@@ -6294,6 +6525,14 @@
 <file path=ppt/slides/slide14.xml><?xml version="1.0" encoding="utf-8"?>
 <p:sld xmlns:a="http://schemas.openxmlformats.org/drawingml/2006/main" xmlns:r="http://schemas.openxmlformats.org/officeDocument/2006/relationships" xmlns:p="http://schemas.openxmlformats.org/presentationml/2006/main">
   <p:cSld>
+    <p:bg>
+      <p:bgPr>
+        <a:solidFill>
+          <a:schemeClr val="bg1"/>
+        </a:solidFill>
+        <a:effectLst/>
+      </p:bgPr>
+    </p:bg>
     <p:spTree>
       <p:nvGrpSpPr>
         <p:cNvPr id="1" name=""/>
@@ -6310,6 +6549,231 @@
       </p:grpSpPr>
       <p:sp>
         <p:nvSpPr>
+          <p:cNvPr id="36" name="Rectangle 35">
+            <a:extLst>
+              <a:ext uri="{FF2B5EF4-FFF2-40B4-BE49-F238E27FC236}">
+                <a16:creationId xmlns:a16="http://schemas.microsoft.com/office/drawing/2014/main" id="{39E3965E-AC41-4711-9D10-E25ABB132D86}"/>
+              </a:ext>
+              <a:ext uri="{C183D7F6-B498-43B3-948B-1728B52AA6E4}">
+                <adec:decorative xmlns:adec="http://schemas.microsoft.com/office/drawing/2017/decorative" val="1"/>
+              </a:ext>
+            </a:extLst>
+          </p:cNvPr>
+          <p:cNvSpPr>
+            <a:spLocks noGrp="1" noRot="1" noChangeAspect="1" noMove="1" noResize="1" noEditPoints="1" noAdjustHandles="1" noChangeArrowheads="1" noChangeShapeType="1" noTextEdit="1"/>
+          </p:cNvSpPr>
+          <p:nvPr>
+            <p:extLst>
+              <p:ext uri="{386F3935-93C4-4BCD-93E2-E3B085C9AB24}">
+                <p16:designElem xmlns:p16="http://schemas.microsoft.com/office/powerpoint/2015/main" val="1"/>
+              </p:ext>
+            </p:extLst>
+          </p:nvPr>
+        </p:nvSpPr>
+        <p:spPr>
+          <a:xfrm>
+            <a:off x="3175" y="6400800"/>
+            <a:ext cx="12188825" cy="457200"/>
+          </a:xfrm>
+          <a:prstGeom prst="rect">
+            <a:avLst/>
+          </a:prstGeom>
+          <a:solidFill>
+            <a:srgbClr val="262626"/>
+          </a:solidFill>
+          <a:ln>
+            <a:noFill/>
+          </a:ln>
+        </p:spPr>
+        <p:style>
+          <a:lnRef idx="2">
+            <a:schemeClr val="accent1">
+              <a:shade val="50000"/>
+            </a:schemeClr>
+          </a:lnRef>
+          <a:fillRef idx="1">
+            <a:schemeClr val="accent1"/>
+          </a:fillRef>
+          <a:effectRef idx="0">
+            <a:schemeClr val="accent1"/>
+          </a:effectRef>
+          <a:fontRef idx="minor">
+            <a:schemeClr val="lt1"/>
+          </a:fontRef>
+        </p:style>
+      </p:sp>
+      <p:cxnSp>
+        <p:nvCxnSpPr>
+          <p:cNvPr id="38" name="Straight Connector 37">
+            <a:extLst>
+              <a:ext uri="{FF2B5EF4-FFF2-40B4-BE49-F238E27FC236}">
+                <a16:creationId xmlns:a16="http://schemas.microsoft.com/office/drawing/2014/main" id="{1F5DC8C3-BA5F-4EED-BB9A-A14272BD82A1}"/>
+              </a:ext>
+              <a:ext uri="{C183D7F6-B498-43B3-948B-1728B52AA6E4}">
+                <adec:decorative xmlns:adec="http://schemas.microsoft.com/office/drawing/2017/decorative" val="1"/>
+              </a:ext>
+            </a:extLst>
+          </p:cNvPr>
+          <p:cNvCxnSpPr>
+            <a:cxnSpLocks noGrp="1" noRot="1" noChangeAspect="1" noMove="1" noResize="1" noEditPoints="1" noAdjustHandles="1" noChangeArrowheads="1" noChangeShapeType="1"/>
+          </p:cNvCxnSpPr>
+          <p:nvPr>
+            <p:extLst>
+              <p:ext uri="{386F3935-93C4-4BCD-93E2-E3B085C9AB24}">
+                <p16:designElem xmlns:p16="http://schemas.microsoft.com/office/powerpoint/2015/main" val="1"/>
+              </p:ext>
+            </p:extLst>
+          </p:nvPr>
+        </p:nvCxnSpPr>
+        <p:spPr>
+          <a:xfrm>
+            <a:off x="1207658" y="4474741"/>
+            <a:ext cx="9875520" cy="0"/>
+          </a:xfrm>
+          <a:prstGeom prst="line">
+            <a:avLst/>
+          </a:prstGeom>
+          <a:ln w="12700">
+            <a:solidFill>
+              <a:schemeClr val="tx1">
+                <a:lumMod val="75000"/>
+                <a:lumOff val="25000"/>
+              </a:schemeClr>
+            </a:solidFill>
+          </a:ln>
+        </p:spPr>
+        <p:style>
+          <a:lnRef idx="1">
+            <a:schemeClr val="accent1"/>
+          </a:lnRef>
+          <a:fillRef idx="0">
+            <a:schemeClr val="accent1"/>
+          </a:fillRef>
+          <a:effectRef idx="0">
+            <a:schemeClr val="accent1"/>
+          </a:effectRef>
+          <a:fontRef idx="minor">
+            <a:schemeClr val="tx1"/>
+          </a:fontRef>
+        </p:style>
+      </p:cxnSp>
+      <p:sp useBgFill="1">
+        <p:nvSpPr>
+          <p:cNvPr id="40" name="Rectangle 39">
+            <a:extLst>
+              <a:ext uri="{FF2B5EF4-FFF2-40B4-BE49-F238E27FC236}">
+                <a16:creationId xmlns:a16="http://schemas.microsoft.com/office/drawing/2014/main" id="{B4D0E555-16F6-44D0-BF56-AF5FF5BDE9D6}"/>
+              </a:ext>
+              <a:ext uri="{C183D7F6-B498-43B3-948B-1728B52AA6E4}">
+                <adec:decorative xmlns:adec="http://schemas.microsoft.com/office/drawing/2017/decorative" val="1"/>
+              </a:ext>
+            </a:extLst>
+          </p:cNvPr>
+          <p:cNvSpPr>
+            <a:spLocks noGrp="1" noRot="1" noChangeAspect="1" noMove="1" noResize="1" noEditPoints="1" noAdjustHandles="1" noChangeArrowheads="1" noChangeShapeType="1" noTextEdit="1"/>
+          </p:cNvSpPr>
+          <p:nvPr>
+            <p:extLst>
+              <p:ext uri="{386F3935-93C4-4BCD-93E2-E3B085C9AB24}">
+                <p16:designElem xmlns:p16="http://schemas.microsoft.com/office/powerpoint/2015/main" val="1"/>
+              </p:ext>
+            </p:extLst>
+          </p:nvPr>
+        </p:nvSpPr>
+        <p:spPr>
+          <a:xfrm>
+            <a:off x="0" y="0"/>
+            <a:ext cx="12192000" cy="6858000"/>
+          </a:xfrm>
+          <a:prstGeom prst="rect">
+            <a:avLst/>
+          </a:prstGeom>
+          <a:ln>
+            <a:noFill/>
+          </a:ln>
+        </p:spPr>
+        <p:style>
+          <a:lnRef idx="2">
+            <a:schemeClr val="accent1">
+              <a:shade val="50000"/>
+            </a:schemeClr>
+          </a:lnRef>
+          <a:fillRef idx="1001">
+            <a:schemeClr val="lt1"/>
+          </a:fillRef>
+          <a:effectRef idx="0">
+            <a:schemeClr val="accent1"/>
+          </a:effectRef>
+          <a:fontRef idx="minor">
+            <a:schemeClr val="lt1"/>
+          </a:fontRef>
+        </p:style>
+        <p:txBody>
+          <a:bodyPr rtlCol="0" anchor="ctr"/>
+          <a:lstStyle/>
+          <a:p>
+            <a:pPr algn="ctr"/>
+            <a:endParaRPr lang="en-US"/>
+          </a:p>
+        </p:txBody>
+      </p:sp>
+      <p:sp>
+        <p:nvSpPr>
+          <p:cNvPr id="42" name="Rectangle 41">
+            <a:extLst>
+              <a:ext uri="{FF2B5EF4-FFF2-40B4-BE49-F238E27FC236}">
+                <a16:creationId xmlns:a16="http://schemas.microsoft.com/office/drawing/2014/main" id="{8117041D-1A7B-4ECA-AB68-3CFDB6726B8E}"/>
+              </a:ext>
+              <a:ext uri="{C183D7F6-B498-43B3-948B-1728B52AA6E4}">
+                <adec:decorative xmlns:adec="http://schemas.microsoft.com/office/drawing/2017/decorative" val="1"/>
+              </a:ext>
+            </a:extLst>
+          </p:cNvPr>
+          <p:cNvSpPr>
+            <a:spLocks noGrp="1" noRot="1" noChangeAspect="1" noMove="1" noResize="1" noEditPoints="1" noAdjustHandles="1" noChangeArrowheads="1" noChangeShapeType="1" noTextEdit="1"/>
+          </p:cNvSpPr>
+          <p:nvPr>
+            <p:extLst>
+              <p:ext uri="{386F3935-93C4-4BCD-93E2-E3B085C9AB24}">
+                <p16:designElem xmlns:p16="http://schemas.microsoft.com/office/powerpoint/2015/main" val="1"/>
+              </p:ext>
+            </p:extLst>
+          </p:nvPr>
+        </p:nvSpPr>
+        <p:spPr bwMode="white">
+          <a:xfrm>
+            <a:off x="-6220" y="0"/>
+            <a:ext cx="4641314" cy="6858000"/>
+          </a:xfrm>
+          <a:prstGeom prst="rect">
+            <a:avLst/>
+          </a:prstGeom>
+          <a:solidFill>
+            <a:srgbClr val="262626"/>
+          </a:solidFill>
+          <a:ln>
+            <a:noFill/>
+          </a:ln>
+        </p:spPr>
+        <p:style>
+          <a:lnRef idx="2">
+            <a:schemeClr val="accent1">
+              <a:shade val="50000"/>
+            </a:schemeClr>
+          </a:lnRef>
+          <a:fillRef idx="1">
+            <a:schemeClr val="accent1"/>
+          </a:fillRef>
+          <a:effectRef idx="0">
+            <a:schemeClr val="accent1"/>
+          </a:effectRef>
+          <a:fontRef idx="minor">
+            <a:schemeClr val="lt1"/>
+          </a:fontRef>
+        </p:style>
+      </p:sp>
+      <p:sp>
+        <p:nvSpPr>
           <p:cNvPr id="2" name="Title 1">
             <a:extLst>
               <a:ext uri="{FF2B5EF4-FFF2-40B4-BE49-F238E27FC236}">
@@ -6324,40 +6788,145 @@
             <p:ph type="title"/>
           </p:nvPr>
         </p:nvSpPr>
-        <p:spPr/>
+        <p:spPr>
+          <a:xfrm>
+            <a:off x="435869" y="640080"/>
+            <a:ext cx="3659246" cy="2862699"/>
+          </a:xfrm>
+        </p:spPr>
         <p:txBody>
-          <a:bodyPr/>
+          <a:bodyPr vert="horz" lIns="91440" tIns="45720" rIns="91440" bIns="45720" rtlCol="0" anchor="b">
+            <a:normAutofit/>
+          </a:bodyPr>
           <a:lstStyle/>
           <a:p>
             <a:r>
-              <a:rPr lang="en-US" dirty="0"/>
+              <a:rPr lang="en-US" sz="4400">
+                <a:solidFill>
+                  <a:srgbClr val="FFFFFF"/>
+                </a:solidFill>
+              </a:rPr>
               <a:t>Advanced bot</a:t>
             </a:r>
-            <a:endParaRPr lang="nl-NL" dirty="0"/>
           </a:p>
         </p:txBody>
       </p:sp>
-      <p:sp>
-        <p:nvSpPr>
-          <p:cNvPr id="3" name="Content Placeholder 2">
+      <p:cxnSp>
+        <p:nvCxnSpPr>
+          <p:cNvPr id="44" name="Straight Connector 43">
             <a:extLst>
               <a:ext uri="{FF2B5EF4-FFF2-40B4-BE49-F238E27FC236}">
-                <a16:creationId xmlns:a16="http://schemas.microsoft.com/office/drawing/2014/main" id="{BB3F33E9-7E59-412F-8665-5ECD6D6A4BBF}"/>
+                <a16:creationId xmlns:a16="http://schemas.microsoft.com/office/drawing/2014/main" id="{ABCD2462-4C1E-401A-AC2D-F799A138B245}"/>
+              </a:ext>
+              <a:ext uri="{C183D7F6-B498-43B3-948B-1728B52AA6E4}">
+                <adec:decorative xmlns:adec="http://schemas.microsoft.com/office/drawing/2017/decorative" val="1"/>
               </a:ext>
             </a:extLst>
           </p:cNvPr>
-          <p:cNvSpPr>
-            <a:spLocks noGrp="1"/>
-          </p:cNvSpPr>
+          <p:cNvCxnSpPr>
+            <a:cxnSpLocks noGrp="1" noRot="1" noChangeAspect="1" noMove="1" noResize="1" noEditPoints="1" noAdjustHandles="1" noChangeArrowheads="1" noChangeShapeType="1"/>
+          </p:cNvCxnSpPr>
+          <p:nvPr>
+            <p:extLst>
+              <p:ext uri="{386F3935-93C4-4BCD-93E2-E3B085C9AB24}">
+                <p16:designElem xmlns:p16="http://schemas.microsoft.com/office/powerpoint/2015/main" val="1"/>
+              </p:ext>
+            </p:extLst>
+          </p:nvPr>
+        </p:nvCxnSpPr>
+        <p:spPr>
+          <a:xfrm>
+            <a:off x="573852" y="3663649"/>
+            <a:ext cx="3383280" cy="0"/>
+          </a:xfrm>
+          <a:prstGeom prst="line">
+            <a:avLst/>
+          </a:prstGeom>
+          <a:ln w="19050">
+            <a:solidFill>
+              <a:schemeClr val="accent1"/>
+            </a:solidFill>
+          </a:ln>
+        </p:spPr>
+        <p:style>
+          <a:lnRef idx="1">
+            <a:schemeClr val="accent1"/>
+          </a:lnRef>
+          <a:fillRef idx="0">
+            <a:schemeClr val="accent1"/>
+          </a:fillRef>
+          <a:effectRef idx="0">
+            <a:schemeClr val="accent1"/>
+          </a:effectRef>
+          <a:fontRef idx="minor">
+            <a:schemeClr val="tx1"/>
+          </a:fontRef>
+        </p:style>
+      </p:cxnSp>
+      <p:pic>
+        <p:nvPicPr>
+          <p:cNvPr id="9" name="Content Placeholder 8" descr="A close up of a logo&#10;&#10;Description automatically generated">
+            <a:extLst>
+              <a:ext uri="{FF2B5EF4-FFF2-40B4-BE49-F238E27FC236}">
+                <a16:creationId xmlns:a16="http://schemas.microsoft.com/office/drawing/2014/main" id="{5EC106F0-80DD-41D1-B28D-B623B058F435}"/>
+              </a:ext>
+            </a:extLst>
+          </p:cNvPr>
+          <p:cNvPicPr>
+            <a:picLocks noGrp="1" noChangeAspect="1"/>
+          </p:cNvPicPr>
           <p:nvPr>
             <p:ph idx="1"/>
           </p:nvPr>
-        </p:nvSpPr>
-        <p:spPr/>
+        </p:nvPicPr>
+        <p:blipFill>
+          <a:blip r:embed="rId2"/>
+          <a:stretch>
+            <a:fillRect/>
+          </a:stretch>
+        </p:blipFill>
+        <p:spPr>
+          <a:xfrm>
+            <a:off x="5282335" y="779949"/>
+            <a:ext cx="6275667" cy="3530062"/>
+          </a:xfrm>
+          <a:prstGeom prst="rect">
+            <a:avLst/>
+          </a:prstGeom>
+        </p:spPr>
+      </p:pic>
+      <p:sp>
+        <p:nvSpPr>
+          <p:cNvPr id="11" name="TextBox 10">
+            <a:extLst>
+              <a:ext uri="{FF2B5EF4-FFF2-40B4-BE49-F238E27FC236}">
+                <a16:creationId xmlns:a16="http://schemas.microsoft.com/office/drawing/2014/main" id="{C0C2DF3A-2E68-4AB0-9BA5-AFF4632D1E6E}"/>
+              </a:ext>
+            </a:extLst>
+          </p:cNvPr>
+          <p:cNvSpPr txBox="1"/>
+          <p:nvPr/>
+        </p:nvSpPr>
+        <p:spPr>
+          <a:xfrm>
+            <a:off x="6545648" y="4626708"/>
+            <a:ext cx="3749040" cy="646331"/>
+          </a:xfrm>
+          <a:prstGeom prst="rect">
+            <a:avLst/>
+          </a:prstGeom>
+          <a:noFill/>
+        </p:spPr>
         <p:txBody>
-          <a:bodyPr/>
+          <a:bodyPr wrap="square" rtlCol="0">
+            <a:spAutoFit/>
+          </a:bodyPr>
           <a:lstStyle/>
           <a:p>
+            <a:r>
+              <a:rPr lang="en-US" dirty="0"/>
+              <a:t>O(grid * the number of outcoming shots * shot complexity + grid)</a:t>
+            </a:r>
             <a:endParaRPr lang="nl-NL" dirty="0"/>
           </a:p>
         </p:txBody>
@@ -6397,7 +6966,7 @@
           <p:cNvPr id="2" name="Title 1">
             <a:extLst>
               <a:ext uri="{FF2B5EF4-FFF2-40B4-BE49-F238E27FC236}">
-                <a16:creationId xmlns:a16="http://schemas.microsoft.com/office/drawing/2014/main" id="{8E9BBA27-5DE1-4A08-BB6E-19568827EB6F}"/>
+                <a16:creationId xmlns:a16="http://schemas.microsoft.com/office/drawing/2014/main" id="{A2D0E5A4-A969-274E-A9DF-AA6FC799D6FA}"/>
               </a:ext>
             </a:extLst>
           </p:cNvPr>
@@ -6414,133 +6983,10 @@
           <a:lstStyle/>
           <a:p>
             <a:r>
-              <a:rPr lang="en-US" dirty="0"/>
-              <a:t>Bot comparison</a:t>
-            </a:r>
-            <a:endParaRPr lang="nl-NL" dirty="0"/>
-          </a:p>
-        </p:txBody>
-      </p:sp>
-      <p:sp>
-        <p:nvSpPr>
-          <p:cNvPr id="3" name="Content Placeholder 2">
-            <a:extLst>
-              <a:ext uri="{FF2B5EF4-FFF2-40B4-BE49-F238E27FC236}">
-                <a16:creationId xmlns:a16="http://schemas.microsoft.com/office/drawing/2014/main" id="{BD4E8E8E-4C2D-4DE9-8207-CB24F366E520}"/>
-              </a:ext>
-            </a:extLst>
-          </p:cNvPr>
-          <p:cNvSpPr>
-            <a:spLocks noGrp="1"/>
-          </p:cNvSpPr>
-          <p:nvPr>
-            <p:ph idx="1"/>
-          </p:nvPr>
-        </p:nvSpPr>
-        <p:spPr/>
-        <p:txBody>
-          <a:bodyPr/>
-          <a:lstStyle/>
-          <a:p>
-            <a:pPr>
-              <a:buFont typeface="Wingdings" panose="05000000000000000000" pitchFamily="2" charset="2"/>
-              <a:buChar char="v"/>
-            </a:pPr>
-            <a:r>
-              <a:rPr lang="en-US" dirty="0"/>
-              <a:t> Calculation speed</a:t>
-            </a:r>
-          </a:p>
-          <a:p>
-            <a:pPr>
-              <a:buFont typeface="Wingdings" panose="05000000000000000000" pitchFamily="2" charset="2"/>
-              <a:buChar char="v"/>
-            </a:pPr>
-            <a:r>
-              <a:rPr lang="en-US" dirty="0"/>
-              <a:t> Accuracy</a:t>
-            </a:r>
-          </a:p>
-          <a:p>
-            <a:pPr>
-              <a:buFont typeface="Wingdings" panose="05000000000000000000" pitchFamily="2" charset="2"/>
-              <a:buChar char="v"/>
-            </a:pPr>
-            <a:r>
-              <a:rPr lang="en-US" dirty="0"/>
-              <a:t> Versatility </a:t>
-            </a:r>
-          </a:p>
-          <a:p>
-            <a:pPr>
-              <a:buFont typeface="Wingdings" panose="05000000000000000000" pitchFamily="2" charset="2"/>
-              <a:buChar char="v"/>
-            </a:pPr>
-            <a:r>
-              <a:rPr lang="en-US" dirty="0"/>
-              <a:t> Limitations</a:t>
-            </a:r>
-          </a:p>
-          <a:p>
-            <a:endParaRPr lang="nl-NL" dirty="0"/>
-          </a:p>
-        </p:txBody>
-      </p:sp>
-    </p:spTree>
-    <p:extLst>
-      <p:ext uri="{BB962C8B-B14F-4D97-AF65-F5344CB8AC3E}">
-        <p14:creationId xmlns:p14="http://schemas.microsoft.com/office/powerpoint/2010/main" val="4156753096"/>
-      </p:ext>
-    </p:extLst>
-  </p:cSld>
-  <p:clrMapOvr>
-    <a:masterClrMapping/>
-  </p:clrMapOvr>
-</p:sld>
-</file>
-
-<file path=ppt/slides/slide16.xml><?xml version="1.0" encoding="utf-8"?>
-<p:sld xmlns:a="http://schemas.openxmlformats.org/drawingml/2006/main" xmlns:r="http://schemas.openxmlformats.org/officeDocument/2006/relationships" xmlns:p="http://schemas.openxmlformats.org/presentationml/2006/main">
-  <p:cSld>
-    <p:spTree>
-      <p:nvGrpSpPr>
-        <p:cNvPr id="1" name=""/>
-        <p:cNvGrpSpPr/>
-        <p:nvPr/>
-      </p:nvGrpSpPr>
-      <p:grpSpPr>
-        <a:xfrm>
-          <a:off x="0" y="0"/>
-          <a:ext cx="0" cy="0"/>
-          <a:chOff x="0" y="0"/>
-          <a:chExt cx="0" cy="0"/>
-        </a:xfrm>
-      </p:grpSpPr>
-      <p:sp>
-        <p:nvSpPr>
-          <p:cNvPr id="2" name="Title 1">
-            <a:extLst>
-              <a:ext uri="{FF2B5EF4-FFF2-40B4-BE49-F238E27FC236}">
-                <a16:creationId xmlns:a16="http://schemas.microsoft.com/office/drawing/2014/main" id="{A2D0E5A4-A969-274E-A9DF-AA6FC799D6FA}"/>
-              </a:ext>
-            </a:extLst>
-          </p:cNvPr>
-          <p:cNvSpPr>
-            <a:spLocks noGrp="1"/>
-          </p:cNvSpPr>
-          <p:nvPr>
-            <p:ph type="title"/>
-          </p:nvPr>
-        </p:nvSpPr>
-        <p:spPr/>
-        <p:txBody>
-          <a:bodyPr/>
-          <a:lstStyle/>
-          <a:p>
-            <a:r>
-              <a:rPr lang="en-US" dirty="0"/>
+              <a:rPr lang="en-US"/>
               <a:t>Comparison between the bots</a:t>
             </a:r>
+            <a:endParaRPr lang="en-US" dirty="0"/>
           </a:p>
         </p:txBody>
       </p:sp>
@@ -6560,7 +7006,7 @@
             <p:ph idx="1"/>
             <p:extLst>
               <p:ext uri="{D42A27DB-BD31-4B8C-83A1-F6EECF244321}">
-                <p14:modId xmlns:p14="http://schemas.microsoft.com/office/powerpoint/2010/main" val="949150322"/>
+                <p14:modId xmlns:p14="http://schemas.microsoft.com/office/powerpoint/2010/main" val="2516890825"/>
               </p:ext>
             </p:extLst>
           </p:nvPr>
@@ -6671,13 +7117,18 @@
                     <a:p>
                       <a:pPr algn="ctr"/>
                       <a:r>
-                        <a:rPr lang="en-US" dirty="0">
+                        <a:rPr lang="en-US">
                           <a:solidFill>
                             <a:schemeClr val="bg1"/>
                           </a:solidFill>
                         </a:rPr>
                         <a:t>Versatility </a:t>
                       </a:r>
+                      <a:endParaRPr lang="en-US" dirty="0">
+                        <a:solidFill>
+                          <a:schemeClr val="bg1"/>
+                        </a:solidFill>
+                      </a:endParaRPr>
                     </a:p>
                   </a:txBody>
                   <a:tcPr/>
@@ -6689,13 +7140,18 @@
                     <a:p>
                       <a:pPr algn="ctr"/>
                       <a:r>
-                        <a:rPr lang="en-US" dirty="0">
+                        <a:rPr lang="en-US">
                           <a:solidFill>
                             <a:schemeClr val="bg1"/>
                           </a:solidFill>
                         </a:rPr>
                         <a:t>Limitation</a:t>
                       </a:r>
+                      <a:endParaRPr lang="en-US" dirty="0">
+                        <a:solidFill>
+                          <a:schemeClr val="bg1"/>
+                        </a:solidFill>
+                      </a:endParaRPr>
                     </a:p>
                   </a:txBody>
                   <a:tcPr/>
@@ -6812,13 +7268,18 @@
                     <a:p>
                       <a:pPr algn="ctr"/>
                       <a:r>
-                        <a:rPr lang="en-US" dirty="0">
+                        <a:rPr lang="en-US">
                           <a:solidFill>
                             <a:schemeClr val="bg1"/>
                           </a:solidFill>
                         </a:rPr>
                         <a:t>Advanced Bot</a:t>
                       </a:r>
+                      <a:endParaRPr lang="en-US" dirty="0">
+                        <a:solidFill>
+                          <a:schemeClr val="bg1"/>
+                        </a:solidFill>
+                      </a:endParaRPr>
                     </a:p>
                   </a:txBody>
                   <a:tcPr>
@@ -6834,13 +7295,18 @@
                     <a:p>
                       <a:pPr algn="ctr"/>
                       <a:r>
-                        <a:rPr lang="en-US" dirty="0">
+                        <a:rPr lang="en-US">
                           <a:solidFill>
                             <a:schemeClr val="tx1"/>
                           </a:solidFill>
                         </a:rPr>
                         <a:t>++</a:t>
                       </a:r>
+                      <a:endParaRPr lang="en-US" dirty="0">
+                        <a:solidFill>
+                          <a:schemeClr val="tx1"/>
+                        </a:solidFill>
+                      </a:endParaRPr>
                     </a:p>
                   </a:txBody>
                   <a:tcPr/>
@@ -6852,13 +7318,18 @@
                     <a:p>
                       <a:pPr algn="ctr"/>
                       <a:r>
-                        <a:rPr lang="en-US" dirty="0">
+                        <a:rPr lang="en-US">
                           <a:solidFill>
                             <a:schemeClr val="tx1"/>
                           </a:solidFill>
                         </a:rPr>
                         <a:t>++</a:t>
                       </a:r>
+                      <a:endParaRPr lang="en-US" dirty="0">
+                        <a:solidFill>
+                          <a:schemeClr val="tx1"/>
+                        </a:solidFill>
+                      </a:endParaRPr>
                     </a:p>
                   </a:txBody>
                   <a:tcPr/>
@@ -6922,7 +7393,7 @@
 </p:sld>
 </file>
 
-<file path=ppt/slides/slide17.xml><?xml version="1.0" encoding="utf-8"?>
+<file path=ppt/slides/slide16.xml><?xml version="1.0" encoding="utf-8"?>
 <p:sld xmlns:a="http://schemas.openxmlformats.org/drawingml/2006/main" xmlns:r="http://schemas.openxmlformats.org/officeDocument/2006/relationships" xmlns:p="http://schemas.openxmlformats.org/presentationml/2006/main">
   <p:cSld>
     <p:spTree>
@@ -7019,7 +7490,7 @@
 </p:sld>
 </file>
 
-<file path=ppt/slides/slide18.xml><?xml version="1.0" encoding="utf-8"?>
+<file path=ppt/slides/slide17.xml><?xml version="1.0" encoding="utf-8"?>
 <p:sld xmlns:a="http://schemas.openxmlformats.org/drawingml/2006/main" xmlns:r="http://schemas.openxmlformats.org/officeDocument/2006/relationships" xmlns:p="http://schemas.openxmlformats.org/presentationml/2006/main">
   <p:cSld>
     <p:spTree>
@@ -7208,6 +7679,106 @@
 </p:sld>
 </file>
 
+<file path=ppt/slides/slide18.xml><?xml version="1.0" encoding="utf-8"?>
+<p:sld xmlns:a="http://schemas.openxmlformats.org/drawingml/2006/main" xmlns:r="http://schemas.openxmlformats.org/officeDocument/2006/relationships" xmlns:p="http://schemas.openxmlformats.org/presentationml/2006/main">
+  <p:cSld>
+    <p:spTree>
+      <p:nvGrpSpPr>
+        <p:cNvPr id="1" name=""/>
+        <p:cNvGrpSpPr/>
+        <p:nvPr/>
+      </p:nvGrpSpPr>
+      <p:grpSpPr>
+        <a:xfrm>
+          <a:off x="0" y="0"/>
+          <a:ext cx="0" cy="0"/>
+          <a:chOff x="0" y="0"/>
+          <a:chExt cx="0" cy="0"/>
+        </a:xfrm>
+      </p:grpSpPr>
+      <p:sp>
+        <p:nvSpPr>
+          <p:cNvPr id="2" name="Title 1">
+            <a:extLst>
+              <a:ext uri="{FF2B5EF4-FFF2-40B4-BE49-F238E27FC236}">
+                <a16:creationId xmlns:a16="http://schemas.microsoft.com/office/drawing/2014/main" id="{EB7BE5E0-0047-4EE2-82BC-33D53C4C8708}"/>
+              </a:ext>
+            </a:extLst>
+          </p:cNvPr>
+          <p:cNvSpPr>
+            <a:spLocks noGrp="1"/>
+          </p:cNvSpPr>
+          <p:nvPr>
+            <p:ph type="title"/>
+          </p:nvPr>
+        </p:nvSpPr>
+        <p:spPr/>
+        <p:txBody>
+          <a:bodyPr/>
+          <a:lstStyle/>
+          <a:p>
+            <a:r>
+              <a:rPr lang="en-US" dirty="0"/>
+              <a:t>Phase 3 advanced topics</a:t>
+            </a:r>
+            <a:endParaRPr lang="nl-NL" dirty="0"/>
+          </a:p>
+        </p:txBody>
+      </p:sp>
+      <p:sp>
+        <p:nvSpPr>
+          <p:cNvPr id="3" name="Content Placeholder 2">
+            <a:extLst>
+              <a:ext uri="{FF2B5EF4-FFF2-40B4-BE49-F238E27FC236}">
+                <a16:creationId xmlns:a16="http://schemas.microsoft.com/office/drawing/2014/main" id="{E8FBA5F1-78D1-47E4-B412-C1E4ACAE1E40}"/>
+              </a:ext>
+            </a:extLst>
+          </p:cNvPr>
+          <p:cNvSpPr>
+            <a:spLocks noGrp="1"/>
+          </p:cNvSpPr>
+          <p:nvPr>
+            <p:ph idx="1"/>
+          </p:nvPr>
+        </p:nvSpPr>
+        <p:spPr/>
+        <p:txBody>
+          <a:bodyPr/>
+          <a:lstStyle/>
+          <a:p>
+            <a:r>
+              <a:rPr lang="en-US" dirty="0"/>
+              <a:t>1. Having a random error in the initial position and velocity of the ball, including an analysis of the impact on the bot’s performance</a:t>
+            </a:r>
+          </a:p>
+          <a:p>
+            <a:r>
+              <a:rPr lang="en-US" dirty="0"/>
+              <a:t>2. Handling different (unknown) coefficients of friction and making sure the bot can handle them.</a:t>
+            </a:r>
+          </a:p>
+          <a:p>
+            <a:r>
+              <a:rPr lang="en-US" dirty="0"/>
+              <a:t>3. Allow for balls that can both fly and bounce, as well as improvements to the bot so it can handle these new options.</a:t>
+            </a:r>
+            <a:endParaRPr lang="nl-NL" dirty="0"/>
+          </a:p>
+        </p:txBody>
+      </p:sp>
+    </p:spTree>
+    <p:extLst>
+      <p:ext uri="{BB962C8B-B14F-4D97-AF65-F5344CB8AC3E}">
+        <p14:creationId xmlns:p14="http://schemas.microsoft.com/office/powerpoint/2010/main" val="2854100558"/>
+      </p:ext>
+    </p:extLst>
+  </p:cSld>
+  <p:clrMapOvr>
+    <a:masterClrMapping/>
+  </p:clrMapOvr>
+</p:sld>
+</file>
+
 <file path=ppt/slides/slide19.xml><?xml version="1.0" encoding="utf-8"?>
 <p:sld xmlns:a="http://schemas.openxmlformats.org/drawingml/2006/main" xmlns:r="http://schemas.openxmlformats.org/officeDocument/2006/relationships" xmlns:p="http://schemas.openxmlformats.org/presentationml/2006/main">
   <p:cSld>
@@ -7230,7 +7801,7 @@
           <p:cNvPr id="2" name="Title 1">
             <a:extLst>
               <a:ext uri="{FF2B5EF4-FFF2-40B4-BE49-F238E27FC236}">
-                <a16:creationId xmlns:a16="http://schemas.microsoft.com/office/drawing/2014/main" id="{EB7BE5E0-0047-4EE2-82BC-33D53C4C8708}"/>
+                <a16:creationId xmlns:a16="http://schemas.microsoft.com/office/drawing/2014/main" id="{AC24F4CF-25C7-4101-9DC3-9DA467D3C53C}"/>
               </a:ext>
             </a:extLst>
           </p:cNvPr>
@@ -7248,7 +7819,7 @@
           <a:p>
             <a:r>
               <a:rPr lang="en-US" dirty="0"/>
-              <a:t>Phase 3 advanced topics</a:t>
+              <a:t>Questions?</a:t>
             </a:r>
             <a:endParaRPr lang="nl-NL" dirty="0"/>
           </a:p>
@@ -7259,7 +7830,7 @@
           <p:cNvPr id="3" name="Content Placeholder 2">
             <a:extLst>
               <a:ext uri="{FF2B5EF4-FFF2-40B4-BE49-F238E27FC236}">
-                <a16:creationId xmlns:a16="http://schemas.microsoft.com/office/drawing/2014/main" id="{E8FBA5F1-78D1-47E4-B412-C1E4ACAE1E40}"/>
+                <a16:creationId xmlns:a16="http://schemas.microsoft.com/office/drawing/2014/main" id="{94E0A375-AB7A-4233-817A-01E2760FFDF7}"/>
               </a:ext>
             </a:extLst>
           </p:cNvPr>
@@ -7275,22 +7846,6 @@
           <a:bodyPr/>
           <a:lstStyle/>
           <a:p>
-            <a:r>
-              <a:rPr lang="en-US" dirty="0"/>
-              <a:t>1. Having a random error in the initial position and velocity of the ball, including an analysis of the impact on the bot’s performance</a:t>
-            </a:r>
-          </a:p>
-          <a:p>
-            <a:r>
-              <a:rPr lang="en-US" dirty="0"/>
-              <a:t>2. Handling different (unknown) coefficients of friction and making sure the bot can handle them.</a:t>
-            </a:r>
-          </a:p>
-          <a:p>
-            <a:r>
-              <a:rPr lang="en-US" dirty="0"/>
-              <a:t>3. Allow for balls that can both fly and bounce, as well as improvements to the bot so it can handle these new options.</a:t>
-            </a:r>
             <a:endParaRPr lang="nl-NL" dirty="0"/>
           </a:p>
         </p:txBody>
@@ -7298,7 +7853,7 @@
     </p:spTree>
     <p:extLst>
       <p:ext uri="{BB962C8B-B14F-4D97-AF65-F5344CB8AC3E}">
-        <p14:creationId xmlns:p14="http://schemas.microsoft.com/office/powerpoint/2010/main" val="2854100558"/>
+        <p14:creationId xmlns:p14="http://schemas.microsoft.com/office/powerpoint/2010/main" val="4090330523"/>
       </p:ext>
     </p:extLst>
   </p:cSld>
@@ -7403,90 +7958,6 @@
 </file>
 
 <file path=ppt/slides/slide20.xml><?xml version="1.0" encoding="utf-8"?>
-<p:sld xmlns:a="http://schemas.openxmlformats.org/drawingml/2006/main" xmlns:r="http://schemas.openxmlformats.org/officeDocument/2006/relationships" xmlns:p="http://schemas.openxmlformats.org/presentationml/2006/main">
-  <p:cSld>
-    <p:spTree>
-      <p:nvGrpSpPr>
-        <p:cNvPr id="1" name=""/>
-        <p:cNvGrpSpPr/>
-        <p:nvPr/>
-      </p:nvGrpSpPr>
-      <p:grpSpPr>
-        <a:xfrm>
-          <a:off x="0" y="0"/>
-          <a:ext cx="0" cy="0"/>
-          <a:chOff x="0" y="0"/>
-          <a:chExt cx="0" cy="0"/>
-        </a:xfrm>
-      </p:grpSpPr>
-      <p:sp>
-        <p:nvSpPr>
-          <p:cNvPr id="2" name="Title 1">
-            <a:extLst>
-              <a:ext uri="{FF2B5EF4-FFF2-40B4-BE49-F238E27FC236}">
-                <a16:creationId xmlns:a16="http://schemas.microsoft.com/office/drawing/2014/main" id="{AC24F4CF-25C7-4101-9DC3-9DA467D3C53C}"/>
-              </a:ext>
-            </a:extLst>
-          </p:cNvPr>
-          <p:cNvSpPr>
-            <a:spLocks noGrp="1"/>
-          </p:cNvSpPr>
-          <p:nvPr>
-            <p:ph type="title"/>
-          </p:nvPr>
-        </p:nvSpPr>
-        <p:spPr/>
-        <p:txBody>
-          <a:bodyPr/>
-          <a:lstStyle/>
-          <a:p>
-            <a:r>
-              <a:rPr lang="en-US" dirty="0"/>
-              <a:t>Questions?</a:t>
-            </a:r>
-            <a:endParaRPr lang="nl-NL" dirty="0"/>
-          </a:p>
-        </p:txBody>
-      </p:sp>
-      <p:sp>
-        <p:nvSpPr>
-          <p:cNvPr id="3" name="Content Placeholder 2">
-            <a:extLst>
-              <a:ext uri="{FF2B5EF4-FFF2-40B4-BE49-F238E27FC236}">
-                <a16:creationId xmlns:a16="http://schemas.microsoft.com/office/drawing/2014/main" id="{94E0A375-AB7A-4233-817A-01E2760FFDF7}"/>
-              </a:ext>
-            </a:extLst>
-          </p:cNvPr>
-          <p:cNvSpPr>
-            <a:spLocks noGrp="1"/>
-          </p:cNvSpPr>
-          <p:nvPr>
-            <p:ph idx="1"/>
-          </p:nvPr>
-        </p:nvSpPr>
-        <p:spPr/>
-        <p:txBody>
-          <a:bodyPr/>
-          <a:lstStyle/>
-          <a:p>
-            <a:endParaRPr lang="nl-NL" dirty="0"/>
-          </a:p>
-        </p:txBody>
-      </p:sp>
-    </p:spTree>
-    <p:extLst>
-      <p:ext uri="{BB962C8B-B14F-4D97-AF65-F5344CB8AC3E}">
-        <p14:creationId xmlns:p14="http://schemas.microsoft.com/office/powerpoint/2010/main" val="4090330523"/>
-      </p:ext>
-    </p:extLst>
-  </p:cSld>
-  <p:clrMapOvr>
-    <a:masterClrMapping/>
-  </p:clrMapOvr>
-</p:sld>
-</file>
-
-<file path=ppt/slides/slide21.xml><?xml version="1.0" encoding="utf-8"?>
 <p:sld xmlns:a="http://schemas.openxmlformats.org/drawingml/2006/main" xmlns:r="http://schemas.openxmlformats.org/officeDocument/2006/relationships" xmlns:p="http://schemas.openxmlformats.org/presentationml/2006/main">
   <p:cSld>
     <p:spTree>
@@ -8949,8 +9420,8 @@
           </a:p>
         </p:txBody>
       </p:sp>
-      <mc:AlternateContent xmlns:mc="http://schemas.openxmlformats.org/markup-compatibility/2006" xmlns:a14="http://schemas.microsoft.com/office/drawing/2010/main">
-        <mc:Choice Requires="a14">
+      <mc:AlternateContent xmlns:mc="http://schemas.openxmlformats.org/markup-compatibility/2006">
+        <mc:Choice xmlns:a14="http://schemas.microsoft.com/office/drawing/2010/main" Requires="a14">
           <p:sp>
             <p:nvSpPr>
               <p:cNvPr id="3" name="Content Placeholder 2">
@@ -8972,11 +9443,15 @@
               <a:bodyPr/>
               <a:lstStyle/>
               <a:p>
-                <a:endParaRPr lang="nl-NL" b="0" i="1" dirty="0">
-                  <a:latin typeface="Cambria Math" panose="02040503050406030204" pitchFamily="18" charset="0"/>
-                </a:endParaRPr>
-              </a:p>
-              <a:p>
+                <a:pPr marL="0" indent="0">
+                  <a:buNone/>
+                </a:pPr>
+                <a:r>
+                  <a:rPr lang="nl-NL" i="1" dirty="0">
+                    <a:latin typeface="Cambria Math" panose="02040503050406030204" pitchFamily="18" charset="0"/>
+                  </a:rPr>
+                  <a:t>  </a:t>
+                </a:r>
                 <a14:m>
                   <m:oMath xmlns:m="http://schemas.openxmlformats.org/officeDocument/2006/math">
                     <m:r>
@@ -9430,7 +9905,7 @@
             </p:txBody>
           </p:sp>
         </mc:Choice>
-        <mc:Fallback xmlns="">
+        <mc:Fallback>
           <p:sp>
             <p:nvSpPr>
               <p:cNvPr id="3" name="Content Placeholder 2">
@@ -9451,7 +9926,7 @@
               <a:blipFill>
                 <a:blip r:embed="rId3"/>
                 <a:stretch>
-                  <a:fillRect l="-1455"/>
+                  <a:fillRect/>
                 </a:stretch>
               </a:blipFill>
             </p:spPr>
@@ -9460,7 +9935,7 @@
               <a:lstStyle/>
               <a:p>
                 <a:r>
-                  <a:rPr lang="en-GB">
+                  <a:rPr lang="nl-NL">
                     <a:noFill/>
                   </a:rPr>
                   <a:t> </a:t>
@@ -9544,8 +10019,8 @@
           </a:p>
         </p:txBody>
       </p:sp>
-      <mc:AlternateContent xmlns:mc="http://schemas.openxmlformats.org/markup-compatibility/2006" xmlns:a14="http://schemas.microsoft.com/office/drawing/2010/main">
-        <mc:Choice Requires="a14">
+      <mc:AlternateContent xmlns:mc="http://schemas.openxmlformats.org/markup-compatibility/2006">
+        <mc:Choice xmlns:a14="http://schemas.microsoft.com/office/drawing/2010/main" Requires="a14">
           <p:sp>
             <p:nvSpPr>
               <p:cNvPr id="3" name="Content Placeholder 2">
@@ -9567,9 +10042,13 @@
               <a:bodyPr/>
               <a:lstStyle/>
               <a:p>
-                <a:endParaRPr lang="en-GB" dirty="0"/>
-              </a:p>
-              <a:p>
+                <a:pPr marL="0" indent="0">
+                  <a:buNone/>
+                </a:pPr>
+                <a:r>
+                  <a:rPr lang="en-GB" dirty="0"/>
+                  <a:t>  </a:t>
+                </a:r>
                 <a14:m>
                   <m:oMath xmlns:m="http://schemas.openxmlformats.org/officeDocument/2006/math">
                     <m:r>
@@ -10253,7 +10732,7 @@
             </p:txBody>
           </p:sp>
         </mc:Choice>
-        <mc:Fallback xmlns="">
+        <mc:Fallback>
           <p:sp>
             <p:nvSpPr>
               <p:cNvPr id="3" name="Content Placeholder 2">
@@ -10283,7 +10762,7 @@
               <a:lstStyle/>
               <a:p>
                 <a:r>
-                  <a:rPr lang="en-GB">
+                  <a:rPr lang="nl-NL">
                     <a:noFill/>
                   </a:rPr>
                   <a:t> </a:t>
@@ -12672,15 +13151,6 @@
 </file>
 
 <file path=customXml/item1.xml><?xml version="1.0" encoding="utf-8"?>
-<p:properties xmlns:p="http://schemas.microsoft.com/office/2006/metadata/properties" xmlns:xsi="http://www.w3.org/2001/XMLSchema-instance" xmlns:pc="http://schemas.microsoft.com/office/infopath/2007/PartnerControls">
-  <documentManagement>
-    <Status xmlns="71af3243-3dd4-4a8d-8c0d-dd76da1f02a5">Not started</Status>
-    <MediaServiceKeyPoints xmlns="71af3243-3dd4-4a8d-8c0d-dd76da1f02a5" xsi:nil="true"/>
-  </documentManagement>
-</p:properties>
-</file>
-
-<file path=customXml/item2.xml><?xml version="1.0" encoding="utf-8"?>
 <ct:contentTypeSchema xmlns:ct="http://schemas.microsoft.com/office/2006/metadata/contentType" xmlns:ma="http://schemas.microsoft.com/office/2006/metadata/properties/metaAttributes" ct:_="" ma:_="" ma:contentTypeName="Document" ma:contentTypeID="0x01010079F111ED35F8CC479449609E8A0923A6" ma:contentTypeVersion="12" ma:contentTypeDescription="Create a new document." ma:contentTypeScope="" ma:versionID="a410dd7f93c95333ffa1b60ed6adedd1">
   <xsd:schema xmlns:xsd="http://www.w3.org/2001/XMLSchema" xmlns:xs="http://www.w3.org/2001/XMLSchema" xmlns:p="http://schemas.microsoft.com/office/2006/metadata/properties" xmlns:ns2="71af3243-3dd4-4a8d-8c0d-dd76da1f02a5" xmlns:ns3="16c05727-aa75-4e4a-9b5f-8a80a1165891" targetNamespace="http://schemas.microsoft.com/office/2006/metadata/properties" ma:root="true" ma:fieldsID="a936d9baba76aa3866493feff160faab" ns2:_="" ns3:_="">
     <xsd:import namespace="71af3243-3dd4-4a8d-8c0d-dd76da1f02a5"/>
@@ -12901,6 +13371,15 @@
 </ct:contentTypeSchema>
 </file>
 
+<file path=customXml/item2.xml><?xml version="1.0" encoding="utf-8"?>
+<p:properties xmlns:p="http://schemas.microsoft.com/office/2006/metadata/properties" xmlns:xsi="http://www.w3.org/2001/XMLSchema-instance" xmlns:pc="http://schemas.microsoft.com/office/infopath/2007/PartnerControls">
+  <documentManagement>
+    <Status xmlns="71af3243-3dd4-4a8d-8c0d-dd76da1f02a5">Not started</Status>
+    <MediaServiceKeyPoints xmlns="71af3243-3dd4-4a8d-8c0d-dd76da1f02a5" xsi:nil="true"/>
+  </documentManagement>
+</p:properties>
+</file>
+
 <file path=customXml/item3.xml><?xml version="1.0" encoding="utf-8"?>
 <?mso-contentType ?>
 <FormTemplates xmlns="http://schemas.microsoft.com/sharepoint/v3/contenttype/forms">
@@ -12911,16 +13390,6 @@
 </file>
 
 <file path=customXml/itemProps1.xml><?xml version="1.0" encoding="utf-8"?>
-<ds:datastoreItem xmlns:ds="http://schemas.openxmlformats.org/officeDocument/2006/customXml" ds:itemID="{626E351D-C19B-467F-A5C7-085C4CECACA9}">
-  <ds:schemaRefs>
-    <ds:schemaRef ds:uri="http://schemas.microsoft.com/office/2006/metadata/properties"/>
-    <ds:schemaRef ds:uri="http://schemas.microsoft.com/office/infopath/2007/PartnerControls"/>
-    <ds:schemaRef ds:uri="71af3243-3dd4-4a8d-8c0d-dd76da1f02a5"/>
-  </ds:schemaRefs>
-</ds:datastoreItem>
-</file>
-
-<file path=customXml/itemProps2.xml><?xml version="1.0" encoding="utf-8"?>
 <ds:datastoreItem xmlns:ds="http://schemas.openxmlformats.org/officeDocument/2006/customXml" ds:itemID="{6E499CE6-06FC-4D3E-8B56-30558CC9D1A4}">
   <ds:schemaRefs>
     <ds:schemaRef ds:uri="http://schemas.microsoft.com/office/2006/metadata/contentType"/>
@@ -12939,6 +13408,16 @@
 </ds:datastoreItem>
 </file>
 
+<file path=customXml/itemProps2.xml><?xml version="1.0" encoding="utf-8"?>
+<ds:datastoreItem xmlns:ds="http://schemas.openxmlformats.org/officeDocument/2006/customXml" ds:itemID="{626E351D-C19B-467F-A5C7-085C4CECACA9}">
+  <ds:schemaRefs>
+    <ds:schemaRef ds:uri="http://schemas.microsoft.com/office/2006/metadata/properties"/>
+    <ds:schemaRef ds:uri="http://schemas.microsoft.com/office/infopath/2007/PartnerControls"/>
+    <ds:schemaRef ds:uri="71af3243-3dd4-4a8d-8c0d-dd76da1f02a5"/>
+  </ds:schemaRefs>
+</ds:datastoreItem>
+</file>
+
 <file path=customXml/itemProps3.xml><?xml version="1.0" encoding="utf-8"?>
 <ds:datastoreItem xmlns:ds="http://schemas.openxmlformats.org/officeDocument/2006/customXml" ds:itemID="{3C586965-D4BF-4605-8C1C-5B8CCCAB7737}">
   <ds:schemaRefs>

</xml_diff>

<commit_message>
Human demo working, this is RC1
</commit_message>
<xml_diff>
--- a/Crazy Putting phase 2.pptx
+++ b/Crazy Putting phase 2.pptx
@@ -7460,23 +7460,46 @@
           <a:bodyPr/>
           <a:lstStyle/>
           <a:p>
-            <a:r>
-              <a:rPr lang="en-US" dirty="0"/>
-              <a:t>## INSERT VIDEO OF HUMAN PLAYING##</a:t>
-            </a:r>
-          </a:p>
-          <a:p>
             <a:endParaRPr lang="en-US" dirty="0"/>
           </a:p>
           <a:p>
-            <a:r>
-              <a:rPr lang="en-US" dirty="0"/>
-              <a:t>## INSERT VIDEO OF BOT PLAYING##</a:t>
-            </a:r>
-            <a:endParaRPr lang="nl-NL" dirty="0"/>
+            <a:endParaRPr lang="en-US" dirty="0"/>
           </a:p>
         </p:txBody>
       </p:sp>
+      <p:pic>
+        <p:nvPicPr>
+          <p:cNvPr id="4" name="Online Media 3" title="Crazy Putting human demo">
+            <a:hlinkClick r:id="" action="ppaction://media"/>
+            <a:extLst>
+              <a:ext uri="{FF2B5EF4-FFF2-40B4-BE49-F238E27FC236}">
+                <a16:creationId xmlns:a16="http://schemas.microsoft.com/office/drawing/2014/main" id="{864CE5BD-ECD5-4DA7-9311-7810165BEB64}"/>
+              </a:ext>
+            </a:extLst>
+          </p:cNvPr>
+          <p:cNvPicPr>
+            <a:picLocks noRot="1" noChangeAspect="1"/>
+          </p:cNvPicPr>
+          <p:nvPr>
+            <a:videoFile r:link="rId1"/>
+          </p:nvPr>
+        </p:nvPicPr>
+        <p:blipFill>
+          <a:blip r:embed="rId3"/>
+          <a:stretch>
+            <a:fillRect/>
+          </a:stretch>
+        </p:blipFill>
+        <p:spPr>
+          <a:xfrm>
+            <a:off x="1097280" y="2274146"/>
+            <a:ext cx="6096000" cy="3429000"/>
+          </a:xfrm>
+          <a:prstGeom prst="rect">
+            <a:avLst/>
+          </a:prstGeom>
+        </p:spPr>
+      </p:pic>
     </p:spTree>
     <p:extLst>
       <p:ext uri="{BB962C8B-B14F-4D97-AF65-F5344CB8AC3E}">
@@ -7487,6 +7510,141 @@
   <p:clrMapOvr>
     <a:masterClrMapping/>
   </p:clrMapOvr>
+  <p:timing>
+    <p:tnLst>
+      <p:par>
+        <p:cTn id="1" dur="indefinite" restart="never" nodeType="tmRoot">
+          <p:childTnLst>
+            <p:seq concurrent="1" nextAc="seek">
+              <p:cTn id="2" dur="indefinite" nodeType="mainSeq">
+                <p:childTnLst>
+                  <p:par>
+                    <p:cTn id="3" fill="hold">
+                      <p:stCondLst>
+                        <p:cond delay="indefinite"/>
+                      </p:stCondLst>
+                      <p:childTnLst>
+                        <p:par>
+                          <p:cTn id="4" fill="hold">
+                            <p:stCondLst>
+                              <p:cond delay="0"/>
+                            </p:stCondLst>
+                            <p:childTnLst>
+                              <p:par>
+                                <p:cTn id="5" presetID="1" presetClass="mediacall" presetSubtype="0" fill="hold" nodeType="clickEffect">
+                                  <p:stCondLst>
+                                    <p:cond delay="0"/>
+                                  </p:stCondLst>
+                                  <p:childTnLst>
+                                    <p:cmd type="call" cmd="playFrom(0.0)">
+                                      <p:cBhvr>
+                                        <p:cTn id="6" dur="1" fill="hold"/>
+                                        <p:tgtEl>
+                                          <p:spTgt spid="4"/>
+                                        </p:tgtEl>
+                                      </p:cBhvr>
+                                    </p:cmd>
+                                  </p:childTnLst>
+                                </p:cTn>
+                              </p:par>
+                            </p:childTnLst>
+                          </p:cTn>
+                        </p:par>
+                      </p:childTnLst>
+                    </p:cTn>
+                  </p:par>
+                </p:childTnLst>
+              </p:cTn>
+              <p:prevCondLst>
+                <p:cond evt="onPrev" delay="0">
+                  <p:tgtEl>
+                    <p:sldTgt/>
+                  </p:tgtEl>
+                </p:cond>
+              </p:prevCondLst>
+              <p:nextCondLst>
+                <p:cond evt="onNext" delay="0">
+                  <p:tgtEl>
+                    <p:sldTgt/>
+                  </p:tgtEl>
+                </p:cond>
+              </p:nextCondLst>
+            </p:seq>
+            <p:video>
+              <p:cMediaNode vol="80000">
+                <p:cTn id="7" fill="hold" display="0">
+                  <p:stCondLst>
+                    <p:cond delay="indefinite"/>
+                  </p:stCondLst>
+                </p:cTn>
+                <p:tgtEl>
+                  <p:spTgt spid="4"/>
+                </p:tgtEl>
+              </p:cMediaNode>
+            </p:video>
+            <p:seq concurrent="1" nextAc="seek">
+              <p:cTn id="8" restart="whenNotActive" fill="hold" evtFilter="cancelBubble" nodeType="interactiveSeq">
+                <p:stCondLst>
+                  <p:cond evt="onClick" delay="0">
+                    <p:tgtEl>
+                      <p:spTgt spid="4"/>
+                    </p:tgtEl>
+                  </p:cond>
+                </p:stCondLst>
+                <p:endSync evt="end" delay="0">
+                  <p:rtn val="all"/>
+                </p:endSync>
+                <p:childTnLst>
+                  <p:par>
+                    <p:cTn id="9" fill="hold">
+                      <p:stCondLst>
+                        <p:cond delay="0"/>
+                      </p:stCondLst>
+                      <p:childTnLst>
+                        <p:par>
+                          <p:cTn id="10" fill="hold">
+                            <p:stCondLst>
+                              <p:cond delay="0"/>
+                            </p:stCondLst>
+                            <p:childTnLst>
+                              <p:par>
+                                <p:cTn id="11" presetID="2" presetClass="mediacall" presetSubtype="0" fill="hold" nodeType="clickEffect">
+                                  <p:stCondLst>
+                                    <p:cond delay="0"/>
+                                  </p:stCondLst>
+                                  <p:childTnLst>
+                                    <p:cmd type="call" cmd="togglePause">
+                                      <p:cBhvr>
+                                        <p:cTn id="12" dur="1" fill="hold"/>
+                                        <p:tgtEl>
+                                          <p:spTgt spid="4"/>
+                                        </p:tgtEl>
+                                      </p:cBhvr>
+                                    </p:cmd>
+                                  </p:childTnLst>
+                                </p:cTn>
+                              </p:par>
+                            </p:childTnLst>
+                          </p:cTn>
+                        </p:par>
+                      </p:childTnLst>
+                    </p:cTn>
+                  </p:par>
+                </p:childTnLst>
+              </p:cTn>
+              <p:nextCondLst>
+                <p:cond evt="onClick" delay="0">
+                  <p:tgtEl>
+                    <p:spTgt spid="4"/>
+                  </p:tgtEl>
+                </p:cond>
+              </p:nextCondLst>
+            </p:seq>
+          </p:childTnLst>
+        </p:cTn>
+      </p:par>
+    </p:tnLst>
+  </p:timing>
 </p:sld>
 </file>
 
@@ -9420,8 +9578,8 @@
           </a:p>
         </p:txBody>
       </p:sp>
-      <mc:AlternateContent xmlns:mc="http://schemas.openxmlformats.org/markup-compatibility/2006">
-        <mc:Choice xmlns:a14="http://schemas.microsoft.com/office/drawing/2010/main" Requires="a14">
+      <mc:AlternateContent xmlns:mc="http://schemas.openxmlformats.org/markup-compatibility/2006" xmlns:a14="http://schemas.microsoft.com/office/drawing/2010/main">
+        <mc:Choice Requires="a14">
           <p:sp>
             <p:nvSpPr>
               <p:cNvPr id="3" name="Content Placeholder 2">
@@ -9905,7 +10063,7 @@
             </p:txBody>
           </p:sp>
         </mc:Choice>
-        <mc:Fallback>
+        <mc:Fallback xmlns="">
           <p:sp>
             <p:nvSpPr>
               <p:cNvPr id="3" name="Content Placeholder 2">
@@ -10019,8 +10177,8 @@
           </a:p>
         </p:txBody>
       </p:sp>
-      <mc:AlternateContent xmlns:mc="http://schemas.openxmlformats.org/markup-compatibility/2006">
-        <mc:Choice xmlns:a14="http://schemas.microsoft.com/office/drawing/2010/main" Requires="a14">
+      <mc:AlternateContent xmlns:mc="http://schemas.openxmlformats.org/markup-compatibility/2006" xmlns:a14="http://schemas.microsoft.com/office/drawing/2010/main">
+        <mc:Choice Requires="a14">
           <p:sp>
             <p:nvSpPr>
               <p:cNvPr id="3" name="Content Placeholder 2">
@@ -10732,7 +10890,7 @@
             </p:txBody>
           </p:sp>
         </mc:Choice>
-        <mc:Fallback>
+        <mc:Fallback xmlns="">
           <p:sp>
             <p:nvSpPr>
               <p:cNvPr id="3" name="Content Placeholder 2">
@@ -13151,6 +13309,15 @@
 </file>
 
 <file path=customXml/item1.xml><?xml version="1.0" encoding="utf-8"?>
+<p:properties xmlns:p="http://schemas.microsoft.com/office/2006/metadata/properties" xmlns:xsi="http://www.w3.org/2001/XMLSchema-instance" xmlns:pc="http://schemas.microsoft.com/office/infopath/2007/PartnerControls">
+  <documentManagement>
+    <Status xmlns="71af3243-3dd4-4a8d-8c0d-dd76da1f02a5">Not started</Status>
+    <MediaServiceKeyPoints xmlns="71af3243-3dd4-4a8d-8c0d-dd76da1f02a5" xsi:nil="true"/>
+  </documentManagement>
+</p:properties>
+</file>
+
+<file path=customXml/item2.xml><?xml version="1.0" encoding="utf-8"?>
 <ct:contentTypeSchema xmlns:ct="http://schemas.microsoft.com/office/2006/metadata/contentType" xmlns:ma="http://schemas.microsoft.com/office/2006/metadata/properties/metaAttributes" ct:_="" ma:_="" ma:contentTypeName="Document" ma:contentTypeID="0x01010079F111ED35F8CC479449609E8A0923A6" ma:contentTypeVersion="12" ma:contentTypeDescription="Create a new document." ma:contentTypeScope="" ma:versionID="a410dd7f93c95333ffa1b60ed6adedd1">
   <xsd:schema xmlns:xsd="http://www.w3.org/2001/XMLSchema" xmlns:xs="http://www.w3.org/2001/XMLSchema" xmlns:p="http://schemas.microsoft.com/office/2006/metadata/properties" xmlns:ns2="71af3243-3dd4-4a8d-8c0d-dd76da1f02a5" xmlns:ns3="16c05727-aa75-4e4a-9b5f-8a80a1165891" targetNamespace="http://schemas.microsoft.com/office/2006/metadata/properties" ma:root="true" ma:fieldsID="a936d9baba76aa3866493feff160faab" ns2:_="" ns3:_="">
     <xsd:import namespace="71af3243-3dd4-4a8d-8c0d-dd76da1f02a5"/>
@@ -13371,15 +13538,6 @@
 </ct:contentTypeSchema>
 </file>
 
-<file path=customXml/item2.xml><?xml version="1.0" encoding="utf-8"?>
-<p:properties xmlns:p="http://schemas.microsoft.com/office/2006/metadata/properties" xmlns:xsi="http://www.w3.org/2001/XMLSchema-instance" xmlns:pc="http://schemas.microsoft.com/office/infopath/2007/PartnerControls">
-  <documentManagement>
-    <Status xmlns="71af3243-3dd4-4a8d-8c0d-dd76da1f02a5">Not started</Status>
-    <MediaServiceKeyPoints xmlns="71af3243-3dd4-4a8d-8c0d-dd76da1f02a5" xsi:nil="true"/>
-  </documentManagement>
-</p:properties>
-</file>
-
 <file path=customXml/item3.xml><?xml version="1.0" encoding="utf-8"?>
 <?mso-contentType ?>
 <FormTemplates xmlns="http://schemas.microsoft.com/sharepoint/v3/contenttype/forms">
@@ -13390,6 +13548,16 @@
 </file>
 
 <file path=customXml/itemProps1.xml><?xml version="1.0" encoding="utf-8"?>
+<ds:datastoreItem xmlns:ds="http://schemas.openxmlformats.org/officeDocument/2006/customXml" ds:itemID="{626E351D-C19B-467F-A5C7-085C4CECACA9}">
+  <ds:schemaRefs>
+    <ds:schemaRef ds:uri="http://schemas.microsoft.com/office/2006/metadata/properties"/>
+    <ds:schemaRef ds:uri="http://schemas.microsoft.com/office/infopath/2007/PartnerControls"/>
+    <ds:schemaRef ds:uri="71af3243-3dd4-4a8d-8c0d-dd76da1f02a5"/>
+  </ds:schemaRefs>
+</ds:datastoreItem>
+</file>
+
+<file path=customXml/itemProps2.xml><?xml version="1.0" encoding="utf-8"?>
 <ds:datastoreItem xmlns:ds="http://schemas.openxmlformats.org/officeDocument/2006/customXml" ds:itemID="{6E499CE6-06FC-4D3E-8B56-30558CC9D1A4}">
   <ds:schemaRefs>
     <ds:schemaRef ds:uri="http://schemas.microsoft.com/office/2006/metadata/contentType"/>
@@ -13408,16 +13576,6 @@
 </ds:datastoreItem>
 </file>
 
-<file path=customXml/itemProps2.xml><?xml version="1.0" encoding="utf-8"?>
-<ds:datastoreItem xmlns:ds="http://schemas.openxmlformats.org/officeDocument/2006/customXml" ds:itemID="{626E351D-C19B-467F-A5C7-085C4CECACA9}">
-  <ds:schemaRefs>
-    <ds:schemaRef ds:uri="http://schemas.microsoft.com/office/2006/metadata/properties"/>
-    <ds:schemaRef ds:uri="http://schemas.microsoft.com/office/infopath/2007/PartnerControls"/>
-    <ds:schemaRef ds:uri="71af3243-3dd4-4a8d-8c0d-dd76da1f02a5"/>
-  </ds:schemaRefs>
-</ds:datastoreItem>
-</file>
-
 <file path=customXml/itemProps3.xml><?xml version="1.0" encoding="utf-8"?>
 <ds:datastoreItem xmlns:ds="http://schemas.openxmlformats.org/officeDocument/2006/customXml" ds:itemID="{3C586965-D4BF-4605-8C1C-5B8CCCAB7737}">
   <ds:schemaRefs>

</xml_diff>